<commit_message>
feat(reduce): ppt with animation
</commit_message>
<xml_diff>
--- a/supports/source/03-Reduce.pptx
+++ b/supports/source/03-Reduce.pptx
@@ -11,8 +11,9 @@
     <p:sldId id="263" r:id="rId5"/>
     <p:sldId id="265" r:id="rId6"/>
     <p:sldId id="266" r:id="rId7"/>
-    <p:sldId id="267" r:id="rId8"/>
-    <p:sldId id="268" r:id="rId9"/>
+    <p:sldId id="269" r:id="rId8"/>
+    <p:sldId id="267" r:id="rId9"/>
+    <p:sldId id="268" r:id="rId10"/>
   </p:sldIdLst>
   <p:sldSz cx="12192000" cy="6858000"/>
   <p:notesSz cx="6858000" cy="9144000"/>
@@ -10133,7 +10134,7 @@
                 <a:ea typeface="Hack" panose="020B0609030202020204" pitchFamily="49" charset="0"/>
                 <a:cs typeface="Hack" panose="020B0609030202020204" pitchFamily="49" charset="0"/>
               </a:rPr>
-              <a:t>SEED</a:t>
+              <a:t>SEED [OPTIONNEL]</a:t>
             </a:r>
           </a:p>
           <a:p>
@@ -12100,14 +12101,21 @@
           <a:lstStyle/>
           <a:p>
             <a:r>
+              <a:rPr lang="fr-CH" dirty="0" err="1"/>
+              <a:t>Aggregate</a:t>
+            </a:r>
+            <a:r>
               <a:rPr lang="fr-CH" dirty="0"/>
-              <a:t>Simplification avec le </a:t>
+              <a:t>: </a:t>
             </a:r>
             <a:r>
               <a:rPr lang="fr-CH" dirty="0" err="1"/>
               <a:t>seed</a:t>
             </a:r>
-            <a:endParaRPr lang="fr-CH" dirty="0"/>
+            <a:r>
+              <a:rPr lang="fr-CH" dirty="0"/>
+              <a:t> repris</a:t>
+            </a:r>
           </a:p>
         </p:txBody>
       </p:sp>
@@ -12134,7 +12142,9 @@
           </a:xfrm>
         </p:spPr>
         <p:txBody>
-          <a:bodyPr/>
+          <a:bodyPr>
+            <a:normAutofit lnSpcReduction="10000"/>
+          </a:bodyPr>
           <a:lstStyle/>
           <a:p>
             <a:r>
@@ -12147,7 +12157,7 @@
             </a:r>
             <a:r>
               <a:rPr lang="fr-CH" dirty="0"/>
-              <a:t> particulier, on peut faire ainsi:</a:t>
+              <a:t> particulier et on veut une transformation, on peut faire ainsi:</a:t>
             </a:r>
           </a:p>
         </p:txBody>
@@ -12166,13 +12176,18 @@
         </p:nvSpPr>
         <p:spPr>
           <a:xfrm>
-            <a:off x="913795" y="2592628"/>
-            <a:ext cx="11653443" cy="2000548"/>
+            <a:off x="1216577" y="2756130"/>
+            <a:ext cx="7302956" cy="1538883"/>
           </a:xfrm>
           <a:prstGeom prst="rect">
             <a:avLst/>
           </a:prstGeom>
           <a:noFill/>
+          <a:ln>
+            <a:solidFill>
+              <a:schemeClr val="accent1"/>
+            </a:solidFill>
+          </a:ln>
         </p:spPr>
         <p:txBody>
           <a:bodyPr wrap="square">
@@ -12321,15 +12336,6 @@
               </a:rPr>
               <a:t>…</a:t>
             </a:r>
-          </a:p>
-          <a:p>
-            <a:endParaRPr lang="fr-CH" dirty="0">
-              <a:latin typeface="Hack" panose="020B0609030202020204" pitchFamily="49" charset="0"/>
-              <a:ea typeface="Hack" panose="020B0609030202020204" pitchFamily="49" charset="0"/>
-              <a:cs typeface="Hack" panose="020B0609030202020204" pitchFamily="49" charset="0"/>
-            </a:endParaRPr>
-          </a:p>
-          <a:p>
             <a:r>
               <a:rPr lang="fr-CH" sz="1200" dirty="0">
                 <a:latin typeface="Hack" panose="020B0609030202020204" pitchFamily="49" charset="0"/>
@@ -13083,6 +13089,697 @@
 </file>
 
 <file path=ppt/slides/slide7.xml><?xml version="1.0" encoding="utf-8"?>
+<p:sld xmlns:a="http://schemas.openxmlformats.org/drawingml/2006/main" xmlns:r="http://schemas.openxmlformats.org/officeDocument/2006/relationships" xmlns:p="http://schemas.openxmlformats.org/presentationml/2006/main">
+  <p:cSld>
+    <p:spTree>
+      <p:nvGrpSpPr>
+        <p:cNvPr id="1" name=""/>
+        <p:cNvGrpSpPr/>
+        <p:nvPr/>
+      </p:nvGrpSpPr>
+      <p:grpSpPr>
+        <a:xfrm>
+          <a:off x="0" y="0"/>
+          <a:ext cx="0" cy="0"/>
+          <a:chOff x="0" y="0"/>
+          <a:chExt cx="0" cy="0"/>
+        </a:xfrm>
+      </p:grpSpPr>
+      <p:sp>
+        <p:nvSpPr>
+          <p:cNvPr id="2" name="Titre 1">
+            <a:extLst>
+              <a:ext uri="{FF2B5EF4-FFF2-40B4-BE49-F238E27FC236}">
+                <a16:creationId xmlns:a16="http://schemas.microsoft.com/office/drawing/2014/main" id="{60AA6A8A-5508-1443-11F6-61E1FEFD683B}"/>
+              </a:ext>
+            </a:extLst>
+          </p:cNvPr>
+          <p:cNvSpPr>
+            <a:spLocks noGrp="1"/>
+          </p:cNvSpPr>
+          <p:nvPr>
+            <p:ph type="title"/>
+          </p:nvPr>
+        </p:nvSpPr>
+        <p:spPr>
+          <a:xfrm>
+            <a:off x="958427" y="144339"/>
+            <a:ext cx="10353761" cy="1326321"/>
+          </a:xfrm>
+        </p:spPr>
+        <p:txBody>
+          <a:bodyPr/>
+          <a:lstStyle/>
+          <a:p>
+            <a:r>
+              <a:rPr lang="fr-CH" dirty="0" err="1"/>
+              <a:t>Aggregate</a:t>
+            </a:r>
+            <a:r>
+              <a:rPr lang="fr-CH" dirty="0"/>
+              <a:t> : 3 versions</a:t>
+            </a:r>
+          </a:p>
+        </p:txBody>
+      </p:sp>
+      <p:sp>
+        <p:nvSpPr>
+          <p:cNvPr id="3" name="Espace réservé du contenu 2">
+            <a:extLst>
+              <a:ext uri="{FF2B5EF4-FFF2-40B4-BE49-F238E27FC236}">
+                <a16:creationId xmlns:a16="http://schemas.microsoft.com/office/drawing/2014/main" id="{1CF6E500-CB63-45C5-EAEA-EAC09B63175D}"/>
+              </a:ext>
+            </a:extLst>
+          </p:cNvPr>
+          <p:cNvSpPr>
+            <a:spLocks noGrp="1"/>
+          </p:cNvSpPr>
+          <p:nvPr>
+            <p:ph idx="1"/>
+          </p:nvPr>
+        </p:nvSpPr>
+        <p:spPr>
+          <a:xfrm>
+            <a:off x="267286" y="2096063"/>
+            <a:ext cx="6632917" cy="4522785"/>
+          </a:xfrm>
+        </p:spPr>
+        <p:txBody>
+          <a:bodyPr>
+            <a:normAutofit/>
+          </a:bodyPr>
+          <a:lstStyle/>
+          <a:p>
+            <a:r>
+              <a:rPr lang="fr-CH" dirty="0"/>
+              <a:t>.Net propose 3 versions de l'agrégation</a:t>
+            </a:r>
+          </a:p>
+          <a:p>
+            <a:endParaRPr lang="fr-CH" dirty="0"/>
+          </a:p>
+          <a:p>
+            <a:pPr lvl="1"/>
+            <a:r>
+              <a:rPr lang="fr-CH" dirty="0"/>
+              <a:t>1) Complète (</a:t>
+            </a:r>
+            <a:r>
+              <a:rPr lang="fr-CH" dirty="0" err="1"/>
+              <a:t>seed</a:t>
+            </a:r>
+            <a:r>
+              <a:rPr lang="fr-CH" dirty="0"/>
+              <a:t>, fct, select)</a:t>
+            </a:r>
+          </a:p>
+          <a:p>
+            <a:pPr lvl="1"/>
+            <a:endParaRPr lang="fr-CH" dirty="0"/>
+          </a:p>
+          <a:p>
+            <a:pPr lvl="1"/>
+            <a:r>
+              <a:rPr lang="fr-CH" dirty="0"/>
+              <a:t>2) </a:t>
+            </a:r>
+            <a:r>
+              <a:rPr lang="fr-CH" dirty="0" err="1"/>
+              <a:t>Seed</a:t>
+            </a:r>
+            <a:r>
+              <a:rPr lang="fr-CH" dirty="0"/>
+              <a:t> sans Select</a:t>
+            </a:r>
+          </a:p>
+          <a:p>
+            <a:pPr lvl="1"/>
+            <a:endParaRPr lang="fr-CH" dirty="0"/>
+          </a:p>
+          <a:p>
+            <a:pPr lvl="1"/>
+            <a:r>
+              <a:rPr lang="fr-CH" sz="2000" b="1" dirty="0"/>
+              <a:t>3) Ni </a:t>
+            </a:r>
+            <a:r>
+              <a:rPr lang="fr-CH" sz="2000" b="1" dirty="0" err="1"/>
+              <a:t>Seed</a:t>
+            </a:r>
+            <a:r>
+              <a:rPr lang="fr-CH" sz="2000" b="1" dirty="0"/>
+              <a:t>, ni Select (seul. fct)</a:t>
+            </a:r>
+          </a:p>
+          <a:p>
+            <a:pPr lvl="1"/>
+            <a:endParaRPr lang="fr-CH" sz="2000" b="1" dirty="0"/>
+          </a:p>
+          <a:p>
+            <a:endParaRPr lang="fr-CH" sz="2200" b="1" dirty="0"/>
+          </a:p>
+          <a:p>
+            <a:r>
+              <a:rPr lang="fr-CH" sz="2200" b="1" dirty="0"/>
+              <a:t>Il y a donc toujours la fonction d'agrégation !</a:t>
+            </a:r>
+          </a:p>
+        </p:txBody>
+      </p:sp>
+      <p:pic>
+        <p:nvPicPr>
+          <p:cNvPr id="5" name="Image 4">
+            <a:extLst>
+              <a:ext uri="{FF2B5EF4-FFF2-40B4-BE49-F238E27FC236}">
+                <a16:creationId xmlns:a16="http://schemas.microsoft.com/office/drawing/2014/main" id="{2B5269F3-4B3B-32F9-A3E6-BE595F127FBD}"/>
+              </a:ext>
+            </a:extLst>
+          </p:cNvPr>
+          <p:cNvPicPr>
+            <a:picLocks noChangeAspect="1"/>
+          </p:cNvPicPr>
+          <p:nvPr/>
+        </p:nvPicPr>
+        <p:blipFill>
+          <a:blip r:embed="rId2"/>
+          <a:stretch>
+            <a:fillRect/>
+          </a:stretch>
+        </p:blipFill>
+        <p:spPr>
+          <a:xfrm>
+            <a:off x="6966750" y="2130925"/>
+            <a:ext cx="4690678" cy="4019789"/>
+          </a:xfrm>
+          <a:prstGeom prst="rect">
+            <a:avLst/>
+          </a:prstGeom>
+        </p:spPr>
+      </p:pic>
+      <p:cxnSp>
+        <p:nvCxnSpPr>
+          <p:cNvPr id="7" name="Connecteur droit avec flèche 6">
+            <a:extLst>
+              <a:ext uri="{FF2B5EF4-FFF2-40B4-BE49-F238E27FC236}">
+                <a16:creationId xmlns:a16="http://schemas.microsoft.com/office/drawing/2014/main" id="{291AD664-EDF6-6B50-F0D3-A62A43372A08}"/>
+              </a:ext>
+            </a:extLst>
+          </p:cNvPr>
+          <p:cNvCxnSpPr>
+            <a:cxnSpLocks/>
+          </p:cNvCxnSpPr>
+          <p:nvPr/>
+        </p:nvCxnSpPr>
+        <p:spPr>
+          <a:xfrm>
+            <a:off x="5022166" y="4935644"/>
+            <a:ext cx="1944584" cy="663298"/>
+          </a:xfrm>
+          <a:prstGeom prst="straightConnector1">
+            <a:avLst/>
+          </a:prstGeom>
+          <a:ln w="57150">
+            <a:solidFill>
+              <a:schemeClr val="accent1"/>
+            </a:solidFill>
+            <a:tailEnd type="triangle"/>
+          </a:ln>
+        </p:spPr>
+        <p:style>
+          <a:lnRef idx="1">
+            <a:schemeClr val="accent1"/>
+          </a:lnRef>
+          <a:fillRef idx="0">
+            <a:schemeClr val="accent1"/>
+          </a:fillRef>
+          <a:effectRef idx="0">
+            <a:schemeClr val="accent1"/>
+          </a:effectRef>
+          <a:fontRef idx="minor">
+            <a:schemeClr val="tx1"/>
+          </a:fontRef>
+        </p:style>
+      </p:cxnSp>
+      <p:cxnSp>
+        <p:nvCxnSpPr>
+          <p:cNvPr id="8" name="Connecteur droit avec flèche 7">
+            <a:extLst>
+              <a:ext uri="{FF2B5EF4-FFF2-40B4-BE49-F238E27FC236}">
+                <a16:creationId xmlns:a16="http://schemas.microsoft.com/office/drawing/2014/main" id="{C338AA77-4B0A-C681-8352-BF03A6CDE6FA}"/>
+              </a:ext>
+            </a:extLst>
+          </p:cNvPr>
+          <p:cNvCxnSpPr>
+            <a:cxnSpLocks/>
+          </p:cNvCxnSpPr>
+          <p:nvPr/>
+        </p:nvCxnSpPr>
+        <p:spPr>
+          <a:xfrm>
+            <a:off x="3467686" y="4016326"/>
+            <a:ext cx="3499064" cy="341129"/>
+          </a:xfrm>
+          <a:prstGeom prst="straightConnector1">
+            <a:avLst/>
+          </a:prstGeom>
+          <a:ln w="57150">
+            <a:solidFill>
+              <a:schemeClr val="accent1"/>
+            </a:solidFill>
+            <a:tailEnd type="triangle"/>
+          </a:ln>
+        </p:spPr>
+        <p:style>
+          <a:lnRef idx="1">
+            <a:schemeClr val="accent1"/>
+          </a:lnRef>
+          <a:fillRef idx="0">
+            <a:schemeClr val="accent1"/>
+          </a:fillRef>
+          <a:effectRef idx="0">
+            <a:schemeClr val="accent1"/>
+          </a:effectRef>
+          <a:fontRef idx="minor">
+            <a:schemeClr val="tx1"/>
+          </a:fontRef>
+        </p:style>
+      </p:cxnSp>
+      <p:cxnSp>
+        <p:nvCxnSpPr>
+          <p:cNvPr id="10" name="Connecteur droit avec flèche 9">
+            <a:extLst>
+              <a:ext uri="{FF2B5EF4-FFF2-40B4-BE49-F238E27FC236}">
+                <a16:creationId xmlns:a16="http://schemas.microsoft.com/office/drawing/2014/main" id="{70FBB819-7260-BBA5-C308-BCFFD42194D5}"/>
+              </a:ext>
+            </a:extLst>
+          </p:cNvPr>
+          <p:cNvCxnSpPr>
+            <a:cxnSpLocks/>
+          </p:cNvCxnSpPr>
+          <p:nvPr/>
+        </p:nvCxnSpPr>
+        <p:spPr>
+          <a:xfrm flipV="1">
+            <a:off x="4529797" y="2926080"/>
+            <a:ext cx="2581421" cy="295422"/>
+          </a:xfrm>
+          <a:prstGeom prst="straightConnector1">
+            <a:avLst/>
+          </a:prstGeom>
+          <a:ln w="57150">
+            <a:solidFill>
+              <a:schemeClr val="accent1"/>
+            </a:solidFill>
+            <a:tailEnd type="triangle"/>
+          </a:ln>
+        </p:spPr>
+        <p:style>
+          <a:lnRef idx="1">
+            <a:schemeClr val="accent1"/>
+          </a:lnRef>
+          <a:fillRef idx="0">
+            <a:schemeClr val="accent1"/>
+          </a:fillRef>
+          <a:effectRef idx="0">
+            <a:schemeClr val="accent1"/>
+          </a:effectRef>
+          <a:fontRef idx="minor">
+            <a:schemeClr val="tx1"/>
+          </a:fontRef>
+        </p:style>
+      </p:cxnSp>
+    </p:spTree>
+    <p:extLst>
+      <p:ext uri="{BB962C8B-B14F-4D97-AF65-F5344CB8AC3E}">
+        <p14:creationId xmlns:p14="http://schemas.microsoft.com/office/powerpoint/2010/main" val="3411081206"/>
+      </p:ext>
+    </p:extLst>
+  </p:cSld>
+  <p:clrMapOvr>
+    <a:masterClrMapping/>
+  </p:clrMapOvr>
+  <p:timing>
+    <p:tnLst>
+      <p:par>
+        <p:cTn id="1" dur="indefinite" restart="never" nodeType="tmRoot">
+          <p:childTnLst>
+            <p:seq concurrent="1" nextAc="seek">
+              <p:cTn id="2" dur="indefinite" nodeType="mainSeq">
+                <p:childTnLst>
+                  <p:par>
+                    <p:cTn id="3" fill="hold">
+                      <p:stCondLst>
+                        <p:cond delay="indefinite"/>
+                      </p:stCondLst>
+                      <p:childTnLst>
+                        <p:par>
+                          <p:cTn id="4" fill="hold">
+                            <p:stCondLst>
+                              <p:cond delay="0"/>
+                            </p:stCondLst>
+                            <p:childTnLst>
+                              <p:par>
+                                <p:cTn id="5" presetID="1" presetClass="entr" presetSubtype="0" fill="hold" nodeType="clickEffect">
+                                  <p:stCondLst>
+                                    <p:cond delay="0"/>
+                                  </p:stCondLst>
+                                  <p:childTnLst>
+                                    <p:set>
+                                      <p:cBhvr>
+                                        <p:cTn id="6" dur="1" fill="hold">
+                                          <p:stCondLst>
+                                            <p:cond delay="0"/>
+                                          </p:stCondLst>
+                                        </p:cTn>
+                                        <p:tgtEl>
+                                          <p:spTgt spid="3">
+                                            <p:txEl>
+                                              <p:pRg st="2" end="2"/>
+                                            </p:txEl>
+                                          </p:spTgt>
+                                        </p:tgtEl>
+                                        <p:attrNameLst>
+                                          <p:attrName>style.visibility</p:attrName>
+                                        </p:attrNameLst>
+                                      </p:cBhvr>
+                                      <p:to>
+                                        <p:strVal val="visible"/>
+                                      </p:to>
+                                    </p:set>
+                                  </p:childTnLst>
+                                </p:cTn>
+                              </p:par>
+                            </p:childTnLst>
+                          </p:cTn>
+                        </p:par>
+                        <p:par>
+                          <p:cTn id="7" fill="hold">
+                            <p:stCondLst>
+                              <p:cond delay="0"/>
+                            </p:stCondLst>
+                            <p:childTnLst>
+                              <p:par>
+                                <p:cTn id="8" presetID="22" presetClass="entr" presetSubtype="8" fill="hold" nodeType="afterEffect">
+                                  <p:stCondLst>
+                                    <p:cond delay="0"/>
+                                  </p:stCondLst>
+                                  <p:childTnLst>
+                                    <p:set>
+                                      <p:cBhvr>
+                                        <p:cTn id="9" dur="1" fill="hold">
+                                          <p:stCondLst>
+                                            <p:cond delay="0"/>
+                                          </p:stCondLst>
+                                        </p:cTn>
+                                        <p:tgtEl>
+                                          <p:spTgt spid="10"/>
+                                        </p:tgtEl>
+                                        <p:attrNameLst>
+                                          <p:attrName>style.visibility</p:attrName>
+                                        </p:attrNameLst>
+                                      </p:cBhvr>
+                                      <p:to>
+                                        <p:strVal val="visible"/>
+                                      </p:to>
+                                    </p:set>
+                                    <p:animEffect transition="in" filter="wipe(left)">
+                                      <p:cBhvr>
+                                        <p:cTn id="10" dur="500"/>
+                                        <p:tgtEl>
+                                          <p:spTgt spid="10"/>
+                                        </p:tgtEl>
+                                      </p:cBhvr>
+                                    </p:animEffect>
+                                  </p:childTnLst>
+                                </p:cTn>
+                              </p:par>
+                            </p:childTnLst>
+                          </p:cTn>
+                        </p:par>
+                      </p:childTnLst>
+                    </p:cTn>
+                  </p:par>
+                  <p:par>
+                    <p:cTn id="11" fill="hold">
+                      <p:stCondLst>
+                        <p:cond delay="indefinite"/>
+                      </p:stCondLst>
+                      <p:childTnLst>
+                        <p:par>
+                          <p:cTn id="12" fill="hold">
+                            <p:stCondLst>
+                              <p:cond delay="0"/>
+                            </p:stCondLst>
+                            <p:childTnLst>
+                              <p:par>
+                                <p:cTn id="13" presetID="1" presetClass="entr" presetSubtype="0" fill="hold" nodeType="clickEffect">
+                                  <p:stCondLst>
+                                    <p:cond delay="0"/>
+                                  </p:stCondLst>
+                                  <p:childTnLst>
+                                    <p:set>
+                                      <p:cBhvr>
+                                        <p:cTn id="14" dur="1" fill="hold">
+                                          <p:stCondLst>
+                                            <p:cond delay="0"/>
+                                          </p:stCondLst>
+                                        </p:cTn>
+                                        <p:tgtEl>
+                                          <p:spTgt spid="3">
+                                            <p:txEl>
+                                              <p:pRg st="4" end="4"/>
+                                            </p:txEl>
+                                          </p:spTgt>
+                                        </p:tgtEl>
+                                        <p:attrNameLst>
+                                          <p:attrName>style.visibility</p:attrName>
+                                        </p:attrNameLst>
+                                      </p:cBhvr>
+                                      <p:to>
+                                        <p:strVal val="visible"/>
+                                      </p:to>
+                                    </p:set>
+                                  </p:childTnLst>
+                                </p:cTn>
+                              </p:par>
+                            </p:childTnLst>
+                          </p:cTn>
+                        </p:par>
+                        <p:par>
+                          <p:cTn id="15" fill="hold">
+                            <p:stCondLst>
+                              <p:cond delay="0"/>
+                            </p:stCondLst>
+                            <p:childTnLst>
+                              <p:par>
+                                <p:cTn id="16" presetID="22" presetClass="entr" presetSubtype="8" fill="hold" nodeType="afterEffect">
+                                  <p:stCondLst>
+                                    <p:cond delay="0"/>
+                                  </p:stCondLst>
+                                  <p:childTnLst>
+                                    <p:set>
+                                      <p:cBhvr>
+                                        <p:cTn id="17" dur="1" fill="hold">
+                                          <p:stCondLst>
+                                            <p:cond delay="0"/>
+                                          </p:stCondLst>
+                                        </p:cTn>
+                                        <p:tgtEl>
+                                          <p:spTgt spid="8"/>
+                                        </p:tgtEl>
+                                        <p:attrNameLst>
+                                          <p:attrName>style.visibility</p:attrName>
+                                        </p:attrNameLst>
+                                      </p:cBhvr>
+                                      <p:to>
+                                        <p:strVal val="visible"/>
+                                      </p:to>
+                                    </p:set>
+                                    <p:animEffect transition="in" filter="wipe(left)">
+                                      <p:cBhvr>
+                                        <p:cTn id="18" dur="500"/>
+                                        <p:tgtEl>
+                                          <p:spTgt spid="8"/>
+                                        </p:tgtEl>
+                                      </p:cBhvr>
+                                    </p:animEffect>
+                                  </p:childTnLst>
+                                </p:cTn>
+                              </p:par>
+                            </p:childTnLst>
+                          </p:cTn>
+                        </p:par>
+                      </p:childTnLst>
+                    </p:cTn>
+                  </p:par>
+                  <p:par>
+                    <p:cTn id="19" fill="hold">
+                      <p:stCondLst>
+                        <p:cond delay="indefinite"/>
+                      </p:stCondLst>
+                      <p:childTnLst>
+                        <p:par>
+                          <p:cTn id="20" fill="hold">
+                            <p:stCondLst>
+                              <p:cond delay="0"/>
+                            </p:stCondLst>
+                            <p:childTnLst>
+                              <p:par>
+                                <p:cTn id="21" presetID="1" presetClass="entr" presetSubtype="0" fill="hold" nodeType="clickEffect">
+                                  <p:stCondLst>
+                                    <p:cond delay="0"/>
+                                  </p:stCondLst>
+                                  <p:childTnLst>
+                                    <p:set>
+                                      <p:cBhvr>
+                                        <p:cTn id="22" dur="1" fill="hold">
+                                          <p:stCondLst>
+                                            <p:cond delay="0"/>
+                                          </p:stCondLst>
+                                        </p:cTn>
+                                        <p:tgtEl>
+                                          <p:spTgt spid="3">
+                                            <p:txEl>
+                                              <p:pRg st="6" end="6"/>
+                                            </p:txEl>
+                                          </p:spTgt>
+                                        </p:tgtEl>
+                                        <p:attrNameLst>
+                                          <p:attrName>style.visibility</p:attrName>
+                                        </p:attrNameLst>
+                                      </p:cBhvr>
+                                      <p:to>
+                                        <p:strVal val="visible"/>
+                                      </p:to>
+                                    </p:set>
+                                  </p:childTnLst>
+                                </p:cTn>
+                              </p:par>
+                            </p:childTnLst>
+                          </p:cTn>
+                        </p:par>
+                        <p:par>
+                          <p:cTn id="23" fill="hold">
+                            <p:stCondLst>
+                              <p:cond delay="0"/>
+                            </p:stCondLst>
+                            <p:childTnLst>
+                              <p:par>
+                                <p:cTn id="24" presetID="22" presetClass="entr" presetSubtype="8" fill="hold" nodeType="afterEffect">
+                                  <p:stCondLst>
+                                    <p:cond delay="0"/>
+                                  </p:stCondLst>
+                                  <p:childTnLst>
+                                    <p:set>
+                                      <p:cBhvr>
+                                        <p:cTn id="25" dur="1" fill="hold">
+                                          <p:stCondLst>
+                                            <p:cond delay="0"/>
+                                          </p:stCondLst>
+                                        </p:cTn>
+                                        <p:tgtEl>
+                                          <p:spTgt spid="7"/>
+                                        </p:tgtEl>
+                                        <p:attrNameLst>
+                                          <p:attrName>style.visibility</p:attrName>
+                                        </p:attrNameLst>
+                                      </p:cBhvr>
+                                      <p:to>
+                                        <p:strVal val="visible"/>
+                                      </p:to>
+                                    </p:set>
+                                    <p:animEffect transition="in" filter="wipe(left)">
+                                      <p:cBhvr>
+                                        <p:cTn id="26" dur="500"/>
+                                        <p:tgtEl>
+                                          <p:spTgt spid="7"/>
+                                        </p:tgtEl>
+                                      </p:cBhvr>
+                                    </p:animEffect>
+                                  </p:childTnLst>
+                                </p:cTn>
+                              </p:par>
+                            </p:childTnLst>
+                          </p:cTn>
+                        </p:par>
+                      </p:childTnLst>
+                    </p:cTn>
+                  </p:par>
+                  <p:par>
+                    <p:cTn id="27" fill="hold">
+                      <p:stCondLst>
+                        <p:cond delay="indefinite"/>
+                      </p:stCondLst>
+                      <p:childTnLst>
+                        <p:par>
+                          <p:cTn id="28" fill="hold">
+                            <p:stCondLst>
+                              <p:cond delay="0"/>
+                            </p:stCondLst>
+                            <p:childTnLst>
+                              <p:par>
+                                <p:cTn id="29" presetID="1" presetClass="entr" presetSubtype="0" fill="hold" nodeType="clickEffect">
+                                  <p:stCondLst>
+                                    <p:cond delay="0"/>
+                                  </p:stCondLst>
+                                  <p:childTnLst>
+                                    <p:set>
+                                      <p:cBhvr>
+                                        <p:cTn id="30" dur="1" fill="hold">
+                                          <p:stCondLst>
+                                            <p:cond delay="0"/>
+                                          </p:stCondLst>
+                                        </p:cTn>
+                                        <p:tgtEl>
+                                          <p:spTgt spid="3">
+                                            <p:txEl>
+                                              <p:pRg st="9" end="9"/>
+                                            </p:txEl>
+                                          </p:spTgt>
+                                        </p:tgtEl>
+                                        <p:attrNameLst>
+                                          <p:attrName>style.visibility</p:attrName>
+                                        </p:attrNameLst>
+                                      </p:cBhvr>
+                                      <p:to>
+                                        <p:strVal val="visible"/>
+                                      </p:to>
+                                    </p:set>
+                                  </p:childTnLst>
+                                </p:cTn>
+                              </p:par>
+                            </p:childTnLst>
+                          </p:cTn>
+                        </p:par>
+                      </p:childTnLst>
+                    </p:cTn>
+                  </p:par>
+                </p:childTnLst>
+              </p:cTn>
+              <p:prevCondLst>
+                <p:cond evt="onPrev" delay="0">
+                  <p:tgtEl>
+                    <p:sldTgt/>
+                  </p:tgtEl>
+                </p:cond>
+              </p:prevCondLst>
+              <p:nextCondLst>
+                <p:cond evt="onNext" delay="0">
+                  <p:tgtEl>
+                    <p:sldTgt/>
+                  </p:tgtEl>
+                </p:cond>
+              </p:nextCondLst>
+            </p:seq>
+          </p:childTnLst>
+        </p:cTn>
+      </p:par>
+    </p:tnLst>
+  </p:timing>
+</p:sld>
+</file>
+
+<file path=ppt/slides/slide8.xml><?xml version="1.0" encoding="utf-8"?>
 <p:sld xmlns:a="http://schemas.openxmlformats.org/drawingml/2006/main" xmlns:r="http://schemas.openxmlformats.org/officeDocument/2006/relationships" xmlns:p="http://schemas.openxmlformats.org/presentationml/2006/main">
   <p:cSld>
     <p:spTree>
@@ -14220,7 +14917,7 @@
 </p:sld>
 </file>
 
-<file path=ppt/slides/slide8.xml><?xml version="1.0" encoding="utf-8"?>
+<file path=ppt/slides/slide9.xml><?xml version="1.0" encoding="utf-8"?>
 <p:sld xmlns:a="http://schemas.openxmlformats.org/drawingml/2006/main" xmlns:r="http://schemas.openxmlformats.org/officeDocument/2006/relationships" xmlns:p="http://schemas.openxmlformats.org/presentationml/2006/main">
   <p:cSld>
     <p:spTree>

</xml_diff>

<commit_message>
feat(reduce ppt): added a trial of metaphore...
</commit_message>
<xml_diff>
--- a/supports/source/03-Reduce.pptx
+++ b/supports/source/03-Reduce.pptx
@@ -6,14 +6,15 @@
   </p:sldMasterIdLst>
   <p:sldIdLst>
     <p:sldId id="256" r:id="rId2"/>
-    <p:sldId id="262" r:id="rId3"/>
-    <p:sldId id="264" r:id="rId4"/>
-    <p:sldId id="263" r:id="rId5"/>
-    <p:sldId id="265" r:id="rId6"/>
-    <p:sldId id="266" r:id="rId7"/>
-    <p:sldId id="269" r:id="rId8"/>
-    <p:sldId id="267" r:id="rId9"/>
-    <p:sldId id="268" r:id="rId10"/>
+    <p:sldId id="270" r:id="rId3"/>
+    <p:sldId id="262" r:id="rId4"/>
+    <p:sldId id="264" r:id="rId5"/>
+    <p:sldId id="263" r:id="rId6"/>
+    <p:sldId id="265" r:id="rId7"/>
+    <p:sldId id="266" r:id="rId8"/>
+    <p:sldId id="269" r:id="rId9"/>
+    <p:sldId id="267" r:id="rId10"/>
+    <p:sldId id="268" r:id="rId11"/>
   </p:sldIdLst>
   <p:sldSz cx="12192000" cy="6858000"/>
   <p:notesSz cx="6858000" cy="9144000"/>
@@ -6151,7 +6152,2126 @@
 </p:sld>
 </file>
 
+<file path=ppt/slides/slide10.xml><?xml version="1.0" encoding="utf-8"?>
+<p:sld xmlns:a="http://schemas.openxmlformats.org/drawingml/2006/main" xmlns:r="http://schemas.openxmlformats.org/officeDocument/2006/relationships" xmlns:p="http://schemas.openxmlformats.org/presentationml/2006/main">
+  <p:cSld>
+    <p:spTree>
+      <p:nvGrpSpPr>
+        <p:cNvPr id="1" name=""/>
+        <p:cNvGrpSpPr/>
+        <p:nvPr/>
+      </p:nvGrpSpPr>
+      <p:grpSpPr>
+        <a:xfrm>
+          <a:off x="0" y="0"/>
+          <a:ext cx="0" cy="0"/>
+          <a:chOff x="0" y="0"/>
+          <a:chExt cx="0" cy="0"/>
+        </a:xfrm>
+      </p:grpSpPr>
+      <p:graphicFrame>
+        <p:nvGraphicFramePr>
+          <p:cNvPr id="24" name="Espace réservé du contenu 4">
+            <a:extLst>
+              <a:ext uri="{FF2B5EF4-FFF2-40B4-BE49-F238E27FC236}">
+                <a16:creationId xmlns:a16="http://schemas.microsoft.com/office/drawing/2014/main" id="{357BBBFA-973E-7D7A-C825-307F2E6E0534}"/>
+              </a:ext>
+            </a:extLst>
+          </p:cNvPr>
+          <p:cNvGraphicFramePr>
+            <a:graphicFrameLocks/>
+          </p:cNvGraphicFramePr>
+          <p:nvPr>
+            <p:extLst>
+              <p:ext uri="{D42A27DB-BD31-4B8C-83A1-F6EECF244321}">
+                <p14:modId xmlns:p14="http://schemas.microsoft.com/office/powerpoint/2010/main" val="2561872616"/>
+              </p:ext>
+            </p:extLst>
+          </p:nvPr>
+        </p:nvGraphicFramePr>
+        <p:xfrm>
+          <a:off x="913795" y="3123279"/>
+          <a:ext cx="8282940" cy="365760"/>
+        </p:xfrm>
+        <a:graphic>
+          <a:graphicData uri="http://schemas.openxmlformats.org/drawingml/2006/table">
+            <a:tbl>
+              <a:tblPr firstRow="1" bandRow="1">
+                <a:tableStyleId>{5C22544A-7EE6-4342-B048-85BDC9FD1C3A}</a:tableStyleId>
+              </a:tblPr>
+              <a:tblGrid>
+                <a:gridCol w="2070735">
+                  <a:extLst>
+                    <a:ext uri="{9D8B030D-6E8A-4147-A177-3AD203B41FA5}">
+                      <a16:colId xmlns:a16="http://schemas.microsoft.com/office/drawing/2014/main" val="3672638309"/>
+                    </a:ext>
+                  </a:extLst>
+                </a:gridCol>
+                <a:gridCol w="2070735">
+                  <a:extLst>
+                    <a:ext uri="{9D8B030D-6E8A-4147-A177-3AD203B41FA5}">
+                      <a16:colId xmlns:a16="http://schemas.microsoft.com/office/drawing/2014/main" val="1521242616"/>
+                    </a:ext>
+                  </a:extLst>
+                </a:gridCol>
+                <a:gridCol w="2070735">
+                  <a:extLst>
+                    <a:ext uri="{9D8B030D-6E8A-4147-A177-3AD203B41FA5}">
+                      <a16:colId xmlns:a16="http://schemas.microsoft.com/office/drawing/2014/main" val="2021167606"/>
+                    </a:ext>
+                  </a:extLst>
+                </a:gridCol>
+                <a:gridCol w="2070735">
+                  <a:extLst>
+                    <a:ext uri="{9D8B030D-6E8A-4147-A177-3AD203B41FA5}">
+                      <a16:colId xmlns:a16="http://schemas.microsoft.com/office/drawing/2014/main" val="747972660"/>
+                    </a:ext>
+                  </a:extLst>
+                </a:gridCol>
+              </a:tblGrid>
+              <a:tr h="0">
+                <a:tc>
+                  <a:txBody>
+                    <a:bodyPr/>
+                    <a:lstStyle/>
+                    <a:p>
+                      <a:r>
+                        <a:rPr lang="fr-CH" dirty="0">
+                          <a:solidFill>
+                            <a:schemeClr val="accent4">
+                              <a:lumMod val="75000"/>
+                            </a:schemeClr>
+                          </a:solidFill>
+                        </a:rPr>
+                        <a:t>1</a:t>
+                      </a:r>
+                    </a:p>
+                  </a:txBody>
+                  <a:tcPr/>
+                </a:tc>
+                <a:tc>
+                  <a:txBody>
+                    <a:bodyPr/>
+                    <a:lstStyle/>
+                    <a:p>
+                      <a:r>
+                        <a:rPr lang="fr-CH" dirty="0"/>
+                        <a:t>             </a:t>
+                      </a:r>
+                      <a:r>
+                        <a:rPr lang="fr-CH" dirty="0">
+                          <a:solidFill>
+                            <a:schemeClr val="accent4">
+                              <a:lumMod val="75000"/>
+                            </a:schemeClr>
+                          </a:solidFill>
+                        </a:rPr>
+                        <a:t>2</a:t>
+                      </a:r>
+                    </a:p>
+                  </a:txBody>
+                  <a:tcPr/>
+                </a:tc>
+                <a:tc>
+                  <a:txBody>
+                    <a:bodyPr/>
+                    <a:lstStyle/>
+                    <a:p>
+                      <a:r>
+                        <a:rPr lang="fr-CH" dirty="0"/>
+                        <a:t>3</a:t>
+                      </a:r>
+                    </a:p>
+                  </a:txBody>
+                  <a:tcPr/>
+                </a:tc>
+                <a:tc>
+                  <a:txBody>
+                    <a:bodyPr/>
+                    <a:lstStyle/>
+                    <a:p>
+                      <a:r>
+                        <a:rPr lang="fr-CH" dirty="0"/>
+                        <a:t>4</a:t>
+                      </a:r>
+                    </a:p>
+                  </a:txBody>
+                  <a:tcPr/>
+                </a:tc>
+                <a:extLst>
+                  <a:ext uri="{0D108BD9-81ED-4DB2-BD59-A6C34878D82A}">
+                    <a16:rowId xmlns:a16="http://schemas.microsoft.com/office/drawing/2014/main" val="1834647396"/>
+                  </a:ext>
+                </a:extLst>
+              </a:tr>
+            </a:tbl>
+          </a:graphicData>
+        </a:graphic>
+      </p:graphicFrame>
+      <p:sp>
+        <p:nvSpPr>
+          <p:cNvPr id="2" name="Titre 1">
+            <a:extLst>
+              <a:ext uri="{FF2B5EF4-FFF2-40B4-BE49-F238E27FC236}">
+                <a16:creationId xmlns:a16="http://schemas.microsoft.com/office/drawing/2014/main" id="{671EA78D-57E6-1D57-9C55-684EEE4CB2F5}"/>
+              </a:ext>
+            </a:extLst>
+          </p:cNvPr>
+          <p:cNvSpPr>
+            <a:spLocks noGrp="1"/>
+          </p:cNvSpPr>
+          <p:nvPr>
+            <p:ph type="title"/>
+          </p:nvPr>
+        </p:nvSpPr>
+        <p:spPr/>
+        <p:txBody>
+          <a:bodyPr/>
+          <a:lstStyle/>
+          <a:p>
+            <a:r>
+              <a:rPr lang="fr-CH" dirty="0"/>
+              <a:t>Déroulement visuel de l'agrégation</a:t>
+            </a:r>
+          </a:p>
+        </p:txBody>
+      </p:sp>
+      <p:graphicFrame>
+        <p:nvGraphicFramePr>
+          <p:cNvPr id="5" name="Espace réservé du contenu 4">
+            <a:extLst>
+              <a:ext uri="{FF2B5EF4-FFF2-40B4-BE49-F238E27FC236}">
+                <a16:creationId xmlns:a16="http://schemas.microsoft.com/office/drawing/2014/main" id="{A92B5457-7066-9E43-B825-46190B6C6A31}"/>
+              </a:ext>
+            </a:extLst>
+          </p:cNvPr>
+          <p:cNvGraphicFramePr>
+            <a:graphicFrameLocks noGrp="1"/>
+          </p:cNvGraphicFramePr>
+          <p:nvPr>
+            <p:ph idx="1"/>
+            <p:extLst>
+              <p:ext uri="{D42A27DB-BD31-4B8C-83A1-F6EECF244321}">
+                <p14:modId xmlns:p14="http://schemas.microsoft.com/office/powerpoint/2010/main" val="3299108202"/>
+              </p:ext>
+            </p:extLst>
+          </p:nvPr>
+        </p:nvGraphicFramePr>
+        <p:xfrm>
+          <a:off x="914400" y="2095500"/>
+          <a:ext cx="10353675" cy="365760"/>
+        </p:xfrm>
+        <a:graphic>
+          <a:graphicData uri="http://schemas.openxmlformats.org/drawingml/2006/table">
+            <a:tbl>
+              <a:tblPr firstRow="1" bandRow="1">
+                <a:tableStyleId>{5C22544A-7EE6-4342-B048-85BDC9FD1C3A}</a:tableStyleId>
+              </a:tblPr>
+              <a:tblGrid>
+                <a:gridCol w="2070735">
+                  <a:extLst>
+                    <a:ext uri="{9D8B030D-6E8A-4147-A177-3AD203B41FA5}">
+                      <a16:colId xmlns:a16="http://schemas.microsoft.com/office/drawing/2014/main" val="3672638309"/>
+                    </a:ext>
+                  </a:extLst>
+                </a:gridCol>
+                <a:gridCol w="2070735">
+                  <a:extLst>
+                    <a:ext uri="{9D8B030D-6E8A-4147-A177-3AD203B41FA5}">
+                      <a16:colId xmlns:a16="http://schemas.microsoft.com/office/drawing/2014/main" val="1521242616"/>
+                    </a:ext>
+                  </a:extLst>
+                </a:gridCol>
+                <a:gridCol w="2070735">
+                  <a:extLst>
+                    <a:ext uri="{9D8B030D-6E8A-4147-A177-3AD203B41FA5}">
+                      <a16:colId xmlns:a16="http://schemas.microsoft.com/office/drawing/2014/main" val="2021167606"/>
+                    </a:ext>
+                  </a:extLst>
+                </a:gridCol>
+                <a:gridCol w="2070735">
+                  <a:extLst>
+                    <a:ext uri="{9D8B030D-6E8A-4147-A177-3AD203B41FA5}">
+                      <a16:colId xmlns:a16="http://schemas.microsoft.com/office/drawing/2014/main" val="747972660"/>
+                    </a:ext>
+                  </a:extLst>
+                </a:gridCol>
+                <a:gridCol w="2070735">
+                  <a:extLst>
+                    <a:ext uri="{9D8B030D-6E8A-4147-A177-3AD203B41FA5}">
+                      <a16:colId xmlns:a16="http://schemas.microsoft.com/office/drawing/2014/main" val="3190894397"/>
+                    </a:ext>
+                  </a:extLst>
+                </a:gridCol>
+              </a:tblGrid>
+              <a:tr h="0">
+                <a:tc>
+                  <a:txBody>
+                    <a:bodyPr/>
+                    <a:lstStyle/>
+                    <a:p>
+                      <a:r>
+                        <a:rPr lang="fr-CH" dirty="0">
+                          <a:solidFill>
+                            <a:schemeClr val="accent4">
+                              <a:lumMod val="75000"/>
+                            </a:schemeClr>
+                          </a:solidFill>
+                        </a:rPr>
+                        <a:t>0 (</a:t>
+                      </a:r>
+                      <a:r>
+                        <a:rPr lang="fr-CH" dirty="0" err="1">
+                          <a:solidFill>
+                            <a:schemeClr val="accent4">
+                              <a:lumMod val="75000"/>
+                            </a:schemeClr>
+                          </a:solidFill>
+                        </a:rPr>
+                        <a:t>seed</a:t>
+                      </a:r>
+                      <a:r>
+                        <a:rPr lang="fr-CH" dirty="0">
+                          <a:solidFill>
+                            <a:schemeClr val="accent4">
+                              <a:lumMod val="75000"/>
+                            </a:schemeClr>
+                          </a:solidFill>
+                        </a:rPr>
+                        <a:t>)</a:t>
+                      </a:r>
+                    </a:p>
+                  </a:txBody>
+                  <a:tcPr/>
+                </a:tc>
+                <a:tc>
+                  <a:txBody>
+                    <a:bodyPr/>
+                    <a:lstStyle/>
+                    <a:p>
+                      <a:r>
+                        <a:rPr lang="fr-CH" dirty="0"/>
+                        <a:t>              </a:t>
+                      </a:r>
+                      <a:r>
+                        <a:rPr lang="fr-CH" dirty="0">
+                          <a:solidFill>
+                            <a:schemeClr val="accent4">
+                              <a:lumMod val="75000"/>
+                            </a:schemeClr>
+                          </a:solidFill>
+                        </a:rPr>
+                        <a:t>1</a:t>
+                      </a:r>
+                    </a:p>
+                  </a:txBody>
+                  <a:tcPr/>
+                </a:tc>
+                <a:tc>
+                  <a:txBody>
+                    <a:bodyPr/>
+                    <a:lstStyle/>
+                    <a:p>
+                      <a:r>
+                        <a:rPr lang="fr-CH" dirty="0"/>
+                        <a:t>2</a:t>
+                      </a:r>
+                    </a:p>
+                  </a:txBody>
+                  <a:tcPr/>
+                </a:tc>
+                <a:tc>
+                  <a:txBody>
+                    <a:bodyPr/>
+                    <a:lstStyle/>
+                    <a:p>
+                      <a:r>
+                        <a:rPr lang="fr-CH" dirty="0"/>
+                        <a:t>3</a:t>
+                      </a:r>
+                    </a:p>
+                  </a:txBody>
+                  <a:tcPr/>
+                </a:tc>
+                <a:tc>
+                  <a:txBody>
+                    <a:bodyPr/>
+                    <a:lstStyle/>
+                    <a:p>
+                      <a:r>
+                        <a:rPr lang="fr-CH" dirty="0"/>
+                        <a:t>4</a:t>
+                      </a:r>
+                    </a:p>
+                  </a:txBody>
+                  <a:tcPr/>
+                </a:tc>
+                <a:extLst>
+                  <a:ext uri="{0D108BD9-81ED-4DB2-BD59-A6C34878D82A}">
+                    <a16:rowId xmlns:a16="http://schemas.microsoft.com/office/drawing/2014/main" val="1834647396"/>
+                  </a:ext>
+                </a:extLst>
+              </a:tr>
+            </a:tbl>
+          </a:graphicData>
+        </a:graphic>
+      </p:graphicFrame>
+      <p:sp>
+        <p:nvSpPr>
+          <p:cNvPr id="6" name="Rectangle 5">
+            <a:extLst>
+              <a:ext uri="{FF2B5EF4-FFF2-40B4-BE49-F238E27FC236}">
+                <a16:creationId xmlns:a16="http://schemas.microsoft.com/office/drawing/2014/main" id="{1260E5E2-38C9-2D85-5462-28916194936A}"/>
+              </a:ext>
+            </a:extLst>
+          </p:cNvPr>
+          <p:cNvSpPr/>
+          <p:nvPr/>
+        </p:nvSpPr>
+        <p:spPr>
+          <a:xfrm>
+            <a:off x="872529" y="2034141"/>
+            <a:ext cx="4107434" cy="502440"/>
+          </a:xfrm>
+          <a:prstGeom prst="rect">
+            <a:avLst/>
+          </a:prstGeom>
+          <a:noFill/>
+        </p:spPr>
+        <p:style>
+          <a:lnRef idx="2">
+            <a:schemeClr val="accent4"/>
+          </a:lnRef>
+          <a:fillRef idx="1">
+            <a:schemeClr val="lt1"/>
+          </a:fillRef>
+          <a:effectRef idx="0">
+            <a:schemeClr val="accent4"/>
+          </a:effectRef>
+          <a:fontRef idx="minor">
+            <a:schemeClr val="dk1"/>
+          </a:fontRef>
+        </p:style>
+        <p:txBody>
+          <a:bodyPr rtlCol="0" anchor="ctr"/>
+          <a:lstStyle/>
+          <a:p>
+            <a:pPr algn="ctr"/>
+            <a:endParaRPr lang="fr-CH"/>
+          </a:p>
+        </p:txBody>
+      </p:sp>
+      <p:cxnSp>
+        <p:nvCxnSpPr>
+          <p:cNvPr id="8" name="Connecteur droit avec flèche 7">
+            <a:extLst>
+              <a:ext uri="{FF2B5EF4-FFF2-40B4-BE49-F238E27FC236}">
+                <a16:creationId xmlns:a16="http://schemas.microsoft.com/office/drawing/2014/main" id="{A0F24DFA-E36D-1893-4763-513813FAA234}"/>
+              </a:ext>
+            </a:extLst>
+          </p:cNvPr>
+          <p:cNvCxnSpPr>
+            <a:cxnSpLocks/>
+          </p:cNvCxnSpPr>
+          <p:nvPr/>
+        </p:nvCxnSpPr>
+        <p:spPr>
+          <a:xfrm flipH="1">
+            <a:off x="1386660" y="2395821"/>
+            <a:ext cx="1515693" cy="802779"/>
+          </a:xfrm>
+          <a:prstGeom prst="straightConnector1">
+            <a:avLst/>
+          </a:prstGeom>
+          <a:ln w="57150">
+            <a:tailEnd type="triangle"/>
+          </a:ln>
+        </p:spPr>
+        <p:style>
+          <a:lnRef idx="1">
+            <a:schemeClr val="accent4"/>
+          </a:lnRef>
+          <a:fillRef idx="0">
+            <a:schemeClr val="accent4"/>
+          </a:fillRef>
+          <a:effectRef idx="0">
+            <a:schemeClr val="accent4"/>
+          </a:effectRef>
+          <a:fontRef idx="minor">
+            <a:schemeClr val="tx1"/>
+          </a:fontRef>
+        </p:style>
+      </p:cxnSp>
+      <p:sp>
+        <p:nvSpPr>
+          <p:cNvPr id="9" name="ZoneTexte 8">
+            <a:extLst>
+              <a:ext uri="{FF2B5EF4-FFF2-40B4-BE49-F238E27FC236}">
+                <a16:creationId xmlns:a16="http://schemas.microsoft.com/office/drawing/2014/main" id="{010A4AC0-D9EB-341C-3928-D115F202C061}"/>
+              </a:ext>
+            </a:extLst>
+          </p:cNvPr>
+          <p:cNvSpPr txBox="1"/>
+          <p:nvPr/>
+        </p:nvSpPr>
+        <p:spPr>
+          <a:xfrm>
+            <a:off x="2721050" y="1895331"/>
+            <a:ext cx="488609" cy="707886"/>
+          </a:xfrm>
+          <a:prstGeom prst="rect">
+            <a:avLst/>
+          </a:prstGeom>
+          <a:noFill/>
+        </p:spPr>
+        <p:txBody>
+          <a:bodyPr wrap="square" rtlCol="0">
+            <a:spAutoFit/>
+          </a:bodyPr>
+          <a:lstStyle/>
+          <a:p>
+            <a:r>
+              <a:rPr lang="fr-CH" sz="4000" b="1" dirty="0">
+                <a:solidFill>
+                  <a:schemeClr val="accent4"/>
+                </a:solidFill>
+              </a:rPr>
+              <a:t>+   </a:t>
+            </a:r>
+          </a:p>
+        </p:txBody>
+      </p:sp>
+      <p:cxnSp>
+        <p:nvCxnSpPr>
+          <p:cNvPr id="11" name="Connecteur droit avec flèche 10">
+            <a:extLst>
+              <a:ext uri="{FF2B5EF4-FFF2-40B4-BE49-F238E27FC236}">
+                <a16:creationId xmlns:a16="http://schemas.microsoft.com/office/drawing/2014/main" id="{03241B03-9B2D-6695-D6BA-453F66D84A11}"/>
+              </a:ext>
+            </a:extLst>
+          </p:cNvPr>
+          <p:cNvCxnSpPr>
+            <a:cxnSpLocks/>
+          </p:cNvCxnSpPr>
+          <p:nvPr/>
+        </p:nvCxnSpPr>
+        <p:spPr>
+          <a:xfrm flipH="1">
+            <a:off x="4019897" y="2395821"/>
+            <a:ext cx="1099244" cy="802779"/>
+          </a:xfrm>
+          <a:prstGeom prst="straightConnector1">
+            <a:avLst/>
+          </a:prstGeom>
+          <a:ln w="38100" cap="flat" cmpd="sng" algn="ctr">
+            <a:solidFill>
+              <a:schemeClr val="accent5"/>
+            </a:solidFill>
+            <a:prstDash val="dash"/>
+            <a:round/>
+            <a:headEnd type="none" w="med" len="med"/>
+            <a:tailEnd type="arrow" w="med" len="med"/>
+          </a:ln>
+        </p:spPr>
+        <p:style>
+          <a:lnRef idx="0">
+            <a:scrgbClr r="0" g="0" b="0"/>
+          </a:lnRef>
+          <a:fillRef idx="0">
+            <a:scrgbClr r="0" g="0" b="0"/>
+          </a:fillRef>
+          <a:effectRef idx="0">
+            <a:scrgbClr r="0" g="0" b="0"/>
+          </a:effectRef>
+          <a:fontRef idx="minor">
+            <a:schemeClr val="tx1"/>
+          </a:fontRef>
+        </p:style>
+      </p:cxnSp>
+      <p:graphicFrame>
+        <p:nvGraphicFramePr>
+          <p:cNvPr id="25" name="Espace réservé du contenu 4">
+            <a:extLst>
+              <a:ext uri="{FF2B5EF4-FFF2-40B4-BE49-F238E27FC236}">
+                <a16:creationId xmlns:a16="http://schemas.microsoft.com/office/drawing/2014/main" id="{F5EECA86-65A0-002B-B59D-A0FFEBAB8745}"/>
+              </a:ext>
+            </a:extLst>
+          </p:cNvPr>
+          <p:cNvGraphicFramePr>
+            <a:graphicFrameLocks/>
+          </p:cNvGraphicFramePr>
+          <p:nvPr>
+            <p:extLst>
+              <p:ext uri="{D42A27DB-BD31-4B8C-83A1-F6EECF244321}">
+                <p14:modId xmlns:p14="http://schemas.microsoft.com/office/powerpoint/2010/main" val="3976122456"/>
+              </p:ext>
+            </p:extLst>
+          </p:nvPr>
+        </p:nvGraphicFramePr>
+        <p:xfrm>
+          <a:off x="913794" y="4283028"/>
+          <a:ext cx="6212205" cy="365760"/>
+        </p:xfrm>
+        <a:graphic>
+          <a:graphicData uri="http://schemas.openxmlformats.org/drawingml/2006/table">
+            <a:tbl>
+              <a:tblPr firstRow="1" bandRow="1">
+                <a:tableStyleId>{5C22544A-7EE6-4342-B048-85BDC9FD1C3A}</a:tableStyleId>
+              </a:tblPr>
+              <a:tblGrid>
+                <a:gridCol w="2070735">
+                  <a:extLst>
+                    <a:ext uri="{9D8B030D-6E8A-4147-A177-3AD203B41FA5}">
+                      <a16:colId xmlns:a16="http://schemas.microsoft.com/office/drawing/2014/main" val="3672638309"/>
+                    </a:ext>
+                  </a:extLst>
+                </a:gridCol>
+                <a:gridCol w="2070735">
+                  <a:extLst>
+                    <a:ext uri="{9D8B030D-6E8A-4147-A177-3AD203B41FA5}">
+                      <a16:colId xmlns:a16="http://schemas.microsoft.com/office/drawing/2014/main" val="1521242616"/>
+                    </a:ext>
+                  </a:extLst>
+                </a:gridCol>
+                <a:gridCol w="2070735">
+                  <a:extLst>
+                    <a:ext uri="{9D8B030D-6E8A-4147-A177-3AD203B41FA5}">
+                      <a16:colId xmlns:a16="http://schemas.microsoft.com/office/drawing/2014/main" val="2021167606"/>
+                    </a:ext>
+                  </a:extLst>
+                </a:gridCol>
+              </a:tblGrid>
+              <a:tr h="0">
+                <a:tc>
+                  <a:txBody>
+                    <a:bodyPr/>
+                    <a:lstStyle/>
+                    <a:p>
+                      <a:r>
+                        <a:rPr lang="fr-CH" dirty="0">
+                          <a:solidFill>
+                            <a:schemeClr val="accent4">
+                              <a:lumMod val="75000"/>
+                            </a:schemeClr>
+                          </a:solidFill>
+                        </a:rPr>
+                        <a:t>3</a:t>
+                      </a:r>
+                    </a:p>
+                  </a:txBody>
+                  <a:tcPr/>
+                </a:tc>
+                <a:tc>
+                  <a:txBody>
+                    <a:bodyPr/>
+                    <a:lstStyle/>
+                    <a:p>
+                      <a:r>
+                        <a:rPr lang="fr-CH" dirty="0"/>
+                        <a:t>              </a:t>
+                      </a:r>
+                      <a:r>
+                        <a:rPr lang="fr-CH" dirty="0">
+                          <a:solidFill>
+                            <a:schemeClr val="accent4">
+                              <a:lumMod val="75000"/>
+                            </a:schemeClr>
+                          </a:solidFill>
+                        </a:rPr>
+                        <a:t>3</a:t>
+                      </a:r>
+                    </a:p>
+                  </a:txBody>
+                  <a:tcPr/>
+                </a:tc>
+                <a:tc>
+                  <a:txBody>
+                    <a:bodyPr/>
+                    <a:lstStyle/>
+                    <a:p>
+                      <a:r>
+                        <a:rPr lang="fr-CH" dirty="0"/>
+                        <a:t>4</a:t>
+                      </a:r>
+                    </a:p>
+                  </a:txBody>
+                  <a:tcPr/>
+                </a:tc>
+                <a:extLst>
+                  <a:ext uri="{0D108BD9-81ED-4DB2-BD59-A6C34878D82A}">
+                    <a16:rowId xmlns:a16="http://schemas.microsoft.com/office/drawing/2014/main" val="1834647396"/>
+                  </a:ext>
+                </a:extLst>
+              </a:tr>
+            </a:tbl>
+          </a:graphicData>
+        </a:graphic>
+      </p:graphicFrame>
+      <p:cxnSp>
+        <p:nvCxnSpPr>
+          <p:cNvPr id="28" name="Connecteur droit avec flèche 27">
+            <a:extLst>
+              <a:ext uri="{FF2B5EF4-FFF2-40B4-BE49-F238E27FC236}">
+                <a16:creationId xmlns:a16="http://schemas.microsoft.com/office/drawing/2014/main" id="{4058868E-92D3-592F-99A9-D80847BC2151}"/>
+              </a:ext>
+            </a:extLst>
+          </p:cNvPr>
+          <p:cNvCxnSpPr>
+            <a:cxnSpLocks/>
+          </p:cNvCxnSpPr>
+          <p:nvPr/>
+        </p:nvCxnSpPr>
+        <p:spPr>
+          <a:xfrm flipH="1">
+            <a:off x="5311053" y="2352592"/>
+            <a:ext cx="1822696" cy="908685"/>
+          </a:xfrm>
+          <a:prstGeom prst="straightConnector1">
+            <a:avLst/>
+          </a:prstGeom>
+          <a:ln w="38100" cap="flat" cmpd="sng" algn="ctr">
+            <a:solidFill>
+              <a:schemeClr val="accent5"/>
+            </a:solidFill>
+            <a:prstDash val="dash"/>
+            <a:round/>
+            <a:headEnd type="none" w="med" len="med"/>
+            <a:tailEnd type="arrow" w="med" len="med"/>
+          </a:ln>
+        </p:spPr>
+        <p:style>
+          <a:lnRef idx="0">
+            <a:scrgbClr r="0" g="0" b="0"/>
+          </a:lnRef>
+          <a:fillRef idx="0">
+            <a:scrgbClr r="0" g="0" b="0"/>
+          </a:fillRef>
+          <a:effectRef idx="0">
+            <a:scrgbClr r="0" g="0" b="0"/>
+          </a:effectRef>
+          <a:fontRef idx="minor">
+            <a:schemeClr val="tx1"/>
+          </a:fontRef>
+        </p:style>
+      </p:cxnSp>
+      <p:cxnSp>
+        <p:nvCxnSpPr>
+          <p:cNvPr id="29" name="Connecteur droit avec flèche 28">
+            <a:extLst>
+              <a:ext uri="{FF2B5EF4-FFF2-40B4-BE49-F238E27FC236}">
+                <a16:creationId xmlns:a16="http://schemas.microsoft.com/office/drawing/2014/main" id="{AE7F835C-35DC-559E-3C2C-DF68A1F4AFA9}"/>
+              </a:ext>
+            </a:extLst>
+          </p:cNvPr>
+          <p:cNvCxnSpPr>
+            <a:cxnSpLocks/>
+          </p:cNvCxnSpPr>
+          <p:nvPr/>
+        </p:nvCxnSpPr>
+        <p:spPr>
+          <a:xfrm flipH="1">
+            <a:off x="7377913" y="2354827"/>
+            <a:ext cx="1822696" cy="908685"/>
+          </a:xfrm>
+          <a:prstGeom prst="straightConnector1">
+            <a:avLst/>
+          </a:prstGeom>
+          <a:ln w="38100" cap="flat" cmpd="sng" algn="ctr">
+            <a:solidFill>
+              <a:schemeClr val="accent5"/>
+            </a:solidFill>
+            <a:prstDash val="dash"/>
+            <a:round/>
+            <a:headEnd type="none" w="med" len="med"/>
+            <a:tailEnd type="arrow" w="med" len="med"/>
+          </a:ln>
+        </p:spPr>
+        <p:style>
+          <a:lnRef idx="0">
+            <a:scrgbClr r="0" g="0" b="0"/>
+          </a:lnRef>
+          <a:fillRef idx="0">
+            <a:scrgbClr r="0" g="0" b="0"/>
+          </a:fillRef>
+          <a:effectRef idx="0">
+            <a:scrgbClr r="0" g="0" b="0"/>
+          </a:effectRef>
+          <a:fontRef idx="minor">
+            <a:schemeClr val="tx1"/>
+          </a:fontRef>
+        </p:style>
+      </p:cxnSp>
+      <p:sp>
+        <p:nvSpPr>
+          <p:cNvPr id="40" name="Rectangle 39">
+            <a:extLst>
+              <a:ext uri="{FF2B5EF4-FFF2-40B4-BE49-F238E27FC236}">
+                <a16:creationId xmlns:a16="http://schemas.microsoft.com/office/drawing/2014/main" id="{504776F8-E8E3-295B-966E-3A005C864336}"/>
+              </a:ext>
+            </a:extLst>
+          </p:cNvPr>
+          <p:cNvSpPr/>
+          <p:nvPr/>
+        </p:nvSpPr>
+        <p:spPr>
+          <a:xfrm>
+            <a:off x="848636" y="3068126"/>
+            <a:ext cx="4107434" cy="502440"/>
+          </a:xfrm>
+          <a:prstGeom prst="rect">
+            <a:avLst/>
+          </a:prstGeom>
+          <a:noFill/>
+        </p:spPr>
+        <p:style>
+          <a:lnRef idx="2">
+            <a:schemeClr val="accent4"/>
+          </a:lnRef>
+          <a:fillRef idx="1">
+            <a:schemeClr val="lt1"/>
+          </a:fillRef>
+          <a:effectRef idx="0">
+            <a:schemeClr val="accent4"/>
+          </a:effectRef>
+          <a:fontRef idx="minor">
+            <a:schemeClr val="dk1"/>
+          </a:fontRef>
+        </p:style>
+        <p:txBody>
+          <a:bodyPr rtlCol="0" anchor="ctr"/>
+          <a:lstStyle/>
+          <a:p>
+            <a:pPr algn="ctr"/>
+            <a:endParaRPr lang="fr-CH"/>
+          </a:p>
+        </p:txBody>
+      </p:sp>
+      <p:cxnSp>
+        <p:nvCxnSpPr>
+          <p:cNvPr id="41" name="Connecteur droit avec flèche 40">
+            <a:extLst>
+              <a:ext uri="{FF2B5EF4-FFF2-40B4-BE49-F238E27FC236}">
+                <a16:creationId xmlns:a16="http://schemas.microsoft.com/office/drawing/2014/main" id="{B5372EB2-0ED1-2F47-28CA-505C63604D0E}"/>
+              </a:ext>
+            </a:extLst>
+          </p:cNvPr>
+          <p:cNvCxnSpPr>
+            <a:cxnSpLocks/>
+          </p:cNvCxnSpPr>
+          <p:nvPr/>
+        </p:nvCxnSpPr>
+        <p:spPr>
+          <a:xfrm flipH="1">
+            <a:off x="1362767" y="3479422"/>
+            <a:ext cx="1515693" cy="802779"/>
+          </a:xfrm>
+          <a:prstGeom prst="straightConnector1">
+            <a:avLst/>
+          </a:prstGeom>
+          <a:ln w="57150">
+            <a:tailEnd type="triangle"/>
+          </a:ln>
+        </p:spPr>
+        <p:style>
+          <a:lnRef idx="1">
+            <a:schemeClr val="accent4"/>
+          </a:lnRef>
+          <a:fillRef idx="0">
+            <a:schemeClr val="accent4"/>
+          </a:fillRef>
+          <a:effectRef idx="0">
+            <a:schemeClr val="accent4"/>
+          </a:effectRef>
+          <a:fontRef idx="minor">
+            <a:schemeClr val="tx1"/>
+          </a:fontRef>
+        </p:style>
+      </p:cxnSp>
+      <p:sp>
+        <p:nvSpPr>
+          <p:cNvPr id="42" name="ZoneTexte 41">
+            <a:extLst>
+              <a:ext uri="{FF2B5EF4-FFF2-40B4-BE49-F238E27FC236}">
+                <a16:creationId xmlns:a16="http://schemas.microsoft.com/office/drawing/2014/main" id="{259E5B0F-47A2-0F8B-8E54-2792AF8FC8FA}"/>
+              </a:ext>
+            </a:extLst>
+          </p:cNvPr>
+          <p:cNvSpPr txBox="1"/>
+          <p:nvPr/>
+        </p:nvSpPr>
+        <p:spPr>
+          <a:xfrm>
+            <a:off x="2704245" y="2950580"/>
+            <a:ext cx="488609" cy="707886"/>
+          </a:xfrm>
+          <a:prstGeom prst="rect">
+            <a:avLst/>
+          </a:prstGeom>
+          <a:noFill/>
+        </p:spPr>
+        <p:txBody>
+          <a:bodyPr wrap="square" rtlCol="0">
+            <a:spAutoFit/>
+          </a:bodyPr>
+          <a:lstStyle/>
+          <a:p>
+            <a:r>
+              <a:rPr lang="fr-CH" sz="4000" b="1" dirty="0">
+                <a:solidFill>
+                  <a:schemeClr val="accent4"/>
+                </a:solidFill>
+              </a:rPr>
+              <a:t>+   </a:t>
+            </a:r>
+          </a:p>
+        </p:txBody>
+      </p:sp>
+      <p:cxnSp>
+        <p:nvCxnSpPr>
+          <p:cNvPr id="43" name="Connecteur droit avec flèche 42">
+            <a:extLst>
+              <a:ext uri="{FF2B5EF4-FFF2-40B4-BE49-F238E27FC236}">
+                <a16:creationId xmlns:a16="http://schemas.microsoft.com/office/drawing/2014/main" id="{50491FFB-54CB-E2DC-484E-4F3A0BEAA777}"/>
+              </a:ext>
+            </a:extLst>
+          </p:cNvPr>
+          <p:cNvCxnSpPr>
+            <a:cxnSpLocks/>
+            <a:endCxn id="25" idx="0"/>
+          </p:cNvCxnSpPr>
+          <p:nvPr/>
+        </p:nvCxnSpPr>
+        <p:spPr>
+          <a:xfrm flipH="1">
+            <a:off x="4019896" y="3431496"/>
+            <a:ext cx="1227614" cy="851532"/>
+          </a:xfrm>
+          <a:prstGeom prst="straightConnector1">
+            <a:avLst/>
+          </a:prstGeom>
+          <a:ln w="38100" cap="flat" cmpd="sng" algn="ctr">
+            <a:solidFill>
+              <a:schemeClr val="accent5"/>
+            </a:solidFill>
+            <a:prstDash val="dash"/>
+            <a:round/>
+            <a:headEnd type="none" w="med" len="med"/>
+            <a:tailEnd type="arrow" w="med" len="med"/>
+          </a:ln>
+        </p:spPr>
+        <p:style>
+          <a:lnRef idx="0">
+            <a:scrgbClr r="0" g="0" b="0"/>
+          </a:lnRef>
+          <a:fillRef idx="0">
+            <a:scrgbClr r="0" g="0" b="0"/>
+          </a:fillRef>
+          <a:effectRef idx="0">
+            <a:scrgbClr r="0" g="0" b="0"/>
+          </a:effectRef>
+          <a:fontRef idx="minor">
+            <a:schemeClr val="tx1"/>
+          </a:fontRef>
+        </p:style>
+      </p:cxnSp>
+      <p:cxnSp>
+        <p:nvCxnSpPr>
+          <p:cNvPr id="44" name="Connecteur droit avec flèche 43">
+            <a:extLst>
+              <a:ext uri="{FF2B5EF4-FFF2-40B4-BE49-F238E27FC236}">
+                <a16:creationId xmlns:a16="http://schemas.microsoft.com/office/drawing/2014/main" id="{B1FCCF05-483E-AD88-0C70-9FD849CBEA8D}"/>
+              </a:ext>
+            </a:extLst>
+          </p:cNvPr>
+          <p:cNvCxnSpPr>
+            <a:cxnSpLocks/>
+          </p:cNvCxnSpPr>
+          <p:nvPr/>
+        </p:nvCxnSpPr>
+        <p:spPr>
+          <a:xfrm flipH="1">
+            <a:off x="5311053" y="3433731"/>
+            <a:ext cx="2003317" cy="911441"/>
+          </a:xfrm>
+          <a:prstGeom prst="straightConnector1">
+            <a:avLst/>
+          </a:prstGeom>
+          <a:ln w="38100" cap="flat" cmpd="sng" algn="ctr">
+            <a:solidFill>
+              <a:schemeClr val="accent5"/>
+            </a:solidFill>
+            <a:prstDash val="dash"/>
+            <a:round/>
+            <a:headEnd type="none" w="med" len="med"/>
+            <a:tailEnd type="arrow" w="med" len="med"/>
+          </a:ln>
+        </p:spPr>
+        <p:style>
+          <a:lnRef idx="0">
+            <a:scrgbClr r="0" g="0" b="0"/>
+          </a:lnRef>
+          <a:fillRef idx="0">
+            <a:scrgbClr r="0" g="0" b="0"/>
+          </a:fillRef>
+          <a:effectRef idx="0">
+            <a:scrgbClr r="0" g="0" b="0"/>
+          </a:effectRef>
+          <a:fontRef idx="minor">
+            <a:schemeClr val="tx1"/>
+          </a:fontRef>
+        </p:style>
+      </p:cxnSp>
+      <p:sp>
+        <p:nvSpPr>
+          <p:cNvPr id="48" name="Espace réservé du contenu 2">
+            <a:extLst>
+              <a:ext uri="{FF2B5EF4-FFF2-40B4-BE49-F238E27FC236}">
+                <a16:creationId xmlns:a16="http://schemas.microsoft.com/office/drawing/2014/main" id="{62425B55-03D6-7949-9B81-583B917DCBCC}"/>
+              </a:ext>
+            </a:extLst>
+          </p:cNvPr>
+          <p:cNvSpPr txBox="1">
+            <a:spLocks/>
+          </p:cNvSpPr>
+          <p:nvPr/>
+        </p:nvSpPr>
+        <p:spPr>
+          <a:xfrm>
+            <a:off x="694055" y="5203661"/>
+            <a:ext cx="9584617" cy="1147520"/>
+          </a:xfrm>
+          <a:prstGeom prst="rect">
+            <a:avLst/>
+          </a:prstGeom>
+        </p:spPr>
+        <p:txBody>
+          <a:bodyPr vert="horz" lIns="91440" tIns="45720" rIns="91440" bIns="45720" rtlCol="0">
+            <a:normAutofit/>
+          </a:bodyPr>
+          <a:lstStyle>
+            <a:lvl1pPr marL="228600" indent="-228600" algn="l" defTabSz="914400" rtl="0" eaLnBrk="1" latinLnBrk="0" hangingPunct="1">
+              <a:lnSpc>
+                <a:spcPct val="120000"/>
+              </a:lnSpc>
+              <a:spcBef>
+                <a:spcPts val="1000"/>
+              </a:spcBef>
+              <a:buFont typeface="Arial" panose="020B0604020202020204" pitchFamily="34" charset="0"/>
+              <a:buChar char="•"/>
+              <a:defRPr sz="2000" kern="1200">
+                <a:solidFill>
+                  <a:schemeClr val="tx1"/>
+                </a:solidFill>
+                <a:effectLst>
+                  <a:outerShdw blurRad="50800" dist="38100" dir="2700000" algn="tl" rotWithShape="0">
+                    <a:srgbClr val="000000">
+                      <a:alpha val="48000"/>
+                    </a:srgbClr>
+                  </a:outerShdw>
+                </a:effectLst>
+                <a:latin typeface="+mn-lt"/>
+                <a:ea typeface="+mn-ea"/>
+                <a:cs typeface="+mn-cs"/>
+              </a:defRPr>
+            </a:lvl1pPr>
+            <a:lvl2pPr marL="685800" indent="-228600" algn="l" defTabSz="914400" rtl="0" eaLnBrk="1" latinLnBrk="0" hangingPunct="1">
+              <a:lnSpc>
+                <a:spcPct val="120000"/>
+              </a:lnSpc>
+              <a:spcBef>
+                <a:spcPts val="500"/>
+              </a:spcBef>
+              <a:buFont typeface="Arial" panose="020B0604020202020204" pitchFamily="34" charset="0"/>
+              <a:buChar char="•"/>
+              <a:defRPr sz="1800" kern="1200">
+                <a:solidFill>
+                  <a:schemeClr val="tx1"/>
+                </a:solidFill>
+                <a:effectLst>
+                  <a:outerShdw blurRad="50800" dist="38100" dir="2700000" algn="tl" rotWithShape="0">
+                    <a:srgbClr val="000000">
+                      <a:alpha val="48000"/>
+                    </a:srgbClr>
+                  </a:outerShdw>
+                </a:effectLst>
+                <a:latin typeface="+mn-lt"/>
+                <a:ea typeface="+mn-ea"/>
+                <a:cs typeface="+mn-cs"/>
+              </a:defRPr>
+            </a:lvl2pPr>
+            <a:lvl3pPr marL="1143000" indent="-228600" algn="l" defTabSz="914400" rtl="0" eaLnBrk="1" latinLnBrk="0" hangingPunct="1">
+              <a:lnSpc>
+                <a:spcPct val="120000"/>
+              </a:lnSpc>
+              <a:spcBef>
+                <a:spcPts val="500"/>
+              </a:spcBef>
+              <a:buFont typeface="Arial" panose="020B0604020202020204" pitchFamily="34" charset="0"/>
+              <a:buChar char="•"/>
+              <a:defRPr sz="1600" kern="1200">
+                <a:solidFill>
+                  <a:schemeClr val="tx1"/>
+                </a:solidFill>
+                <a:effectLst>
+                  <a:outerShdw blurRad="50800" dist="38100" dir="2700000" algn="tl" rotWithShape="0">
+                    <a:srgbClr val="000000">
+                      <a:alpha val="48000"/>
+                    </a:srgbClr>
+                  </a:outerShdw>
+                </a:effectLst>
+                <a:latin typeface="+mn-lt"/>
+                <a:ea typeface="+mn-ea"/>
+                <a:cs typeface="+mn-cs"/>
+              </a:defRPr>
+            </a:lvl3pPr>
+            <a:lvl4pPr marL="1600200" indent="-228600" algn="l" defTabSz="914400" rtl="0" eaLnBrk="1" latinLnBrk="0" hangingPunct="1">
+              <a:lnSpc>
+                <a:spcPct val="120000"/>
+              </a:lnSpc>
+              <a:spcBef>
+                <a:spcPts val="500"/>
+              </a:spcBef>
+              <a:buFont typeface="Arial" panose="020B0604020202020204" pitchFamily="34" charset="0"/>
+              <a:buChar char="•"/>
+              <a:defRPr sz="1400" kern="1200">
+                <a:solidFill>
+                  <a:schemeClr val="tx1"/>
+                </a:solidFill>
+                <a:effectLst>
+                  <a:outerShdw blurRad="50800" dist="38100" dir="2700000" algn="tl" rotWithShape="0">
+                    <a:srgbClr val="000000">
+                      <a:alpha val="48000"/>
+                    </a:srgbClr>
+                  </a:outerShdw>
+                </a:effectLst>
+                <a:latin typeface="+mn-lt"/>
+                <a:ea typeface="+mn-ea"/>
+                <a:cs typeface="+mn-cs"/>
+              </a:defRPr>
+            </a:lvl4pPr>
+            <a:lvl5pPr marL="2057400" indent="-228600" algn="l" defTabSz="914400" rtl="0" eaLnBrk="1" latinLnBrk="0" hangingPunct="1">
+              <a:lnSpc>
+                <a:spcPct val="120000"/>
+              </a:lnSpc>
+              <a:spcBef>
+                <a:spcPts val="500"/>
+              </a:spcBef>
+              <a:buFont typeface="Arial" panose="020B0604020202020204" pitchFamily="34" charset="0"/>
+              <a:buChar char="•"/>
+              <a:defRPr sz="1200" kern="1200">
+                <a:solidFill>
+                  <a:schemeClr val="tx1"/>
+                </a:solidFill>
+                <a:effectLst>
+                  <a:outerShdw blurRad="50800" dist="38100" dir="2700000" algn="tl" rotWithShape="0">
+                    <a:srgbClr val="000000">
+                      <a:alpha val="48000"/>
+                    </a:srgbClr>
+                  </a:outerShdw>
+                </a:effectLst>
+                <a:latin typeface="+mn-lt"/>
+                <a:ea typeface="+mn-ea"/>
+                <a:cs typeface="+mn-cs"/>
+              </a:defRPr>
+            </a:lvl5pPr>
+            <a:lvl6pPr marL="2514600" indent="-228600" algn="l" defTabSz="914400" rtl="0" eaLnBrk="1" latinLnBrk="0" hangingPunct="1">
+              <a:lnSpc>
+                <a:spcPct val="120000"/>
+              </a:lnSpc>
+              <a:spcBef>
+                <a:spcPts val="500"/>
+              </a:spcBef>
+              <a:buFont typeface="Arial" panose="020B0604020202020204" pitchFamily="34" charset="0"/>
+              <a:buChar char="•"/>
+              <a:defRPr sz="1200" kern="1200">
+                <a:solidFill>
+                  <a:schemeClr val="tx1"/>
+                </a:solidFill>
+                <a:effectLst>
+                  <a:outerShdw blurRad="50800" dist="38100" dir="2700000" algn="tl" rotWithShape="0">
+                    <a:srgbClr val="000000">
+                      <a:alpha val="48000"/>
+                    </a:srgbClr>
+                  </a:outerShdw>
+                </a:effectLst>
+                <a:latin typeface="+mn-lt"/>
+                <a:ea typeface="+mn-ea"/>
+                <a:cs typeface="+mn-cs"/>
+              </a:defRPr>
+            </a:lvl6pPr>
+            <a:lvl7pPr marL="2971800" indent="-228600" algn="l" defTabSz="914400" rtl="0" eaLnBrk="1" latinLnBrk="0" hangingPunct="1">
+              <a:lnSpc>
+                <a:spcPct val="120000"/>
+              </a:lnSpc>
+              <a:spcBef>
+                <a:spcPts val="500"/>
+              </a:spcBef>
+              <a:buFont typeface="Arial" panose="020B0604020202020204" pitchFamily="34" charset="0"/>
+              <a:buChar char="•"/>
+              <a:defRPr sz="1200" kern="1200">
+                <a:solidFill>
+                  <a:schemeClr val="tx1"/>
+                </a:solidFill>
+                <a:effectLst>
+                  <a:outerShdw blurRad="50800" dist="38100" dir="2700000" algn="tl" rotWithShape="0">
+                    <a:srgbClr val="000000">
+                      <a:alpha val="48000"/>
+                    </a:srgbClr>
+                  </a:outerShdw>
+                </a:effectLst>
+                <a:latin typeface="+mn-lt"/>
+                <a:ea typeface="+mn-ea"/>
+                <a:cs typeface="+mn-cs"/>
+              </a:defRPr>
+            </a:lvl7pPr>
+            <a:lvl8pPr marL="3429000" indent="-228600" algn="l" defTabSz="914400" rtl="0" eaLnBrk="1" latinLnBrk="0" hangingPunct="1">
+              <a:lnSpc>
+                <a:spcPct val="120000"/>
+              </a:lnSpc>
+              <a:spcBef>
+                <a:spcPts val="500"/>
+              </a:spcBef>
+              <a:buFont typeface="Arial" panose="020B0604020202020204" pitchFamily="34" charset="0"/>
+              <a:buChar char="•"/>
+              <a:defRPr sz="1200" kern="1200">
+                <a:solidFill>
+                  <a:schemeClr val="tx1"/>
+                </a:solidFill>
+                <a:effectLst>
+                  <a:outerShdw blurRad="50800" dist="38100" dir="2700000" algn="tl" rotWithShape="0">
+                    <a:srgbClr val="000000">
+                      <a:alpha val="48000"/>
+                    </a:srgbClr>
+                  </a:outerShdw>
+                </a:effectLst>
+                <a:latin typeface="+mn-lt"/>
+                <a:ea typeface="+mn-ea"/>
+                <a:cs typeface="+mn-cs"/>
+              </a:defRPr>
+            </a:lvl8pPr>
+            <a:lvl9pPr marL="3886200" indent="-228600" algn="l" defTabSz="914400" rtl="0" eaLnBrk="1" latinLnBrk="0" hangingPunct="1">
+              <a:lnSpc>
+                <a:spcPct val="120000"/>
+              </a:lnSpc>
+              <a:spcBef>
+                <a:spcPts val="500"/>
+              </a:spcBef>
+              <a:buFont typeface="Arial" panose="020B0604020202020204" pitchFamily="34" charset="0"/>
+              <a:buChar char="•"/>
+              <a:defRPr sz="1200" kern="1200">
+                <a:solidFill>
+                  <a:schemeClr val="tx1"/>
+                </a:solidFill>
+                <a:effectLst>
+                  <a:outerShdw blurRad="50800" dist="38100" dir="2700000" algn="tl" rotWithShape="0">
+                    <a:srgbClr val="000000">
+                      <a:alpha val="48000"/>
+                    </a:srgbClr>
+                  </a:outerShdw>
+                </a:effectLst>
+                <a:latin typeface="+mn-lt"/>
+                <a:ea typeface="+mn-ea"/>
+                <a:cs typeface="+mn-cs"/>
+              </a:defRPr>
+            </a:lvl9pPr>
+          </a:lstStyle>
+          <a:p>
+            <a:r>
+              <a:rPr lang="fr-CH" dirty="0"/>
+              <a:t>Et ainsi de suite…</a:t>
+            </a:r>
+          </a:p>
+          <a:p>
+            <a:r>
+              <a:rPr lang="fr-CH" dirty="0"/>
+              <a:t>La fonction </a:t>
+            </a:r>
+            <a:r>
+              <a:rPr lang="fr-CH" sz="3200" b="1" dirty="0">
+                <a:solidFill>
+                  <a:schemeClr val="accent4">
+                    <a:lumMod val="75000"/>
+                  </a:schemeClr>
+                </a:solidFill>
+              </a:rPr>
+              <a:t>+</a:t>
+            </a:r>
+            <a:r>
+              <a:rPr lang="fr-CH" dirty="0"/>
+              <a:t> est totalement libre, c'est un lambda (element1,element2)=&gt;{…}</a:t>
+            </a:r>
+          </a:p>
+        </p:txBody>
+      </p:sp>
+    </p:spTree>
+    <p:extLst>
+      <p:ext uri="{BB962C8B-B14F-4D97-AF65-F5344CB8AC3E}">
+        <p14:creationId xmlns:p14="http://schemas.microsoft.com/office/powerpoint/2010/main" val="3678624622"/>
+      </p:ext>
+    </p:extLst>
+  </p:cSld>
+  <p:clrMapOvr>
+    <a:masterClrMapping/>
+  </p:clrMapOvr>
+  <p:timing>
+    <p:tnLst>
+      <p:par>
+        <p:cTn id="1" dur="indefinite" restart="never" nodeType="tmRoot">
+          <p:childTnLst>
+            <p:seq concurrent="1" nextAc="seek">
+              <p:cTn id="2" dur="indefinite" nodeType="mainSeq">
+                <p:childTnLst>
+                  <p:par>
+                    <p:cTn id="3" fill="hold">
+                      <p:stCondLst>
+                        <p:cond delay="indefinite"/>
+                      </p:stCondLst>
+                      <p:childTnLst>
+                        <p:par>
+                          <p:cTn id="4" fill="hold">
+                            <p:stCondLst>
+                              <p:cond delay="0"/>
+                            </p:stCondLst>
+                            <p:childTnLst>
+                              <p:par>
+                                <p:cTn id="5" presetID="1" presetClass="entr" presetSubtype="0" fill="hold" nodeType="clickEffect">
+                                  <p:stCondLst>
+                                    <p:cond delay="0"/>
+                                  </p:stCondLst>
+                                  <p:childTnLst>
+                                    <p:set>
+                                      <p:cBhvr>
+                                        <p:cTn id="6" dur="1" fill="hold">
+                                          <p:stCondLst>
+                                            <p:cond delay="0"/>
+                                          </p:stCondLst>
+                                        </p:cTn>
+                                        <p:tgtEl>
+                                          <p:spTgt spid="5"/>
+                                        </p:tgtEl>
+                                        <p:attrNameLst>
+                                          <p:attrName>style.visibility</p:attrName>
+                                        </p:attrNameLst>
+                                      </p:cBhvr>
+                                      <p:to>
+                                        <p:strVal val="visible"/>
+                                      </p:to>
+                                    </p:set>
+                                  </p:childTnLst>
+                                </p:cTn>
+                              </p:par>
+                            </p:childTnLst>
+                          </p:cTn>
+                        </p:par>
+                      </p:childTnLst>
+                    </p:cTn>
+                  </p:par>
+                  <p:par>
+                    <p:cTn id="7" fill="hold">
+                      <p:stCondLst>
+                        <p:cond delay="indefinite"/>
+                      </p:stCondLst>
+                      <p:childTnLst>
+                        <p:par>
+                          <p:cTn id="8" fill="hold">
+                            <p:stCondLst>
+                              <p:cond delay="0"/>
+                            </p:stCondLst>
+                            <p:childTnLst>
+                              <p:par>
+                                <p:cTn id="9" presetID="10" presetClass="entr" presetSubtype="0" fill="hold" grpId="0" nodeType="clickEffect">
+                                  <p:stCondLst>
+                                    <p:cond delay="0"/>
+                                  </p:stCondLst>
+                                  <p:childTnLst>
+                                    <p:set>
+                                      <p:cBhvr>
+                                        <p:cTn id="10" dur="1" fill="hold">
+                                          <p:stCondLst>
+                                            <p:cond delay="0"/>
+                                          </p:stCondLst>
+                                        </p:cTn>
+                                        <p:tgtEl>
+                                          <p:spTgt spid="6"/>
+                                        </p:tgtEl>
+                                        <p:attrNameLst>
+                                          <p:attrName>style.visibility</p:attrName>
+                                        </p:attrNameLst>
+                                      </p:cBhvr>
+                                      <p:to>
+                                        <p:strVal val="visible"/>
+                                      </p:to>
+                                    </p:set>
+                                    <p:animEffect transition="in" filter="fade">
+                                      <p:cBhvr>
+                                        <p:cTn id="11" dur="500"/>
+                                        <p:tgtEl>
+                                          <p:spTgt spid="6"/>
+                                        </p:tgtEl>
+                                      </p:cBhvr>
+                                    </p:animEffect>
+                                  </p:childTnLst>
+                                </p:cTn>
+                              </p:par>
+                            </p:childTnLst>
+                          </p:cTn>
+                        </p:par>
+                      </p:childTnLst>
+                    </p:cTn>
+                  </p:par>
+                  <p:par>
+                    <p:cTn id="12" fill="hold">
+                      <p:stCondLst>
+                        <p:cond delay="indefinite"/>
+                      </p:stCondLst>
+                      <p:childTnLst>
+                        <p:par>
+                          <p:cTn id="13" fill="hold">
+                            <p:stCondLst>
+                              <p:cond delay="0"/>
+                            </p:stCondLst>
+                            <p:childTnLst>
+                              <p:par>
+                                <p:cTn id="14" presetID="1" presetClass="entr" presetSubtype="0" fill="hold" grpId="0" nodeType="clickEffect">
+                                  <p:stCondLst>
+                                    <p:cond delay="0"/>
+                                  </p:stCondLst>
+                                  <p:childTnLst>
+                                    <p:set>
+                                      <p:cBhvr>
+                                        <p:cTn id="15" dur="1" fill="hold">
+                                          <p:stCondLst>
+                                            <p:cond delay="0"/>
+                                          </p:stCondLst>
+                                        </p:cTn>
+                                        <p:tgtEl>
+                                          <p:spTgt spid="9"/>
+                                        </p:tgtEl>
+                                        <p:attrNameLst>
+                                          <p:attrName>style.visibility</p:attrName>
+                                        </p:attrNameLst>
+                                      </p:cBhvr>
+                                      <p:to>
+                                        <p:strVal val="visible"/>
+                                      </p:to>
+                                    </p:set>
+                                  </p:childTnLst>
+                                </p:cTn>
+                              </p:par>
+                            </p:childTnLst>
+                          </p:cTn>
+                        </p:par>
+                      </p:childTnLst>
+                    </p:cTn>
+                  </p:par>
+                  <p:par>
+                    <p:cTn id="16" fill="hold">
+                      <p:stCondLst>
+                        <p:cond delay="indefinite"/>
+                      </p:stCondLst>
+                      <p:childTnLst>
+                        <p:par>
+                          <p:cTn id="17" fill="hold">
+                            <p:stCondLst>
+                              <p:cond delay="0"/>
+                            </p:stCondLst>
+                            <p:childTnLst>
+                              <p:par>
+                                <p:cTn id="18" presetID="22" presetClass="entr" presetSubtype="1" fill="hold" nodeType="clickEffect">
+                                  <p:stCondLst>
+                                    <p:cond delay="0"/>
+                                  </p:stCondLst>
+                                  <p:childTnLst>
+                                    <p:set>
+                                      <p:cBhvr>
+                                        <p:cTn id="19" dur="1" fill="hold">
+                                          <p:stCondLst>
+                                            <p:cond delay="0"/>
+                                          </p:stCondLst>
+                                        </p:cTn>
+                                        <p:tgtEl>
+                                          <p:spTgt spid="8"/>
+                                        </p:tgtEl>
+                                        <p:attrNameLst>
+                                          <p:attrName>style.visibility</p:attrName>
+                                        </p:attrNameLst>
+                                      </p:cBhvr>
+                                      <p:to>
+                                        <p:strVal val="visible"/>
+                                      </p:to>
+                                    </p:set>
+                                    <p:animEffect transition="in" filter="wipe(up)">
+                                      <p:cBhvr>
+                                        <p:cTn id="20" dur="500"/>
+                                        <p:tgtEl>
+                                          <p:spTgt spid="8"/>
+                                        </p:tgtEl>
+                                      </p:cBhvr>
+                                    </p:animEffect>
+                                  </p:childTnLst>
+                                </p:cTn>
+                              </p:par>
+                            </p:childTnLst>
+                          </p:cTn>
+                        </p:par>
+                        <p:par>
+                          <p:cTn id="21" fill="hold">
+                            <p:stCondLst>
+                              <p:cond delay="500"/>
+                            </p:stCondLst>
+                            <p:childTnLst>
+                              <p:par>
+                                <p:cTn id="22" presetID="1" presetClass="entr" presetSubtype="0" fill="hold" nodeType="afterEffect">
+                                  <p:stCondLst>
+                                    <p:cond delay="0"/>
+                                  </p:stCondLst>
+                                  <p:childTnLst>
+                                    <p:set>
+                                      <p:cBhvr>
+                                        <p:cTn id="23" dur="1" fill="hold">
+                                          <p:stCondLst>
+                                            <p:cond delay="0"/>
+                                          </p:stCondLst>
+                                        </p:cTn>
+                                        <p:tgtEl>
+                                          <p:spTgt spid="24"/>
+                                        </p:tgtEl>
+                                        <p:attrNameLst>
+                                          <p:attrName>style.visibility</p:attrName>
+                                        </p:attrNameLst>
+                                      </p:cBhvr>
+                                      <p:to>
+                                        <p:strVal val="visible"/>
+                                      </p:to>
+                                    </p:set>
+                                  </p:childTnLst>
+                                </p:cTn>
+                              </p:par>
+                            </p:childTnLst>
+                          </p:cTn>
+                        </p:par>
+                        <p:par>
+                          <p:cTn id="24" fill="hold">
+                            <p:stCondLst>
+                              <p:cond delay="500"/>
+                            </p:stCondLst>
+                            <p:childTnLst>
+                              <p:par>
+                                <p:cTn id="25" presetID="22" presetClass="entr" presetSubtype="1" fill="hold" nodeType="afterEffect">
+                                  <p:stCondLst>
+                                    <p:cond delay="0"/>
+                                  </p:stCondLst>
+                                  <p:childTnLst>
+                                    <p:set>
+                                      <p:cBhvr>
+                                        <p:cTn id="26" dur="1" fill="hold">
+                                          <p:stCondLst>
+                                            <p:cond delay="0"/>
+                                          </p:stCondLst>
+                                        </p:cTn>
+                                        <p:tgtEl>
+                                          <p:spTgt spid="11"/>
+                                        </p:tgtEl>
+                                        <p:attrNameLst>
+                                          <p:attrName>style.visibility</p:attrName>
+                                        </p:attrNameLst>
+                                      </p:cBhvr>
+                                      <p:to>
+                                        <p:strVal val="visible"/>
+                                      </p:to>
+                                    </p:set>
+                                    <p:animEffect transition="in" filter="wipe(up)">
+                                      <p:cBhvr>
+                                        <p:cTn id="27" dur="500"/>
+                                        <p:tgtEl>
+                                          <p:spTgt spid="11"/>
+                                        </p:tgtEl>
+                                      </p:cBhvr>
+                                    </p:animEffect>
+                                  </p:childTnLst>
+                                </p:cTn>
+                              </p:par>
+                              <p:par>
+                                <p:cTn id="28" presetID="22" presetClass="entr" presetSubtype="1" fill="hold" nodeType="withEffect">
+                                  <p:stCondLst>
+                                    <p:cond delay="0"/>
+                                  </p:stCondLst>
+                                  <p:childTnLst>
+                                    <p:set>
+                                      <p:cBhvr>
+                                        <p:cTn id="29" dur="1" fill="hold">
+                                          <p:stCondLst>
+                                            <p:cond delay="0"/>
+                                          </p:stCondLst>
+                                        </p:cTn>
+                                        <p:tgtEl>
+                                          <p:spTgt spid="28"/>
+                                        </p:tgtEl>
+                                        <p:attrNameLst>
+                                          <p:attrName>style.visibility</p:attrName>
+                                        </p:attrNameLst>
+                                      </p:cBhvr>
+                                      <p:to>
+                                        <p:strVal val="visible"/>
+                                      </p:to>
+                                    </p:set>
+                                    <p:animEffect transition="in" filter="wipe(up)">
+                                      <p:cBhvr>
+                                        <p:cTn id="30" dur="500"/>
+                                        <p:tgtEl>
+                                          <p:spTgt spid="28"/>
+                                        </p:tgtEl>
+                                      </p:cBhvr>
+                                    </p:animEffect>
+                                  </p:childTnLst>
+                                </p:cTn>
+                              </p:par>
+                              <p:par>
+                                <p:cTn id="31" presetID="22" presetClass="entr" presetSubtype="1" fill="hold" nodeType="withEffect">
+                                  <p:stCondLst>
+                                    <p:cond delay="0"/>
+                                  </p:stCondLst>
+                                  <p:childTnLst>
+                                    <p:set>
+                                      <p:cBhvr>
+                                        <p:cTn id="32" dur="1" fill="hold">
+                                          <p:stCondLst>
+                                            <p:cond delay="0"/>
+                                          </p:stCondLst>
+                                        </p:cTn>
+                                        <p:tgtEl>
+                                          <p:spTgt spid="29"/>
+                                        </p:tgtEl>
+                                        <p:attrNameLst>
+                                          <p:attrName>style.visibility</p:attrName>
+                                        </p:attrNameLst>
+                                      </p:cBhvr>
+                                      <p:to>
+                                        <p:strVal val="visible"/>
+                                      </p:to>
+                                    </p:set>
+                                    <p:animEffect transition="in" filter="wipe(up)">
+                                      <p:cBhvr>
+                                        <p:cTn id="33" dur="500"/>
+                                        <p:tgtEl>
+                                          <p:spTgt spid="29"/>
+                                        </p:tgtEl>
+                                      </p:cBhvr>
+                                    </p:animEffect>
+                                  </p:childTnLst>
+                                </p:cTn>
+                              </p:par>
+                            </p:childTnLst>
+                          </p:cTn>
+                        </p:par>
+                      </p:childTnLst>
+                    </p:cTn>
+                  </p:par>
+                  <p:par>
+                    <p:cTn id="34" fill="hold">
+                      <p:stCondLst>
+                        <p:cond delay="indefinite"/>
+                      </p:stCondLst>
+                      <p:childTnLst>
+                        <p:par>
+                          <p:cTn id="35" fill="hold">
+                            <p:stCondLst>
+                              <p:cond delay="0"/>
+                            </p:stCondLst>
+                            <p:childTnLst>
+                              <p:par>
+                                <p:cTn id="36" presetID="10" presetClass="entr" presetSubtype="0" fill="hold" grpId="0" nodeType="clickEffect">
+                                  <p:stCondLst>
+                                    <p:cond delay="0"/>
+                                  </p:stCondLst>
+                                  <p:childTnLst>
+                                    <p:set>
+                                      <p:cBhvr>
+                                        <p:cTn id="37" dur="1" fill="hold">
+                                          <p:stCondLst>
+                                            <p:cond delay="0"/>
+                                          </p:stCondLst>
+                                        </p:cTn>
+                                        <p:tgtEl>
+                                          <p:spTgt spid="40"/>
+                                        </p:tgtEl>
+                                        <p:attrNameLst>
+                                          <p:attrName>style.visibility</p:attrName>
+                                        </p:attrNameLst>
+                                      </p:cBhvr>
+                                      <p:to>
+                                        <p:strVal val="visible"/>
+                                      </p:to>
+                                    </p:set>
+                                    <p:animEffect transition="in" filter="fade">
+                                      <p:cBhvr>
+                                        <p:cTn id="38" dur="500"/>
+                                        <p:tgtEl>
+                                          <p:spTgt spid="40"/>
+                                        </p:tgtEl>
+                                      </p:cBhvr>
+                                    </p:animEffect>
+                                  </p:childTnLst>
+                                </p:cTn>
+                              </p:par>
+                            </p:childTnLst>
+                          </p:cTn>
+                        </p:par>
+                      </p:childTnLst>
+                    </p:cTn>
+                  </p:par>
+                  <p:par>
+                    <p:cTn id="39" fill="hold">
+                      <p:stCondLst>
+                        <p:cond delay="indefinite"/>
+                      </p:stCondLst>
+                      <p:childTnLst>
+                        <p:par>
+                          <p:cTn id="40" fill="hold">
+                            <p:stCondLst>
+                              <p:cond delay="0"/>
+                            </p:stCondLst>
+                            <p:childTnLst>
+                              <p:par>
+                                <p:cTn id="41" presetID="1" presetClass="entr" presetSubtype="0" fill="hold" grpId="0" nodeType="clickEffect">
+                                  <p:stCondLst>
+                                    <p:cond delay="0"/>
+                                  </p:stCondLst>
+                                  <p:childTnLst>
+                                    <p:set>
+                                      <p:cBhvr>
+                                        <p:cTn id="42" dur="1" fill="hold">
+                                          <p:stCondLst>
+                                            <p:cond delay="0"/>
+                                          </p:stCondLst>
+                                        </p:cTn>
+                                        <p:tgtEl>
+                                          <p:spTgt spid="42"/>
+                                        </p:tgtEl>
+                                        <p:attrNameLst>
+                                          <p:attrName>style.visibility</p:attrName>
+                                        </p:attrNameLst>
+                                      </p:cBhvr>
+                                      <p:to>
+                                        <p:strVal val="visible"/>
+                                      </p:to>
+                                    </p:set>
+                                  </p:childTnLst>
+                                </p:cTn>
+                              </p:par>
+                            </p:childTnLst>
+                          </p:cTn>
+                        </p:par>
+                      </p:childTnLst>
+                    </p:cTn>
+                  </p:par>
+                  <p:par>
+                    <p:cTn id="43" fill="hold">
+                      <p:stCondLst>
+                        <p:cond delay="indefinite"/>
+                      </p:stCondLst>
+                      <p:childTnLst>
+                        <p:par>
+                          <p:cTn id="44" fill="hold">
+                            <p:stCondLst>
+                              <p:cond delay="0"/>
+                            </p:stCondLst>
+                            <p:childTnLst>
+                              <p:par>
+                                <p:cTn id="45" presetID="22" presetClass="entr" presetSubtype="1" fill="hold" nodeType="clickEffect">
+                                  <p:stCondLst>
+                                    <p:cond delay="0"/>
+                                  </p:stCondLst>
+                                  <p:childTnLst>
+                                    <p:set>
+                                      <p:cBhvr>
+                                        <p:cTn id="46" dur="1" fill="hold">
+                                          <p:stCondLst>
+                                            <p:cond delay="0"/>
+                                          </p:stCondLst>
+                                        </p:cTn>
+                                        <p:tgtEl>
+                                          <p:spTgt spid="41"/>
+                                        </p:tgtEl>
+                                        <p:attrNameLst>
+                                          <p:attrName>style.visibility</p:attrName>
+                                        </p:attrNameLst>
+                                      </p:cBhvr>
+                                      <p:to>
+                                        <p:strVal val="visible"/>
+                                      </p:to>
+                                    </p:set>
+                                    <p:animEffect transition="in" filter="wipe(up)">
+                                      <p:cBhvr>
+                                        <p:cTn id="47" dur="500"/>
+                                        <p:tgtEl>
+                                          <p:spTgt spid="41"/>
+                                        </p:tgtEl>
+                                      </p:cBhvr>
+                                    </p:animEffect>
+                                  </p:childTnLst>
+                                </p:cTn>
+                              </p:par>
+                            </p:childTnLst>
+                          </p:cTn>
+                        </p:par>
+                        <p:par>
+                          <p:cTn id="48" fill="hold">
+                            <p:stCondLst>
+                              <p:cond delay="500"/>
+                            </p:stCondLst>
+                            <p:childTnLst>
+                              <p:par>
+                                <p:cTn id="49" presetID="1" presetClass="entr" presetSubtype="0" fill="hold" nodeType="afterEffect">
+                                  <p:stCondLst>
+                                    <p:cond delay="0"/>
+                                  </p:stCondLst>
+                                  <p:childTnLst>
+                                    <p:set>
+                                      <p:cBhvr>
+                                        <p:cTn id="50" dur="1" fill="hold">
+                                          <p:stCondLst>
+                                            <p:cond delay="0"/>
+                                          </p:stCondLst>
+                                        </p:cTn>
+                                        <p:tgtEl>
+                                          <p:spTgt spid="25"/>
+                                        </p:tgtEl>
+                                        <p:attrNameLst>
+                                          <p:attrName>style.visibility</p:attrName>
+                                        </p:attrNameLst>
+                                      </p:cBhvr>
+                                      <p:to>
+                                        <p:strVal val="visible"/>
+                                      </p:to>
+                                    </p:set>
+                                  </p:childTnLst>
+                                </p:cTn>
+                              </p:par>
+                              <p:par>
+                                <p:cTn id="51" presetID="22" presetClass="entr" presetSubtype="1" fill="hold" nodeType="withEffect">
+                                  <p:stCondLst>
+                                    <p:cond delay="0"/>
+                                  </p:stCondLst>
+                                  <p:childTnLst>
+                                    <p:set>
+                                      <p:cBhvr>
+                                        <p:cTn id="52" dur="1" fill="hold">
+                                          <p:stCondLst>
+                                            <p:cond delay="0"/>
+                                          </p:stCondLst>
+                                        </p:cTn>
+                                        <p:tgtEl>
+                                          <p:spTgt spid="43"/>
+                                        </p:tgtEl>
+                                        <p:attrNameLst>
+                                          <p:attrName>style.visibility</p:attrName>
+                                        </p:attrNameLst>
+                                      </p:cBhvr>
+                                      <p:to>
+                                        <p:strVal val="visible"/>
+                                      </p:to>
+                                    </p:set>
+                                    <p:animEffect transition="in" filter="wipe(up)">
+                                      <p:cBhvr>
+                                        <p:cTn id="53" dur="500"/>
+                                        <p:tgtEl>
+                                          <p:spTgt spid="43"/>
+                                        </p:tgtEl>
+                                      </p:cBhvr>
+                                    </p:animEffect>
+                                  </p:childTnLst>
+                                </p:cTn>
+                              </p:par>
+                              <p:par>
+                                <p:cTn id="54" presetID="22" presetClass="entr" presetSubtype="1" fill="hold" nodeType="withEffect">
+                                  <p:stCondLst>
+                                    <p:cond delay="0"/>
+                                  </p:stCondLst>
+                                  <p:childTnLst>
+                                    <p:set>
+                                      <p:cBhvr>
+                                        <p:cTn id="55" dur="1" fill="hold">
+                                          <p:stCondLst>
+                                            <p:cond delay="0"/>
+                                          </p:stCondLst>
+                                        </p:cTn>
+                                        <p:tgtEl>
+                                          <p:spTgt spid="44"/>
+                                        </p:tgtEl>
+                                        <p:attrNameLst>
+                                          <p:attrName>style.visibility</p:attrName>
+                                        </p:attrNameLst>
+                                      </p:cBhvr>
+                                      <p:to>
+                                        <p:strVal val="visible"/>
+                                      </p:to>
+                                    </p:set>
+                                    <p:animEffect transition="in" filter="wipe(up)">
+                                      <p:cBhvr>
+                                        <p:cTn id="56" dur="500"/>
+                                        <p:tgtEl>
+                                          <p:spTgt spid="44"/>
+                                        </p:tgtEl>
+                                      </p:cBhvr>
+                                    </p:animEffect>
+                                  </p:childTnLst>
+                                </p:cTn>
+                              </p:par>
+                            </p:childTnLst>
+                          </p:cTn>
+                        </p:par>
+                      </p:childTnLst>
+                    </p:cTn>
+                  </p:par>
+                  <p:par>
+                    <p:cTn id="57" fill="hold">
+                      <p:stCondLst>
+                        <p:cond delay="indefinite"/>
+                      </p:stCondLst>
+                      <p:childTnLst>
+                        <p:par>
+                          <p:cTn id="58" fill="hold">
+                            <p:stCondLst>
+                              <p:cond delay="0"/>
+                            </p:stCondLst>
+                            <p:childTnLst>
+                              <p:par>
+                                <p:cTn id="59" presetID="1" presetClass="entr" presetSubtype="0" fill="hold" grpId="0" nodeType="clickEffect">
+                                  <p:stCondLst>
+                                    <p:cond delay="0"/>
+                                  </p:stCondLst>
+                                  <p:childTnLst>
+                                    <p:set>
+                                      <p:cBhvr>
+                                        <p:cTn id="60" dur="1" fill="hold">
+                                          <p:stCondLst>
+                                            <p:cond delay="0"/>
+                                          </p:stCondLst>
+                                        </p:cTn>
+                                        <p:tgtEl>
+                                          <p:spTgt spid="48">
+                                            <p:txEl>
+                                              <p:pRg st="0" end="0"/>
+                                            </p:txEl>
+                                          </p:spTgt>
+                                        </p:tgtEl>
+                                        <p:attrNameLst>
+                                          <p:attrName>style.visibility</p:attrName>
+                                        </p:attrNameLst>
+                                      </p:cBhvr>
+                                      <p:to>
+                                        <p:strVal val="visible"/>
+                                      </p:to>
+                                    </p:set>
+                                  </p:childTnLst>
+                                </p:cTn>
+                              </p:par>
+                            </p:childTnLst>
+                          </p:cTn>
+                        </p:par>
+                      </p:childTnLst>
+                    </p:cTn>
+                  </p:par>
+                  <p:par>
+                    <p:cTn id="61" fill="hold">
+                      <p:stCondLst>
+                        <p:cond delay="indefinite"/>
+                      </p:stCondLst>
+                      <p:childTnLst>
+                        <p:par>
+                          <p:cTn id="62" fill="hold">
+                            <p:stCondLst>
+                              <p:cond delay="0"/>
+                            </p:stCondLst>
+                            <p:childTnLst>
+                              <p:par>
+                                <p:cTn id="63" presetID="1" presetClass="entr" presetSubtype="0" fill="hold" grpId="0" nodeType="clickEffect">
+                                  <p:stCondLst>
+                                    <p:cond delay="0"/>
+                                  </p:stCondLst>
+                                  <p:childTnLst>
+                                    <p:set>
+                                      <p:cBhvr>
+                                        <p:cTn id="64" dur="1" fill="hold">
+                                          <p:stCondLst>
+                                            <p:cond delay="0"/>
+                                          </p:stCondLst>
+                                        </p:cTn>
+                                        <p:tgtEl>
+                                          <p:spTgt spid="48">
+                                            <p:txEl>
+                                              <p:pRg st="1" end="1"/>
+                                            </p:txEl>
+                                          </p:spTgt>
+                                        </p:tgtEl>
+                                        <p:attrNameLst>
+                                          <p:attrName>style.visibility</p:attrName>
+                                        </p:attrNameLst>
+                                      </p:cBhvr>
+                                      <p:to>
+                                        <p:strVal val="visible"/>
+                                      </p:to>
+                                    </p:set>
+                                  </p:childTnLst>
+                                </p:cTn>
+                              </p:par>
+                            </p:childTnLst>
+                          </p:cTn>
+                        </p:par>
+                      </p:childTnLst>
+                    </p:cTn>
+                  </p:par>
+                </p:childTnLst>
+              </p:cTn>
+              <p:prevCondLst>
+                <p:cond evt="onPrev" delay="0">
+                  <p:tgtEl>
+                    <p:sldTgt/>
+                  </p:tgtEl>
+                </p:cond>
+              </p:prevCondLst>
+              <p:nextCondLst>
+                <p:cond evt="onNext" delay="0">
+                  <p:tgtEl>
+                    <p:sldTgt/>
+                  </p:tgtEl>
+                </p:cond>
+              </p:nextCondLst>
+            </p:seq>
+          </p:childTnLst>
+        </p:cTn>
+      </p:par>
+    </p:tnLst>
+    <p:bldLst>
+      <p:bldP spid="6" grpId="0" animBg="1"/>
+      <p:bldP spid="9" grpId="0"/>
+      <p:bldP spid="40" grpId="0" animBg="1"/>
+      <p:bldP spid="42" grpId="0"/>
+      <p:bldP spid="48" grpId="0" uiExpand="1" build="p"/>
+    </p:bldLst>
+  </p:timing>
+</p:sld>
+</file>
+
 <file path=ppt/slides/slide2.xml><?xml version="1.0" encoding="utf-8"?>
+<p:sld xmlns:a="http://schemas.openxmlformats.org/drawingml/2006/main" xmlns:r="http://schemas.openxmlformats.org/officeDocument/2006/relationships" xmlns:p="http://schemas.openxmlformats.org/presentationml/2006/main">
+  <p:cSld>
+    <p:bg>
+      <p:bgPr>
+        <a:solidFill>
+          <a:schemeClr val="bg2">
+            <a:lumMod val="75000"/>
+            <a:alpha val="70000"/>
+          </a:schemeClr>
+        </a:solidFill>
+        <a:effectLst/>
+      </p:bgPr>
+    </p:bg>
+    <p:spTree>
+      <p:nvGrpSpPr>
+        <p:cNvPr id="1" name=""/>
+        <p:cNvGrpSpPr/>
+        <p:nvPr/>
+      </p:nvGrpSpPr>
+      <p:grpSpPr>
+        <a:xfrm>
+          <a:off x="0" y="0"/>
+          <a:ext cx="0" cy="0"/>
+          <a:chOff x="0" y="0"/>
+          <a:chExt cx="0" cy="0"/>
+        </a:xfrm>
+      </p:grpSpPr>
+      <p:sp>
+        <p:nvSpPr>
+          <p:cNvPr id="2" name="Titre 1">
+            <a:extLst>
+              <a:ext uri="{FF2B5EF4-FFF2-40B4-BE49-F238E27FC236}">
+                <a16:creationId xmlns:a16="http://schemas.microsoft.com/office/drawing/2014/main" id="{FB1F1105-60C8-2AA9-D21E-1CDCDFFA7EB2}"/>
+              </a:ext>
+            </a:extLst>
+          </p:cNvPr>
+          <p:cNvSpPr>
+            <a:spLocks noGrp="1"/>
+          </p:cNvSpPr>
+          <p:nvPr>
+            <p:ph type="title"/>
+          </p:nvPr>
+        </p:nvSpPr>
+        <p:spPr>
+          <a:xfrm>
+            <a:off x="913795" y="213360"/>
+            <a:ext cx="10353761" cy="1326321"/>
+          </a:xfrm>
+        </p:spPr>
+        <p:txBody>
+          <a:bodyPr/>
+          <a:lstStyle/>
+          <a:p>
+            <a:r>
+              <a:rPr lang="fr-CH" dirty="0" err="1"/>
+              <a:t>Reduce</a:t>
+            </a:r>
+            <a:br>
+              <a:rPr lang="fr-CH" dirty="0"/>
+            </a:br>
+            <a:r>
+              <a:rPr lang="fr-CH" sz="2800" i="1" dirty="0"/>
+              <a:t>Métaphore / Un sirop de bonbons ?</a:t>
+            </a:r>
+            <a:endParaRPr lang="fr-CH" i="1" dirty="0"/>
+          </a:p>
+        </p:txBody>
+      </p:sp>
+      <p:pic>
+        <p:nvPicPr>
+          <p:cNvPr id="5" name="Espace réservé du contenu 4">
+            <a:extLst>
+              <a:ext uri="{FF2B5EF4-FFF2-40B4-BE49-F238E27FC236}">
+                <a16:creationId xmlns:a16="http://schemas.microsoft.com/office/drawing/2014/main" id="{86B2E83A-B16C-17EF-61DD-C065D1CAFEC8}"/>
+              </a:ext>
+            </a:extLst>
+          </p:cNvPr>
+          <p:cNvPicPr>
+            <a:picLocks noGrp="1" noChangeAspect="1"/>
+          </p:cNvPicPr>
+          <p:nvPr>
+            <p:ph idx="1"/>
+          </p:nvPr>
+        </p:nvPicPr>
+        <p:blipFill>
+          <a:blip r:embed="rId2">
+            <a:extLst>
+              <a:ext uri="{96DAC541-7B7A-43D3-8B79-37D633B846F1}">
+                <asvg:svgBlip xmlns:asvg="http://schemas.microsoft.com/office/drawing/2016/SVG/main" r:embed="rId3"/>
+              </a:ext>
+            </a:extLst>
+          </a:blip>
+          <a:stretch>
+            <a:fillRect/>
+          </a:stretch>
+        </p:blipFill>
+        <p:spPr>
+          <a:xfrm>
+            <a:off x="929395" y="2128959"/>
+            <a:ext cx="10322560" cy="3870960"/>
+          </a:xfrm>
+        </p:spPr>
+      </p:pic>
+    </p:spTree>
+    <p:extLst>
+      <p:ext uri="{BB962C8B-B14F-4D97-AF65-F5344CB8AC3E}">
+        <p14:creationId xmlns:p14="http://schemas.microsoft.com/office/powerpoint/2010/main" val="3665306868"/>
+      </p:ext>
+    </p:extLst>
+  </p:cSld>
+  <p:clrMapOvr>
+    <a:masterClrMapping/>
+  </p:clrMapOvr>
+</p:sld>
+</file>
+
+<file path=ppt/slides/slide3.xml><?xml version="1.0" encoding="utf-8"?>
 <p:sld xmlns:a="http://schemas.openxmlformats.org/drawingml/2006/main" xmlns:r="http://schemas.openxmlformats.org/officeDocument/2006/relationships" xmlns:p="http://schemas.openxmlformats.org/presentationml/2006/main">
   <p:cSld>
     <p:spTree>
@@ -6197,6 +8317,14 @@
             <a:r>
               <a:rPr lang="fr-CH" dirty="0" err="1"/>
               <a:t>Reduce</a:t>
+            </a:r>
+            <a:r>
+              <a:rPr lang="fr-CH" dirty="0"/>
+              <a:t> : </a:t>
+            </a:r>
+            <a:r>
+              <a:rPr lang="fr-CH"/>
+              <a:t>cas connus</a:t>
             </a:r>
             <a:endParaRPr lang="fr-CH" dirty="0"/>
           </a:p>
@@ -8360,7 +10488,7 @@
 </p:sld>
 </file>
 
-<file path=ppt/slides/slide3.xml><?xml version="1.0" encoding="utf-8"?>
+<file path=ppt/slides/slide4.xml><?xml version="1.0" encoding="utf-8"?>
 <p:sld xmlns:a="http://schemas.openxmlformats.org/drawingml/2006/main" xmlns:r="http://schemas.openxmlformats.org/officeDocument/2006/relationships" xmlns:p="http://schemas.openxmlformats.org/presentationml/2006/main">
   <p:cSld>
     <p:spTree>
@@ -9391,7 +11519,7 @@
 </p:sld>
 </file>
 
-<file path=ppt/slides/slide4.xml><?xml version="1.0" encoding="utf-8"?>
+<file path=ppt/slides/slide5.xml><?xml version="1.0" encoding="utf-8"?>
 <p:sld xmlns:a="http://schemas.openxmlformats.org/drawingml/2006/main" xmlns:r="http://schemas.openxmlformats.org/officeDocument/2006/relationships" xmlns:p="http://schemas.openxmlformats.org/presentationml/2006/main">
   <p:cSld>
     <p:spTree>
@@ -10810,7 +12938,7 @@
 </p:sld>
 </file>
 
-<file path=ppt/slides/slide5.xml><?xml version="1.0" encoding="utf-8"?>
+<file path=ppt/slides/slide6.xml><?xml version="1.0" encoding="utf-8"?>
 <p:sld xmlns:a="http://schemas.openxmlformats.org/drawingml/2006/main" xmlns:r="http://schemas.openxmlformats.org/officeDocument/2006/relationships" xmlns:p="http://schemas.openxmlformats.org/presentationml/2006/main">
   <p:cSld>
     <p:spTree>
@@ -12062,7 +14190,7 @@
 </p:sld>
 </file>
 
-<file path=ppt/slides/slide6.xml><?xml version="1.0" encoding="utf-8"?>
+<file path=ppt/slides/slide7.xml><?xml version="1.0" encoding="utf-8"?>
 <p:sld xmlns:a="http://schemas.openxmlformats.org/drawingml/2006/main" xmlns:r="http://schemas.openxmlformats.org/officeDocument/2006/relationships" xmlns:p="http://schemas.openxmlformats.org/presentationml/2006/main">
   <p:cSld>
     <p:spTree>
@@ -13088,7 +15216,7 @@
 </p:sld>
 </file>
 
-<file path=ppt/slides/slide7.xml><?xml version="1.0" encoding="utf-8"?>
+<file path=ppt/slides/slide8.xml><?xml version="1.0" encoding="utf-8"?>
 <p:sld xmlns:a="http://schemas.openxmlformats.org/drawingml/2006/main" xmlns:r="http://schemas.openxmlformats.org/officeDocument/2006/relationships" xmlns:p="http://schemas.openxmlformats.org/presentationml/2006/main">
   <p:cSld>
     <p:spTree>
@@ -13779,7 +15907,7 @@
 </p:sld>
 </file>
 
-<file path=ppt/slides/slide8.xml><?xml version="1.0" encoding="utf-8"?>
+<file path=ppt/slides/slide9.xml><?xml version="1.0" encoding="utf-8"?>
 <p:sld xmlns:a="http://schemas.openxmlformats.org/drawingml/2006/main" xmlns:r="http://schemas.openxmlformats.org/officeDocument/2006/relationships" xmlns:p="http://schemas.openxmlformats.org/presentationml/2006/main">
   <p:cSld>
     <p:spTree>
@@ -14917,2008 +17045,6 @@
 </p:sld>
 </file>
 
-<file path=ppt/slides/slide9.xml><?xml version="1.0" encoding="utf-8"?>
-<p:sld xmlns:a="http://schemas.openxmlformats.org/drawingml/2006/main" xmlns:r="http://schemas.openxmlformats.org/officeDocument/2006/relationships" xmlns:p="http://schemas.openxmlformats.org/presentationml/2006/main">
-  <p:cSld>
-    <p:spTree>
-      <p:nvGrpSpPr>
-        <p:cNvPr id="1" name=""/>
-        <p:cNvGrpSpPr/>
-        <p:nvPr/>
-      </p:nvGrpSpPr>
-      <p:grpSpPr>
-        <a:xfrm>
-          <a:off x="0" y="0"/>
-          <a:ext cx="0" cy="0"/>
-          <a:chOff x="0" y="0"/>
-          <a:chExt cx="0" cy="0"/>
-        </a:xfrm>
-      </p:grpSpPr>
-      <p:graphicFrame>
-        <p:nvGraphicFramePr>
-          <p:cNvPr id="24" name="Espace réservé du contenu 4">
-            <a:extLst>
-              <a:ext uri="{FF2B5EF4-FFF2-40B4-BE49-F238E27FC236}">
-                <a16:creationId xmlns:a16="http://schemas.microsoft.com/office/drawing/2014/main" id="{357BBBFA-973E-7D7A-C825-307F2E6E0534}"/>
-              </a:ext>
-            </a:extLst>
-          </p:cNvPr>
-          <p:cNvGraphicFramePr>
-            <a:graphicFrameLocks/>
-          </p:cNvGraphicFramePr>
-          <p:nvPr>
-            <p:extLst>
-              <p:ext uri="{D42A27DB-BD31-4B8C-83A1-F6EECF244321}">
-                <p14:modId xmlns:p14="http://schemas.microsoft.com/office/powerpoint/2010/main" val="2561872616"/>
-              </p:ext>
-            </p:extLst>
-          </p:nvPr>
-        </p:nvGraphicFramePr>
-        <p:xfrm>
-          <a:off x="913795" y="3123279"/>
-          <a:ext cx="8282940" cy="365760"/>
-        </p:xfrm>
-        <a:graphic>
-          <a:graphicData uri="http://schemas.openxmlformats.org/drawingml/2006/table">
-            <a:tbl>
-              <a:tblPr firstRow="1" bandRow="1">
-                <a:tableStyleId>{5C22544A-7EE6-4342-B048-85BDC9FD1C3A}</a:tableStyleId>
-              </a:tblPr>
-              <a:tblGrid>
-                <a:gridCol w="2070735">
-                  <a:extLst>
-                    <a:ext uri="{9D8B030D-6E8A-4147-A177-3AD203B41FA5}">
-                      <a16:colId xmlns:a16="http://schemas.microsoft.com/office/drawing/2014/main" val="3672638309"/>
-                    </a:ext>
-                  </a:extLst>
-                </a:gridCol>
-                <a:gridCol w="2070735">
-                  <a:extLst>
-                    <a:ext uri="{9D8B030D-6E8A-4147-A177-3AD203B41FA5}">
-                      <a16:colId xmlns:a16="http://schemas.microsoft.com/office/drawing/2014/main" val="1521242616"/>
-                    </a:ext>
-                  </a:extLst>
-                </a:gridCol>
-                <a:gridCol w="2070735">
-                  <a:extLst>
-                    <a:ext uri="{9D8B030D-6E8A-4147-A177-3AD203B41FA5}">
-                      <a16:colId xmlns:a16="http://schemas.microsoft.com/office/drawing/2014/main" val="2021167606"/>
-                    </a:ext>
-                  </a:extLst>
-                </a:gridCol>
-                <a:gridCol w="2070735">
-                  <a:extLst>
-                    <a:ext uri="{9D8B030D-6E8A-4147-A177-3AD203B41FA5}">
-                      <a16:colId xmlns:a16="http://schemas.microsoft.com/office/drawing/2014/main" val="747972660"/>
-                    </a:ext>
-                  </a:extLst>
-                </a:gridCol>
-              </a:tblGrid>
-              <a:tr h="0">
-                <a:tc>
-                  <a:txBody>
-                    <a:bodyPr/>
-                    <a:lstStyle/>
-                    <a:p>
-                      <a:r>
-                        <a:rPr lang="fr-CH" dirty="0">
-                          <a:solidFill>
-                            <a:schemeClr val="accent4">
-                              <a:lumMod val="75000"/>
-                            </a:schemeClr>
-                          </a:solidFill>
-                        </a:rPr>
-                        <a:t>1</a:t>
-                      </a:r>
-                    </a:p>
-                  </a:txBody>
-                  <a:tcPr/>
-                </a:tc>
-                <a:tc>
-                  <a:txBody>
-                    <a:bodyPr/>
-                    <a:lstStyle/>
-                    <a:p>
-                      <a:r>
-                        <a:rPr lang="fr-CH" dirty="0"/>
-                        <a:t>             </a:t>
-                      </a:r>
-                      <a:r>
-                        <a:rPr lang="fr-CH" dirty="0">
-                          <a:solidFill>
-                            <a:schemeClr val="accent4">
-                              <a:lumMod val="75000"/>
-                            </a:schemeClr>
-                          </a:solidFill>
-                        </a:rPr>
-                        <a:t>2</a:t>
-                      </a:r>
-                    </a:p>
-                  </a:txBody>
-                  <a:tcPr/>
-                </a:tc>
-                <a:tc>
-                  <a:txBody>
-                    <a:bodyPr/>
-                    <a:lstStyle/>
-                    <a:p>
-                      <a:r>
-                        <a:rPr lang="fr-CH" dirty="0"/>
-                        <a:t>3</a:t>
-                      </a:r>
-                    </a:p>
-                  </a:txBody>
-                  <a:tcPr/>
-                </a:tc>
-                <a:tc>
-                  <a:txBody>
-                    <a:bodyPr/>
-                    <a:lstStyle/>
-                    <a:p>
-                      <a:r>
-                        <a:rPr lang="fr-CH" dirty="0"/>
-                        <a:t>4</a:t>
-                      </a:r>
-                    </a:p>
-                  </a:txBody>
-                  <a:tcPr/>
-                </a:tc>
-                <a:extLst>
-                  <a:ext uri="{0D108BD9-81ED-4DB2-BD59-A6C34878D82A}">
-                    <a16:rowId xmlns:a16="http://schemas.microsoft.com/office/drawing/2014/main" val="1834647396"/>
-                  </a:ext>
-                </a:extLst>
-              </a:tr>
-            </a:tbl>
-          </a:graphicData>
-        </a:graphic>
-      </p:graphicFrame>
-      <p:sp>
-        <p:nvSpPr>
-          <p:cNvPr id="2" name="Titre 1">
-            <a:extLst>
-              <a:ext uri="{FF2B5EF4-FFF2-40B4-BE49-F238E27FC236}">
-                <a16:creationId xmlns:a16="http://schemas.microsoft.com/office/drawing/2014/main" id="{671EA78D-57E6-1D57-9C55-684EEE4CB2F5}"/>
-              </a:ext>
-            </a:extLst>
-          </p:cNvPr>
-          <p:cNvSpPr>
-            <a:spLocks noGrp="1"/>
-          </p:cNvSpPr>
-          <p:nvPr>
-            <p:ph type="title"/>
-          </p:nvPr>
-        </p:nvSpPr>
-        <p:spPr/>
-        <p:txBody>
-          <a:bodyPr/>
-          <a:lstStyle/>
-          <a:p>
-            <a:r>
-              <a:rPr lang="fr-CH" dirty="0"/>
-              <a:t>Déroulement visuel de l'agrégation</a:t>
-            </a:r>
-          </a:p>
-        </p:txBody>
-      </p:sp>
-      <p:graphicFrame>
-        <p:nvGraphicFramePr>
-          <p:cNvPr id="5" name="Espace réservé du contenu 4">
-            <a:extLst>
-              <a:ext uri="{FF2B5EF4-FFF2-40B4-BE49-F238E27FC236}">
-                <a16:creationId xmlns:a16="http://schemas.microsoft.com/office/drawing/2014/main" id="{A92B5457-7066-9E43-B825-46190B6C6A31}"/>
-              </a:ext>
-            </a:extLst>
-          </p:cNvPr>
-          <p:cNvGraphicFramePr>
-            <a:graphicFrameLocks noGrp="1"/>
-          </p:cNvGraphicFramePr>
-          <p:nvPr>
-            <p:ph idx="1"/>
-            <p:extLst>
-              <p:ext uri="{D42A27DB-BD31-4B8C-83A1-F6EECF244321}">
-                <p14:modId xmlns:p14="http://schemas.microsoft.com/office/powerpoint/2010/main" val="3299108202"/>
-              </p:ext>
-            </p:extLst>
-          </p:nvPr>
-        </p:nvGraphicFramePr>
-        <p:xfrm>
-          <a:off x="914400" y="2095500"/>
-          <a:ext cx="10353675" cy="365760"/>
-        </p:xfrm>
-        <a:graphic>
-          <a:graphicData uri="http://schemas.openxmlformats.org/drawingml/2006/table">
-            <a:tbl>
-              <a:tblPr firstRow="1" bandRow="1">
-                <a:tableStyleId>{5C22544A-7EE6-4342-B048-85BDC9FD1C3A}</a:tableStyleId>
-              </a:tblPr>
-              <a:tblGrid>
-                <a:gridCol w="2070735">
-                  <a:extLst>
-                    <a:ext uri="{9D8B030D-6E8A-4147-A177-3AD203B41FA5}">
-                      <a16:colId xmlns:a16="http://schemas.microsoft.com/office/drawing/2014/main" val="3672638309"/>
-                    </a:ext>
-                  </a:extLst>
-                </a:gridCol>
-                <a:gridCol w="2070735">
-                  <a:extLst>
-                    <a:ext uri="{9D8B030D-6E8A-4147-A177-3AD203B41FA5}">
-                      <a16:colId xmlns:a16="http://schemas.microsoft.com/office/drawing/2014/main" val="1521242616"/>
-                    </a:ext>
-                  </a:extLst>
-                </a:gridCol>
-                <a:gridCol w="2070735">
-                  <a:extLst>
-                    <a:ext uri="{9D8B030D-6E8A-4147-A177-3AD203B41FA5}">
-                      <a16:colId xmlns:a16="http://schemas.microsoft.com/office/drawing/2014/main" val="2021167606"/>
-                    </a:ext>
-                  </a:extLst>
-                </a:gridCol>
-                <a:gridCol w="2070735">
-                  <a:extLst>
-                    <a:ext uri="{9D8B030D-6E8A-4147-A177-3AD203B41FA5}">
-                      <a16:colId xmlns:a16="http://schemas.microsoft.com/office/drawing/2014/main" val="747972660"/>
-                    </a:ext>
-                  </a:extLst>
-                </a:gridCol>
-                <a:gridCol w="2070735">
-                  <a:extLst>
-                    <a:ext uri="{9D8B030D-6E8A-4147-A177-3AD203B41FA5}">
-                      <a16:colId xmlns:a16="http://schemas.microsoft.com/office/drawing/2014/main" val="3190894397"/>
-                    </a:ext>
-                  </a:extLst>
-                </a:gridCol>
-              </a:tblGrid>
-              <a:tr h="0">
-                <a:tc>
-                  <a:txBody>
-                    <a:bodyPr/>
-                    <a:lstStyle/>
-                    <a:p>
-                      <a:r>
-                        <a:rPr lang="fr-CH" dirty="0">
-                          <a:solidFill>
-                            <a:schemeClr val="accent4">
-                              <a:lumMod val="75000"/>
-                            </a:schemeClr>
-                          </a:solidFill>
-                        </a:rPr>
-                        <a:t>0 (</a:t>
-                      </a:r>
-                      <a:r>
-                        <a:rPr lang="fr-CH" dirty="0" err="1">
-                          <a:solidFill>
-                            <a:schemeClr val="accent4">
-                              <a:lumMod val="75000"/>
-                            </a:schemeClr>
-                          </a:solidFill>
-                        </a:rPr>
-                        <a:t>seed</a:t>
-                      </a:r>
-                      <a:r>
-                        <a:rPr lang="fr-CH" dirty="0">
-                          <a:solidFill>
-                            <a:schemeClr val="accent4">
-                              <a:lumMod val="75000"/>
-                            </a:schemeClr>
-                          </a:solidFill>
-                        </a:rPr>
-                        <a:t>)</a:t>
-                      </a:r>
-                    </a:p>
-                  </a:txBody>
-                  <a:tcPr/>
-                </a:tc>
-                <a:tc>
-                  <a:txBody>
-                    <a:bodyPr/>
-                    <a:lstStyle/>
-                    <a:p>
-                      <a:r>
-                        <a:rPr lang="fr-CH" dirty="0"/>
-                        <a:t>              </a:t>
-                      </a:r>
-                      <a:r>
-                        <a:rPr lang="fr-CH" dirty="0">
-                          <a:solidFill>
-                            <a:schemeClr val="accent4">
-                              <a:lumMod val="75000"/>
-                            </a:schemeClr>
-                          </a:solidFill>
-                        </a:rPr>
-                        <a:t>1</a:t>
-                      </a:r>
-                    </a:p>
-                  </a:txBody>
-                  <a:tcPr/>
-                </a:tc>
-                <a:tc>
-                  <a:txBody>
-                    <a:bodyPr/>
-                    <a:lstStyle/>
-                    <a:p>
-                      <a:r>
-                        <a:rPr lang="fr-CH" dirty="0"/>
-                        <a:t>2</a:t>
-                      </a:r>
-                    </a:p>
-                  </a:txBody>
-                  <a:tcPr/>
-                </a:tc>
-                <a:tc>
-                  <a:txBody>
-                    <a:bodyPr/>
-                    <a:lstStyle/>
-                    <a:p>
-                      <a:r>
-                        <a:rPr lang="fr-CH" dirty="0"/>
-                        <a:t>3</a:t>
-                      </a:r>
-                    </a:p>
-                  </a:txBody>
-                  <a:tcPr/>
-                </a:tc>
-                <a:tc>
-                  <a:txBody>
-                    <a:bodyPr/>
-                    <a:lstStyle/>
-                    <a:p>
-                      <a:r>
-                        <a:rPr lang="fr-CH" dirty="0"/>
-                        <a:t>4</a:t>
-                      </a:r>
-                    </a:p>
-                  </a:txBody>
-                  <a:tcPr/>
-                </a:tc>
-                <a:extLst>
-                  <a:ext uri="{0D108BD9-81ED-4DB2-BD59-A6C34878D82A}">
-                    <a16:rowId xmlns:a16="http://schemas.microsoft.com/office/drawing/2014/main" val="1834647396"/>
-                  </a:ext>
-                </a:extLst>
-              </a:tr>
-            </a:tbl>
-          </a:graphicData>
-        </a:graphic>
-      </p:graphicFrame>
-      <p:sp>
-        <p:nvSpPr>
-          <p:cNvPr id="6" name="Rectangle 5">
-            <a:extLst>
-              <a:ext uri="{FF2B5EF4-FFF2-40B4-BE49-F238E27FC236}">
-                <a16:creationId xmlns:a16="http://schemas.microsoft.com/office/drawing/2014/main" id="{1260E5E2-38C9-2D85-5462-28916194936A}"/>
-              </a:ext>
-            </a:extLst>
-          </p:cNvPr>
-          <p:cNvSpPr/>
-          <p:nvPr/>
-        </p:nvSpPr>
-        <p:spPr>
-          <a:xfrm>
-            <a:off x="872529" y="2034141"/>
-            <a:ext cx="4107434" cy="502440"/>
-          </a:xfrm>
-          <a:prstGeom prst="rect">
-            <a:avLst/>
-          </a:prstGeom>
-          <a:noFill/>
-        </p:spPr>
-        <p:style>
-          <a:lnRef idx="2">
-            <a:schemeClr val="accent4"/>
-          </a:lnRef>
-          <a:fillRef idx="1">
-            <a:schemeClr val="lt1"/>
-          </a:fillRef>
-          <a:effectRef idx="0">
-            <a:schemeClr val="accent4"/>
-          </a:effectRef>
-          <a:fontRef idx="minor">
-            <a:schemeClr val="dk1"/>
-          </a:fontRef>
-        </p:style>
-        <p:txBody>
-          <a:bodyPr rtlCol="0" anchor="ctr"/>
-          <a:lstStyle/>
-          <a:p>
-            <a:pPr algn="ctr"/>
-            <a:endParaRPr lang="fr-CH"/>
-          </a:p>
-        </p:txBody>
-      </p:sp>
-      <p:cxnSp>
-        <p:nvCxnSpPr>
-          <p:cNvPr id="8" name="Connecteur droit avec flèche 7">
-            <a:extLst>
-              <a:ext uri="{FF2B5EF4-FFF2-40B4-BE49-F238E27FC236}">
-                <a16:creationId xmlns:a16="http://schemas.microsoft.com/office/drawing/2014/main" id="{A0F24DFA-E36D-1893-4763-513813FAA234}"/>
-              </a:ext>
-            </a:extLst>
-          </p:cNvPr>
-          <p:cNvCxnSpPr>
-            <a:cxnSpLocks/>
-          </p:cNvCxnSpPr>
-          <p:nvPr/>
-        </p:nvCxnSpPr>
-        <p:spPr>
-          <a:xfrm flipH="1">
-            <a:off x="1386660" y="2395821"/>
-            <a:ext cx="1515693" cy="802779"/>
-          </a:xfrm>
-          <a:prstGeom prst="straightConnector1">
-            <a:avLst/>
-          </a:prstGeom>
-          <a:ln w="57150">
-            <a:tailEnd type="triangle"/>
-          </a:ln>
-        </p:spPr>
-        <p:style>
-          <a:lnRef idx="1">
-            <a:schemeClr val="accent4"/>
-          </a:lnRef>
-          <a:fillRef idx="0">
-            <a:schemeClr val="accent4"/>
-          </a:fillRef>
-          <a:effectRef idx="0">
-            <a:schemeClr val="accent4"/>
-          </a:effectRef>
-          <a:fontRef idx="minor">
-            <a:schemeClr val="tx1"/>
-          </a:fontRef>
-        </p:style>
-      </p:cxnSp>
-      <p:sp>
-        <p:nvSpPr>
-          <p:cNvPr id="9" name="ZoneTexte 8">
-            <a:extLst>
-              <a:ext uri="{FF2B5EF4-FFF2-40B4-BE49-F238E27FC236}">
-                <a16:creationId xmlns:a16="http://schemas.microsoft.com/office/drawing/2014/main" id="{010A4AC0-D9EB-341C-3928-D115F202C061}"/>
-              </a:ext>
-            </a:extLst>
-          </p:cNvPr>
-          <p:cNvSpPr txBox="1"/>
-          <p:nvPr/>
-        </p:nvSpPr>
-        <p:spPr>
-          <a:xfrm>
-            <a:off x="2721050" y="1895331"/>
-            <a:ext cx="488609" cy="707886"/>
-          </a:xfrm>
-          <a:prstGeom prst="rect">
-            <a:avLst/>
-          </a:prstGeom>
-          <a:noFill/>
-        </p:spPr>
-        <p:txBody>
-          <a:bodyPr wrap="square" rtlCol="0">
-            <a:spAutoFit/>
-          </a:bodyPr>
-          <a:lstStyle/>
-          <a:p>
-            <a:r>
-              <a:rPr lang="fr-CH" sz="4000" b="1" dirty="0">
-                <a:solidFill>
-                  <a:schemeClr val="accent4"/>
-                </a:solidFill>
-              </a:rPr>
-              <a:t>+   </a:t>
-            </a:r>
-          </a:p>
-        </p:txBody>
-      </p:sp>
-      <p:cxnSp>
-        <p:nvCxnSpPr>
-          <p:cNvPr id="11" name="Connecteur droit avec flèche 10">
-            <a:extLst>
-              <a:ext uri="{FF2B5EF4-FFF2-40B4-BE49-F238E27FC236}">
-                <a16:creationId xmlns:a16="http://schemas.microsoft.com/office/drawing/2014/main" id="{03241B03-9B2D-6695-D6BA-453F66D84A11}"/>
-              </a:ext>
-            </a:extLst>
-          </p:cNvPr>
-          <p:cNvCxnSpPr>
-            <a:cxnSpLocks/>
-          </p:cNvCxnSpPr>
-          <p:nvPr/>
-        </p:nvCxnSpPr>
-        <p:spPr>
-          <a:xfrm flipH="1">
-            <a:off x="4019897" y="2395821"/>
-            <a:ext cx="1099244" cy="802779"/>
-          </a:xfrm>
-          <a:prstGeom prst="straightConnector1">
-            <a:avLst/>
-          </a:prstGeom>
-          <a:ln w="38100" cap="flat" cmpd="sng" algn="ctr">
-            <a:solidFill>
-              <a:schemeClr val="accent5"/>
-            </a:solidFill>
-            <a:prstDash val="dash"/>
-            <a:round/>
-            <a:headEnd type="none" w="med" len="med"/>
-            <a:tailEnd type="arrow" w="med" len="med"/>
-          </a:ln>
-        </p:spPr>
-        <p:style>
-          <a:lnRef idx="0">
-            <a:scrgbClr r="0" g="0" b="0"/>
-          </a:lnRef>
-          <a:fillRef idx="0">
-            <a:scrgbClr r="0" g="0" b="0"/>
-          </a:fillRef>
-          <a:effectRef idx="0">
-            <a:scrgbClr r="0" g="0" b="0"/>
-          </a:effectRef>
-          <a:fontRef idx="minor">
-            <a:schemeClr val="tx1"/>
-          </a:fontRef>
-        </p:style>
-      </p:cxnSp>
-      <p:graphicFrame>
-        <p:nvGraphicFramePr>
-          <p:cNvPr id="25" name="Espace réservé du contenu 4">
-            <a:extLst>
-              <a:ext uri="{FF2B5EF4-FFF2-40B4-BE49-F238E27FC236}">
-                <a16:creationId xmlns:a16="http://schemas.microsoft.com/office/drawing/2014/main" id="{F5EECA86-65A0-002B-B59D-A0FFEBAB8745}"/>
-              </a:ext>
-            </a:extLst>
-          </p:cNvPr>
-          <p:cNvGraphicFramePr>
-            <a:graphicFrameLocks/>
-          </p:cNvGraphicFramePr>
-          <p:nvPr>
-            <p:extLst>
-              <p:ext uri="{D42A27DB-BD31-4B8C-83A1-F6EECF244321}">
-                <p14:modId xmlns:p14="http://schemas.microsoft.com/office/powerpoint/2010/main" val="3976122456"/>
-              </p:ext>
-            </p:extLst>
-          </p:nvPr>
-        </p:nvGraphicFramePr>
-        <p:xfrm>
-          <a:off x="913794" y="4283028"/>
-          <a:ext cx="6212205" cy="365760"/>
-        </p:xfrm>
-        <a:graphic>
-          <a:graphicData uri="http://schemas.openxmlformats.org/drawingml/2006/table">
-            <a:tbl>
-              <a:tblPr firstRow="1" bandRow="1">
-                <a:tableStyleId>{5C22544A-7EE6-4342-B048-85BDC9FD1C3A}</a:tableStyleId>
-              </a:tblPr>
-              <a:tblGrid>
-                <a:gridCol w="2070735">
-                  <a:extLst>
-                    <a:ext uri="{9D8B030D-6E8A-4147-A177-3AD203B41FA5}">
-                      <a16:colId xmlns:a16="http://schemas.microsoft.com/office/drawing/2014/main" val="3672638309"/>
-                    </a:ext>
-                  </a:extLst>
-                </a:gridCol>
-                <a:gridCol w="2070735">
-                  <a:extLst>
-                    <a:ext uri="{9D8B030D-6E8A-4147-A177-3AD203B41FA5}">
-                      <a16:colId xmlns:a16="http://schemas.microsoft.com/office/drawing/2014/main" val="1521242616"/>
-                    </a:ext>
-                  </a:extLst>
-                </a:gridCol>
-                <a:gridCol w="2070735">
-                  <a:extLst>
-                    <a:ext uri="{9D8B030D-6E8A-4147-A177-3AD203B41FA5}">
-                      <a16:colId xmlns:a16="http://schemas.microsoft.com/office/drawing/2014/main" val="2021167606"/>
-                    </a:ext>
-                  </a:extLst>
-                </a:gridCol>
-              </a:tblGrid>
-              <a:tr h="0">
-                <a:tc>
-                  <a:txBody>
-                    <a:bodyPr/>
-                    <a:lstStyle/>
-                    <a:p>
-                      <a:r>
-                        <a:rPr lang="fr-CH" dirty="0">
-                          <a:solidFill>
-                            <a:schemeClr val="accent4">
-                              <a:lumMod val="75000"/>
-                            </a:schemeClr>
-                          </a:solidFill>
-                        </a:rPr>
-                        <a:t>3</a:t>
-                      </a:r>
-                    </a:p>
-                  </a:txBody>
-                  <a:tcPr/>
-                </a:tc>
-                <a:tc>
-                  <a:txBody>
-                    <a:bodyPr/>
-                    <a:lstStyle/>
-                    <a:p>
-                      <a:r>
-                        <a:rPr lang="fr-CH" dirty="0"/>
-                        <a:t>              </a:t>
-                      </a:r>
-                      <a:r>
-                        <a:rPr lang="fr-CH" dirty="0">
-                          <a:solidFill>
-                            <a:schemeClr val="accent4">
-                              <a:lumMod val="75000"/>
-                            </a:schemeClr>
-                          </a:solidFill>
-                        </a:rPr>
-                        <a:t>3</a:t>
-                      </a:r>
-                    </a:p>
-                  </a:txBody>
-                  <a:tcPr/>
-                </a:tc>
-                <a:tc>
-                  <a:txBody>
-                    <a:bodyPr/>
-                    <a:lstStyle/>
-                    <a:p>
-                      <a:r>
-                        <a:rPr lang="fr-CH" dirty="0"/>
-                        <a:t>4</a:t>
-                      </a:r>
-                    </a:p>
-                  </a:txBody>
-                  <a:tcPr/>
-                </a:tc>
-                <a:extLst>
-                  <a:ext uri="{0D108BD9-81ED-4DB2-BD59-A6C34878D82A}">
-                    <a16:rowId xmlns:a16="http://schemas.microsoft.com/office/drawing/2014/main" val="1834647396"/>
-                  </a:ext>
-                </a:extLst>
-              </a:tr>
-            </a:tbl>
-          </a:graphicData>
-        </a:graphic>
-      </p:graphicFrame>
-      <p:cxnSp>
-        <p:nvCxnSpPr>
-          <p:cNvPr id="28" name="Connecteur droit avec flèche 27">
-            <a:extLst>
-              <a:ext uri="{FF2B5EF4-FFF2-40B4-BE49-F238E27FC236}">
-                <a16:creationId xmlns:a16="http://schemas.microsoft.com/office/drawing/2014/main" id="{4058868E-92D3-592F-99A9-D80847BC2151}"/>
-              </a:ext>
-            </a:extLst>
-          </p:cNvPr>
-          <p:cNvCxnSpPr>
-            <a:cxnSpLocks/>
-          </p:cNvCxnSpPr>
-          <p:nvPr/>
-        </p:nvCxnSpPr>
-        <p:spPr>
-          <a:xfrm flipH="1">
-            <a:off x="5311053" y="2352592"/>
-            <a:ext cx="1822696" cy="908685"/>
-          </a:xfrm>
-          <a:prstGeom prst="straightConnector1">
-            <a:avLst/>
-          </a:prstGeom>
-          <a:ln w="38100" cap="flat" cmpd="sng" algn="ctr">
-            <a:solidFill>
-              <a:schemeClr val="accent5"/>
-            </a:solidFill>
-            <a:prstDash val="dash"/>
-            <a:round/>
-            <a:headEnd type="none" w="med" len="med"/>
-            <a:tailEnd type="arrow" w="med" len="med"/>
-          </a:ln>
-        </p:spPr>
-        <p:style>
-          <a:lnRef idx="0">
-            <a:scrgbClr r="0" g="0" b="0"/>
-          </a:lnRef>
-          <a:fillRef idx="0">
-            <a:scrgbClr r="0" g="0" b="0"/>
-          </a:fillRef>
-          <a:effectRef idx="0">
-            <a:scrgbClr r="0" g="0" b="0"/>
-          </a:effectRef>
-          <a:fontRef idx="minor">
-            <a:schemeClr val="tx1"/>
-          </a:fontRef>
-        </p:style>
-      </p:cxnSp>
-      <p:cxnSp>
-        <p:nvCxnSpPr>
-          <p:cNvPr id="29" name="Connecteur droit avec flèche 28">
-            <a:extLst>
-              <a:ext uri="{FF2B5EF4-FFF2-40B4-BE49-F238E27FC236}">
-                <a16:creationId xmlns:a16="http://schemas.microsoft.com/office/drawing/2014/main" id="{AE7F835C-35DC-559E-3C2C-DF68A1F4AFA9}"/>
-              </a:ext>
-            </a:extLst>
-          </p:cNvPr>
-          <p:cNvCxnSpPr>
-            <a:cxnSpLocks/>
-          </p:cNvCxnSpPr>
-          <p:nvPr/>
-        </p:nvCxnSpPr>
-        <p:spPr>
-          <a:xfrm flipH="1">
-            <a:off x="7377913" y="2354827"/>
-            <a:ext cx="1822696" cy="908685"/>
-          </a:xfrm>
-          <a:prstGeom prst="straightConnector1">
-            <a:avLst/>
-          </a:prstGeom>
-          <a:ln w="38100" cap="flat" cmpd="sng" algn="ctr">
-            <a:solidFill>
-              <a:schemeClr val="accent5"/>
-            </a:solidFill>
-            <a:prstDash val="dash"/>
-            <a:round/>
-            <a:headEnd type="none" w="med" len="med"/>
-            <a:tailEnd type="arrow" w="med" len="med"/>
-          </a:ln>
-        </p:spPr>
-        <p:style>
-          <a:lnRef idx="0">
-            <a:scrgbClr r="0" g="0" b="0"/>
-          </a:lnRef>
-          <a:fillRef idx="0">
-            <a:scrgbClr r="0" g="0" b="0"/>
-          </a:fillRef>
-          <a:effectRef idx="0">
-            <a:scrgbClr r="0" g="0" b="0"/>
-          </a:effectRef>
-          <a:fontRef idx="minor">
-            <a:schemeClr val="tx1"/>
-          </a:fontRef>
-        </p:style>
-      </p:cxnSp>
-      <p:sp>
-        <p:nvSpPr>
-          <p:cNvPr id="40" name="Rectangle 39">
-            <a:extLst>
-              <a:ext uri="{FF2B5EF4-FFF2-40B4-BE49-F238E27FC236}">
-                <a16:creationId xmlns:a16="http://schemas.microsoft.com/office/drawing/2014/main" id="{504776F8-E8E3-295B-966E-3A005C864336}"/>
-              </a:ext>
-            </a:extLst>
-          </p:cNvPr>
-          <p:cNvSpPr/>
-          <p:nvPr/>
-        </p:nvSpPr>
-        <p:spPr>
-          <a:xfrm>
-            <a:off x="848636" y="3068126"/>
-            <a:ext cx="4107434" cy="502440"/>
-          </a:xfrm>
-          <a:prstGeom prst="rect">
-            <a:avLst/>
-          </a:prstGeom>
-          <a:noFill/>
-        </p:spPr>
-        <p:style>
-          <a:lnRef idx="2">
-            <a:schemeClr val="accent4"/>
-          </a:lnRef>
-          <a:fillRef idx="1">
-            <a:schemeClr val="lt1"/>
-          </a:fillRef>
-          <a:effectRef idx="0">
-            <a:schemeClr val="accent4"/>
-          </a:effectRef>
-          <a:fontRef idx="minor">
-            <a:schemeClr val="dk1"/>
-          </a:fontRef>
-        </p:style>
-        <p:txBody>
-          <a:bodyPr rtlCol="0" anchor="ctr"/>
-          <a:lstStyle/>
-          <a:p>
-            <a:pPr algn="ctr"/>
-            <a:endParaRPr lang="fr-CH"/>
-          </a:p>
-        </p:txBody>
-      </p:sp>
-      <p:cxnSp>
-        <p:nvCxnSpPr>
-          <p:cNvPr id="41" name="Connecteur droit avec flèche 40">
-            <a:extLst>
-              <a:ext uri="{FF2B5EF4-FFF2-40B4-BE49-F238E27FC236}">
-                <a16:creationId xmlns:a16="http://schemas.microsoft.com/office/drawing/2014/main" id="{B5372EB2-0ED1-2F47-28CA-505C63604D0E}"/>
-              </a:ext>
-            </a:extLst>
-          </p:cNvPr>
-          <p:cNvCxnSpPr>
-            <a:cxnSpLocks/>
-          </p:cNvCxnSpPr>
-          <p:nvPr/>
-        </p:nvCxnSpPr>
-        <p:spPr>
-          <a:xfrm flipH="1">
-            <a:off x="1362767" y="3479422"/>
-            <a:ext cx="1515693" cy="802779"/>
-          </a:xfrm>
-          <a:prstGeom prst="straightConnector1">
-            <a:avLst/>
-          </a:prstGeom>
-          <a:ln w="57150">
-            <a:tailEnd type="triangle"/>
-          </a:ln>
-        </p:spPr>
-        <p:style>
-          <a:lnRef idx="1">
-            <a:schemeClr val="accent4"/>
-          </a:lnRef>
-          <a:fillRef idx="0">
-            <a:schemeClr val="accent4"/>
-          </a:fillRef>
-          <a:effectRef idx="0">
-            <a:schemeClr val="accent4"/>
-          </a:effectRef>
-          <a:fontRef idx="minor">
-            <a:schemeClr val="tx1"/>
-          </a:fontRef>
-        </p:style>
-      </p:cxnSp>
-      <p:sp>
-        <p:nvSpPr>
-          <p:cNvPr id="42" name="ZoneTexte 41">
-            <a:extLst>
-              <a:ext uri="{FF2B5EF4-FFF2-40B4-BE49-F238E27FC236}">
-                <a16:creationId xmlns:a16="http://schemas.microsoft.com/office/drawing/2014/main" id="{259E5B0F-47A2-0F8B-8E54-2792AF8FC8FA}"/>
-              </a:ext>
-            </a:extLst>
-          </p:cNvPr>
-          <p:cNvSpPr txBox="1"/>
-          <p:nvPr/>
-        </p:nvSpPr>
-        <p:spPr>
-          <a:xfrm>
-            <a:off x="2704245" y="2950580"/>
-            <a:ext cx="488609" cy="707886"/>
-          </a:xfrm>
-          <a:prstGeom prst="rect">
-            <a:avLst/>
-          </a:prstGeom>
-          <a:noFill/>
-        </p:spPr>
-        <p:txBody>
-          <a:bodyPr wrap="square" rtlCol="0">
-            <a:spAutoFit/>
-          </a:bodyPr>
-          <a:lstStyle/>
-          <a:p>
-            <a:r>
-              <a:rPr lang="fr-CH" sz="4000" b="1" dirty="0">
-                <a:solidFill>
-                  <a:schemeClr val="accent4"/>
-                </a:solidFill>
-              </a:rPr>
-              <a:t>+   </a:t>
-            </a:r>
-          </a:p>
-        </p:txBody>
-      </p:sp>
-      <p:cxnSp>
-        <p:nvCxnSpPr>
-          <p:cNvPr id="43" name="Connecteur droit avec flèche 42">
-            <a:extLst>
-              <a:ext uri="{FF2B5EF4-FFF2-40B4-BE49-F238E27FC236}">
-                <a16:creationId xmlns:a16="http://schemas.microsoft.com/office/drawing/2014/main" id="{50491FFB-54CB-E2DC-484E-4F3A0BEAA777}"/>
-              </a:ext>
-            </a:extLst>
-          </p:cNvPr>
-          <p:cNvCxnSpPr>
-            <a:cxnSpLocks/>
-            <a:endCxn id="25" idx="0"/>
-          </p:cNvCxnSpPr>
-          <p:nvPr/>
-        </p:nvCxnSpPr>
-        <p:spPr>
-          <a:xfrm flipH="1">
-            <a:off x="4019896" y="3431496"/>
-            <a:ext cx="1227614" cy="851532"/>
-          </a:xfrm>
-          <a:prstGeom prst="straightConnector1">
-            <a:avLst/>
-          </a:prstGeom>
-          <a:ln w="38100" cap="flat" cmpd="sng" algn="ctr">
-            <a:solidFill>
-              <a:schemeClr val="accent5"/>
-            </a:solidFill>
-            <a:prstDash val="dash"/>
-            <a:round/>
-            <a:headEnd type="none" w="med" len="med"/>
-            <a:tailEnd type="arrow" w="med" len="med"/>
-          </a:ln>
-        </p:spPr>
-        <p:style>
-          <a:lnRef idx="0">
-            <a:scrgbClr r="0" g="0" b="0"/>
-          </a:lnRef>
-          <a:fillRef idx="0">
-            <a:scrgbClr r="0" g="0" b="0"/>
-          </a:fillRef>
-          <a:effectRef idx="0">
-            <a:scrgbClr r="0" g="0" b="0"/>
-          </a:effectRef>
-          <a:fontRef idx="minor">
-            <a:schemeClr val="tx1"/>
-          </a:fontRef>
-        </p:style>
-      </p:cxnSp>
-      <p:cxnSp>
-        <p:nvCxnSpPr>
-          <p:cNvPr id="44" name="Connecteur droit avec flèche 43">
-            <a:extLst>
-              <a:ext uri="{FF2B5EF4-FFF2-40B4-BE49-F238E27FC236}">
-                <a16:creationId xmlns:a16="http://schemas.microsoft.com/office/drawing/2014/main" id="{B1FCCF05-483E-AD88-0C70-9FD849CBEA8D}"/>
-              </a:ext>
-            </a:extLst>
-          </p:cNvPr>
-          <p:cNvCxnSpPr>
-            <a:cxnSpLocks/>
-          </p:cNvCxnSpPr>
-          <p:nvPr/>
-        </p:nvCxnSpPr>
-        <p:spPr>
-          <a:xfrm flipH="1">
-            <a:off x="5311053" y="3433731"/>
-            <a:ext cx="2003317" cy="911441"/>
-          </a:xfrm>
-          <a:prstGeom prst="straightConnector1">
-            <a:avLst/>
-          </a:prstGeom>
-          <a:ln w="38100" cap="flat" cmpd="sng" algn="ctr">
-            <a:solidFill>
-              <a:schemeClr val="accent5"/>
-            </a:solidFill>
-            <a:prstDash val="dash"/>
-            <a:round/>
-            <a:headEnd type="none" w="med" len="med"/>
-            <a:tailEnd type="arrow" w="med" len="med"/>
-          </a:ln>
-        </p:spPr>
-        <p:style>
-          <a:lnRef idx="0">
-            <a:scrgbClr r="0" g="0" b="0"/>
-          </a:lnRef>
-          <a:fillRef idx="0">
-            <a:scrgbClr r="0" g="0" b="0"/>
-          </a:fillRef>
-          <a:effectRef idx="0">
-            <a:scrgbClr r="0" g="0" b="0"/>
-          </a:effectRef>
-          <a:fontRef idx="minor">
-            <a:schemeClr val="tx1"/>
-          </a:fontRef>
-        </p:style>
-      </p:cxnSp>
-      <p:sp>
-        <p:nvSpPr>
-          <p:cNvPr id="48" name="Espace réservé du contenu 2">
-            <a:extLst>
-              <a:ext uri="{FF2B5EF4-FFF2-40B4-BE49-F238E27FC236}">
-                <a16:creationId xmlns:a16="http://schemas.microsoft.com/office/drawing/2014/main" id="{62425B55-03D6-7949-9B81-583B917DCBCC}"/>
-              </a:ext>
-            </a:extLst>
-          </p:cNvPr>
-          <p:cNvSpPr txBox="1">
-            <a:spLocks/>
-          </p:cNvSpPr>
-          <p:nvPr/>
-        </p:nvSpPr>
-        <p:spPr>
-          <a:xfrm>
-            <a:off x="694055" y="5203661"/>
-            <a:ext cx="9584617" cy="1147520"/>
-          </a:xfrm>
-          <a:prstGeom prst="rect">
-            <a:avLst/>
-          </a:prstGeom>
-        </p:spPr>
-        <p:txBody>
-          <a:bodyPr vert="horz" lIns="91440" tIns="45720" rIns="91440" bIns="45720" rtlCol="0">
-            <a:normAutofit/>
-          </a:bodyPr>
-          <a:lstStyle>
-            <a:lvl1pPr marL="228600" indent="-228600" algn="l" defTabSz="914400" rtl="0" eaLnBrk="1" latinLnBrk="0" hangingPunct="1">
-              <a:lnSpc>
-                <a:spcPct val="120000"/>
-              </a:lnSpc>
-              <a:spcBef>
-                <a:spcPts val="1000"/>
-              </a:spcBef>
-              <a:buFont typeface="Arial" panose="020B0604020202020204" pitchFamily="34" charset="0"/>
-              <a:buChar char="•"/>
-              <a:defRPr sz="2000" kern="1200">
-                <a:solidFill>
-                  <a:schemeClr val="tx1"/>
-                </a:solidFill>
-                <a:effectLst>
-                  <a:outerShdw blurRad="50800" dist="38100" dir="2700000" algn="tl" rotWithShape="0">
-                    <a:srgbClr val="000000">
-                      <a:alpha val="48000"/>
-                    </a:srgbClr>
-                  </a:outerShdw>
-                </a:effectLst>
-                <a:latin typeface="+mn-lt"/>
-                <a:ea typeface="+mn-ea"/>
-                <a:cs typeface="+mn-cs"/>
-              </a:defRPr>
-            </a:lvl1pPr>
-            <a:lvl2pPr marL="685800" indent="-228600" algn="l" defTabSz="914400" rtl="0" eaLnBrk="1" latinLnBrk="0" hangingPunct="1">
-              <a:lnSpc>
-                <a:spcPct val="120000"/>
-              </a:lnSpc>
-              <a:spcBef>
-                <a:spcPts val="500"/>
-              </a:spcBef>
-              <a:buFont typeface="Arial" panose="020B0604020202020204" pitchFamily="34" charset="0"/>
-              <a:buChar char="•"/>
-              <a:defRPr sz="1800" kern="1200">
-                <a:solidFill>
-                  <a:schemeClr val="tx1"/>
-                </a:solidFill>
-                <a:effectLst>
-                  <a:outerShdw blurRad="50800" dist="38100" dir="2700000" algn="tl" rotWithShape="0">
-                    <a:srgbClr val="000000">
-                      <a:alpha val="48000"/>
-                    </a:srgbClr>
-                  </a:outerShdw>
-                </a:effectLst>
-                <a:latin typeface="+mn-lt"/>
-                <a:ea typeface="+mn-ea"/>
-                <a:cs typeface="+mn-cs"/>
-              </a:defRPr>
-            </a:lvl2pPr>
-            <a:lvl3pPr marL="1143000" indent="-228600" algn="l" defTabSz="914400" rtl="0" eaLnBrk="1" latinLnBrk="0" hangingPunct="1">
-              <a:lnSpc>
-                <a:spcPct val="120000"/>
-              </a:lnSpc>
-              <a:spcBef>
-                <a:spcPts val="500"/>
-              </a:spcBef>
-              <a:buFont typeface="Arial" panose="020B0604020202020204" pitchFamily="34" charset="0"/>
-              <a:buChar char="•"/>
-              <a:defRPr sz="1600" kern="1200">
-                <a:solidFill>
-                  <a:schemeClr val="tx1"/>
-                </a:solidFill>
-                <a:effectLst>
-                  <a:outerShdw blurRad="50800" dist="38100" dir="2700000" algn="tl" rotWithShape="0">
-                    <a:srgbClr val="000000">
-                      <a:alpha val="48000"/>
-                    </a:srgbClr>
-                  </a:outerShdw>
-                </a:effectLst>
-                <a:latin typeface="+mn-lt"/>
-                <a:ea typeface="+mn-ea"/>
-                <a:cs typeface="+mn-cs"/>
-              </a:defRPr>
-            </a:lvl3pPr>
-            <a:lvl4pPr marL="1600200" indent="-228600" algn="l" defTabSz="914400" rtl="0" eaLnBrk="1" latinLnBrk="0" hangingPunct="1">
-              <a:lnSpc>
-                <a:spcPct val="120000"/>
-              </a:lnSpc>
-              <a:spcBef>
-                <a:spcPts val="500"/>
-              </a:spcBef>
-              <a:buFont typeface="Arial" panose="020B0604020202020204" pitchFamily="34" charset="0"/>
-              <a:buChar char="•"/>
-              <a:defRPr sz="1400" kern="1200">
-                <a:solidFill>
-                  <a:schemeClr val="tx1"/>
-                </a:solidFill>
-                <a:effectLst>
-                  <a:outerShdw blurRad="50800" dist="38100" dir="2700000" algn="tl" rotWithShape="0">
-                    <a:srgbClr val="000000">
-                      <a:alpha val="48000"/>
-                    </a:srgbClr>
-                  </a:outerShdw>
-                </a:effectLst>
-                <a:latin typeface="+mn-lt"/>
-                <a:ea typeface="+mn-ea"/>
-                <a:cs typeface="+mn-cs"/>
-              </a:defRPr>
-            </a:lvl4pPr>
-            <a:lvl5pPr marL="2057400" indent="-228600" algn="l" defTabSz="914400" rtl="0" eaLnBrk="1" latinLnBrk="0" hangingPunct="1">
-              <a:lnSpc>
-                <a:spcPct val="120000"/>
-              </a:lnSpc>
-              <a:spcBef>
-                <a:spcPts val="500"/>
-              </a:spcBef>
-              <a:buFont typeface="Arial" panose="020B0604020202020204" pitchFamily="34" charset="0"/>
-              <a:buChar char="•"/>
-              <a:defRPr sz="1200" kern="1200">
-                <a:solidFill>
-                  <a:schemeClr val="tx1"/>
-                </a:solidFill>
-                <a:effectLst>
-                  <a:outerShdw blurRad="50800" dist="38100" dir="2700000" algn="tl" rotWithShape="0">
-                    <a:srgbClr val="000000">
-                      <a:alpha val="48000"/>
-                    </a:srgbClr>
-                  </a:outerShdw>
-                </a:effectLst>
-                <a:latin typeface="+mn-lt"/>
-                <a:ea typeface="+mn-ea"/>
-                <a:cs typeface="+mn-cs"/>
-              </a:defRPr>
-            </a:lvl5pPr>
-            <a:lvl6pPr marL="2514600" indent="-228600" algn="l" defTabSz="914400" rtl="0" eaLnBrk="1" latinLnBrk="0" hangingPunct="1">
-              <a:lnSpc>
-                <a:spcPct val="120000"/>
-              </a:lnSpc>
-              <a:spcBef>
-                <a:spcPts val="500"/>
-              </a:spcBef>
-              <a:buFont typeface="Arial" panose="020B0604020202020204" pitchFamily="34" charset="0"/>
-              <a:buChar char="•"/>
-              <a:defRPr sz="1200" kern="1200">
-                <a:solidFill>
-                  <a:schemeClr val="tx1"/>
-                </a:solidFill>
-                <a:effectLst>
-                  <a:outerShdw blurRad="50800" dist="38100" dir="2700000" algn="tl" rotWithShape="0">
-                    <a:srgbClr val="000000">
-                      <a:alpha val="48000"/>
-                    </a:srgbClr>
-                  </a:outerShdw>
-                </a:effectLst>
-                <a:latin typeface="+mn-lt"/>
-                <a:ea typeface="+mn-ea"/>
-                <a:cs typeface="+mn-cs"/>
-              </a:defRPr>
-            </a:lvl6pPr>
-            <a:lvl7pPr marL="2971800" indent="-228600" algn="l" defTabSz="914400" rtl="0" eaLnBrk="1" latinLnBrk="0" hangingPunct="1">
-              <a:lnSpc>
-                <a:spcPct val="120000"/>
-              </a:lnSpc>
-              <a:spcBef>
-                <a:spcPts val="500"/>
-              </a:spcBef>
-              <a:buFont typeface="Arial" panose="020B0604020202020204" pitchFamily="34" charset="0"/>
-              <a:buChar char="•"/>
-              <a:defRPr sz="1200" kern="1200">
-                <a:solidFill>
-                  <a:schemeClr val="tx1"/>
-                </a:solidFill>
-                <a:effectLst>
-                  <a:outerShdw blurRad="50800" dist="38100" dir="2700000" algn="tl" rotWithShape="0">
-                    <a:srgbClr val="000000">
-                      <a:alpha val="48000"/>
-                    </a:srgbClr>
-                  </a:outerShdw>
-                </a:effectLst>
-                <a:latin typeface="+mn-lt"/>
-                <a:ea typeface="+mn-ea"/>
-                <a:cs typeface="+mn-cs"/>
-              </a:defRPr>
-            </a:lvl7pPr>
-            <a:lvl8pPr marL="3429000" indent="-228600" algn="l" defTabSz="914400" rtl="0" eaLnBrk="1" latinLnBrk="0" hangingPunct="1">
-              <a:lnSpc>
-                <a:spcPct val="120000"/>
-              </a:lnSpc>
-              <a:spcBef>
-                <a:spcPts val="500"/>
-              </a:spcBef>
-              <a:buFont typeface="Arial" panose="020B0604020202020204" pitchFamily="34" charset="0"/>
-              <a:buChar char="•"/>
-              <a:defRPr sz="1200" kern="1200">
-                <a:solidFill>
-                  <a:schemeClr val="tx1"/>
-                </a:solidFill>
-                <a:effectLst>
-                  <a:outerShdw blurRad="50800" dist="38100" dir="2700000" algn="tl" rotWithShape="0">
-                    <a:srgbClr val="000000">
-                      <a:alpha val="48000"/>
-                    </a:srgbClr>
-                  </a:outerShdw>
-                </a:effectLst>
-                <a:latin typeface="+mn-lt"/>
-                <a:ea typeface="+mn-ea"/>
-                <a:cs typeface="+mn-cs"/>
-              </a:defRPr>
-            </a:lvl8pPr>
-            <a:lvl9pPr marL="3886200" indent="-228600" algn="l" defTabSz="914400" rtl="0" eaLnBrk="1" latinLnBrk="0" hangingPunct="1">
-              <a:lnSpc>
-                <a:spcPct val="120000"/>
-              </a:lnSpc>
-              <a:spcBef>
-                <a:spcPts val="500"/>
-              </a:spcBef>
-              <a:buFont typeface="Arial" panose="020B0604020202020204" pitchFamily="34" charset="0"/>
-              <a:buChar char="•"/>
-              <a:defRPr sz="1200" kern="1200">
-                <a:solidFill>
-                  <a:schemeClr val="tx1"/>
-                </a:solidFill>
-                <a:effectLst>
-                  <a:outerShdw blurRad="50800" dist="38100" dir="2700000" algn="tl" rotWithShape="0">
-                    <a:srgbClr val="000000">
-                      <a:alpha val="48000"/>
-                    </a:srgbClr>
-                  </a:outerShdw>
-                </a:effectLst>
-                <a:latin typeface="+mn-lt"/>
-                <a:ea typeface="+mn-ea"/>
-                <a:cs typeface="+mn-cs"/>
-              </a:defRPr>
-            </a:lvl9pPr>
-          </a:lstStyle>
-          <a:p>
-            <a:r>
-              <a:rPr lang="fr-CH" dirty="0"/>
-              <a:t>Et ainsi de suite…</a:t>
-            </a:r>
-          </a:p>
-          <a:p>
-            <a:r>
-              <a:rPr lang="fr-CH" dirty="0"/>
-              <a:t>La fonction </a:t>
-            </a:r>
-            <a:r>
-              <a:rPr lang="fr-CH" sz="3200" b="1" dirty="0">
-                <a:solidFill>
-                  <a:schemeClr val="accent4">
-                    <a:lumMod val="75000"/>
-                  </a:schemeClr>
-                </a:solidFill>
-              </a:rPr>
-              <a:t>+</a:t>
-            </a:r>
-            <a:r>
-              <a:rPr lang="fr-CH" dirty="0"/>
-              <a:t> est totalement libre, c'est un lambda (element1,element2)=&gt;{…}</a:t>
-            </a:r>
-          </a:p>
-        </p:txBody>
-      </p:sp>
-    </p:spTree>
-    <p:extLst>
-      <p:ext uri="{BB962C8B-B14F-4D97-AF65-F5344CB8AC3E}">
-        <p14:creationId xmlns:p14="http://schemas.microsoft.com/office/powerpoint/2010/main" val="3678624622"/>
-      </p:ext>
-    </p:extLst>
-  </p:cSld>
-  <p:clrMapOvr>
-    <a:masterClrMapping/>
-  </p:clrMapOvr>
-  <p:timing>
-    <p:tnLst>
-      <p:par>
-        <p:cTn id="1" dur="indefinite" restart="never" nodeType="tmRoot">
-          <p:childTnLst>
-            <p:seq concurrent="1" nextAc="seek">
-              <p:cTn id="2" dur="indefinite" nodeType="mainSeq">
-                <p:childTnLst>
-                  <p:par>
-                    <p:cTn id="3" fill="hold">
-                      <p:stCondLst>
-                        <p:cond delay="indefinite"/>
-                      </p:stCondLst>
-                      <p:childTnLst>
-                        <p:par>
-                          <p:cTn id="4" fill="hold">
-                            <p:stCondLst>
-                              <p:cond delay="0"/>
-                            </p:stCondLst>
-                            <p:childTnLst>
-                              <p:par>
-                                <p:cTn id="5" presetID="1" presetClass="entr" presetSubtype="0" fill="hold" nodeType="clickEffect">
-                                  <p:stCondLst>
-                                    <p:cond delay="0"/>
-                                  </p:stCondLst>
-                                  <p:childTnLst>
-                                    <p:set>
-                                      <p:cBhvr>
-                                        <p:cTn id="6" dur="1" fill="hold">
-                                          <p:stCondLst>
-                                            <p:cond delay="0"/>
-                                          </p:stCondLst>
-                                        </p:cTn>
-                                        <p:tgtEl>
-                                          <p:spTgt spid="5"/>
-                                        </p:tgtEl>
-                                        <p:attrNameLst>
-                                          <p:attrName>style.visibility</p:attrName>
-                                        </p:attrNameLst>
-                                      </p:cBhvr>
-                                      <p:to>
-                                        <p:strVal val="visible"/>
-                                      </p:to>
-                                    </p:set>
-                                  </p:childTnLst>
-                                </p:cTn>
-                              </p:par>
-                            </p:childTnLst>
-                          </p:cTn>
-                        </p:par>
-                      </p:childTnLst>
-                    </p:cTn>
-                  </p:par>
-                  <p:par>
-                    <p:cTn id="7" fill="hold">
-                      <p:stCondLst>
-                        <p:cond delay="indefinite"/>
-                      </p:stCondLst>
-                      <p:childTnLst>
-                        <p:par>
-                          <p:cTn id="8" fill="hold">
-                            <p:stCondLst>
-                              <p:cond delay="0"/>
-                            </p:stCondLst>
-                            <p:childTnLst>
-                              <p:par>
-                                <p:cTn id="9" presetID="10" presetClass="entr" presetSubtype="0" fill="hold" grpId="0" nodeType="clickEffect">
-                                  <p:stCondLst>
-                                    <p:cond delay="0"/>
-                                  </p:stCondLst>
-                                  <p:childTnLst>
-                                    <p:set>
-                                      <p:cBhvr>
-                                        <p:cTn id="10" dur="1" fill="hold">
-                                          <p:stCondLst>
-                                            <p:cond delay="0"/>
-                                          </p:stCondLst>
-                                        </p:cTn>
-                                        <p:tgtEl>
-                                          <p:spTgt spid="6"/>
-                                        </p:tgtEl>
-                                        <p:attrNameLst>
-                                          <p:attrName>style.visibility</p:attrName>
-                                        </p:attrNameLst>
-                                      </p:cBhvr>
-                                      <p:to>
-                                        <p:strVal val="visible"/>
-                                      </p:to>
-                                    </p:set>
-                                    <p:animEffect transition="in" filter="fade">
-                                      <p:cBhvr>
-                                        <p:cTn id="11" dur="500"/>
-                                        <p:tgtEl>
-                                          <p:spTgt spid="6"/>
-                                        </p:tgtEl>
-                                      </p:cBhvr>
-                                    </p:animEffect>
-                                  </p:childTnLst>
-                                </p:cTn>
-                              </p:par>
-                            </p:childTnLst>
-                          </p:cTn>
-                        </p:par>
-                      </p:childTnLst>
-                    </p:cTn>
-                  </p:par>
-                  <p:par>
-                    <p:cTn id="12" fill="hold">
-                      <p:stCondLst>
-                        <p:cond delay="indefinite"/>
-                      </p:stCondLst>
-                      <p:childTnLst>
-                        <p:par>
-                          <p:cTn id="13" fill="hold">
-                            <p:stCondLst>
-                              <p:cond delay="0"/>
-                            </p:stCondLst>
-                            <p:childTnLst>
-                              <p:par>
-                                <p:cTn id="14" presetID="1" presetClass="entr" presetSubtype="0" fill="hold" grpId="0" nodeType="clickEffect">
-                                  <p:stCondLst>
-                                    <p:cond delay="0"/>
-                                  </p:stCondLst>
-                                  <p:childTnLst>
-                                    <p:set>
-                                      <p:cBhvr>
-                                        <p:cTn id="15" dur="1" fill="hold">
-                                          <p:stCondLst>
-                                            <p:cond delay="0"/>
-                                          </p:stCondLst>
-                                        </p:cTn>
-                                        <p:tgtEl>
-                                          <p:spTgt spid="9"/>
-                                        </p:tgtEl>
-                                        <p:attrNameLst>
-                                          <p:attrName>style.visibility</p:attrName>
-                                        </p:attrNameLst>
-                                      </p:cBhvr>
-                                      <p:to>
-                                        <p:strVal val="visible"/>
-                                      </p:to>
-                                    </p:set>
-                                  </p:childTnLst>
-                                </p:cTn>
-                              </p:par>
-                            </p:childTnLst>
-                          </p:cTn>
-                        </p:par>
-                      </p:childTnLst>
-                    </p:cTn>
-                  </p:par>
-                  <p:par>
-                    <p:cTn id="16" fill="hold">
-                      <p:stCondLst>
-                        <p:cond delay="indefinite"/>
-                      </p:stCondLst>
-                      <p:childTnLst>
-                        <p:par>
-                          <p:cTn id="17" fill="hold">
-                            <p:stCondLst>
-                              <p:cond delay="0"/>
-                            </p:stCondLst>
-                            <p:childTnLst>
-                              <p:par>
-                                <p:cTn id="18" presetID="22" presetClass="entr" presetSubtype="1" fill="hold" nodeType="clickEffect">
-                                  <p:stCondLst>
-                                    <p:cond delay="0"/>
-                                  </p:stCondLst>
-                                  <p:childTnLst>
-                                    <p:set>
-                                      <p:cBhvr>
-                                        <p:cTn id="19" dur="1" fill="hold">
-                                          <p:stCondLst>
-                                            <p:cond delay="0"/>
-                                          </p:stCondLst>
-                                        </p:cTn>
-                                        <p:tgtEl>
-                                          <p:spTgt spid="8"/>
-                                        </p:tgtEl>
-                                        <p:attrNameLst>
-                                          <p:attrName>style.visibility</p:attrName>
-                                        </p:attrNameLst>
-                                      </p:cBhvr>
-                                      <p:to>
-                                        <p:strVal val="visible"/>
-                                      </p:to>
-                                    </p:set>
-                                    <p:animEffect transition="in" filter="wipe(up)">
-                                      <p:cBhvr>
-                                        <p:cTn id="20" dur="500"/>
-                                        <p:tgtEl>
-                                          <p:spTgt spid="8"/>
-                                        </p:tgtEl>
-                                      </p:cBhvr>
-                                    </p:animEffect>
-                                  </p:childTnLst>
-                                </p:cTn>
-                              </p:par>
-                            </p:childTnLst>
-                          </p:cTn>
-                        </p:par>
-                        <p:par>
-                          <p:cTn id="21" fill="hold">
-                            <p:stCondLst>
-                              <p:cond delay="500"/>
-                            </p:stCondLst>
-                            <p:childTnLst>
-                              <p:par>
-                                <p:cTn id="22" presetID="1" presetClass="entr" presetSubtype="0" fill="hold" nodeType="afterEffect">
-                                  <p:stCondLst>
-                                    <p:cond delay="0"/>
-                                  </p:stCondLst>
-                                  <p:childTnLst>
-                                    <p:set>
-                                      <p:cBhvr>
-                                        <p:cTn id="23" dur="1" fill="hold">
-                                          <p:stCondLst>
-                                            <p:cond delay="0"/>
-                                          </p:stCondLst>
-                                        </p:cTn>
-                                        <p:tgtEl>
-                                          <p:spTgt spid="24"/>
-                                        </p:tgtEl>
-                                        <p:attrNameLst>
-                                          <p:attrName>style.visibility</p:attrName>
-                                        </p:attrNameLst>
-                                      </p:cBhvr>
-                                      <p:to>
-                                        <p:strVal val="visible"/>
-                                      </p:to>
-                                    </p:set>
-                                  </p:childTnLst>
-                                </p:cTn>
-                              </p:par>
-                            </p:childTnLst>
-                          </p:cTn>
-                        </p:par>
-                        <p:par>
-                          <p:cTn id="24" fill="hold">
-                            <p:stCondLst>
-                              <p:cond delay="500"/>
-                            </p:stCondLst>
-                            <p:childTnLst>
-                              <p:par>
-                                <p:cTn id="25" presetID="22" presetClass="entr" presetSubtype="1" fill="hold" nodeType="afterEffect">
-                                  <p:stCondLst>
-                                    <p:cond delay="0"/>
-                                  </p:stCondLst>
-                                  <p:childTnLst>
-                                    <p:set>
-                                      <p:cBhvr>
-                                        <p:cTn id="26" dur="1" fill="hold">
-                                          <p:stCondLst>
-                                            <p:cond delay="0"/>
-                                          </p:stCondLst>
-                                        </p:cTn>
-                                        <p:tgtEl>
-                                          <p:spTgt spid="11"/>
-                                        </p:tgtEl>
-                                        <p:attrNameLst>
-                                          <p:attrName>style.visibility</p:attrName>
-                                        </p:attrNameLst>
-                                      </p:cBhvr>
-                                      <p:to>
-                                        <p:strVal val="visible"/>
-                                      </p:to>
-                                    </p:set>
-                                    <p:animEffect transition="in" filter="wipe(up)">
-                                      <p:cBhvr>
-                                        <p:cTn id="27" dur="500"/>
-                                        <p:tgtEl>
-                                          <p:spTgt spid="11"/>
-                                        </p:tgtEl>
-                                      </p:cBhvr>
-                                    </p:animEffect>
-                                  </p:childTnLst>
-                                </p:cTn>
-                              </p:par>
-                              <p:par>
-                                <p:cTn id="28" presetID="22" presetClass="entr" presetSubtype="1" fill="hold" nodeType="withEffect">
-                                  <p:stCondLst>
-                                    <p:cond delay="0"/>
-                                  </p:stCondLst>
-                                  <p:childTnLst>
-                                    <p:set>
-                                      <p:cBhvr>
-                                        <p:cTn id="29" dur="1" fill="hold">
-                                          <p:stCondLst>
-                                            <p:cond delay="0"/>
-                                          </p:stCondLst>
-                                        </p:cTn>
-                                        <p:tgtEl>
-                                          <p:spTgt spid="28"/>
-                                        </p:tgtEl>
-                                        <p:attrNameLst>
-                                          <p:attrName>style.visibility</p:attrName>
-                                        </p:attrNameLst>
-                                      </p:cBhvr>
-                                      <p:to>
-                                        <p:strVal val="visible"/>
-                                      </p:to>
-                                    </p:set>
-                                    <p:animEffect transition="in" filter="wipe(up)">
-                                      <p:cBhvr>
-                                        <p:cTn id="30" dur="500"/>
-                                        <p:tgtEl>
-                                          <p:spTgt spid="28"/>
-                                        </p:tgtEl>
-                                      </p:cBhvr>
-                                    </p:animEffect>
-                                  </p:childTnLst>
-                                </p:cTn>
-                              </p:par>
-                              <p:par>
-                                <p:cTn id="31" presetID="22" presetClass="entr" presetSubtype="1" fill="hold" nodeType="withEffect">
-                                  <p:stCondLst>
-                                    <p:cond delay="0"/>
-                                  </p:stCondLst>
-                                  <p:childTnLst>
-                                    <p:set>
-                                      <p:cBhvr>
-                                        <p:cTn id="32" dur="1" fill="hold">
-                                          <p:stCondLst>
-                                            <p:cond delay="0"/>
-                                          </p:stCondLst>
-                                        </p:cTn>
-                                        <p:tgtEl>
-                                          <p:spTgt spid="29"/>
-                                        </p:tgtEl>
-                                        <p:attrNameLst>
-                                          <p:attrName>style.visibility</p:attrName>
-                                        </p:attrNameLst>
-                                      </p:cBhvr>
-                                      <p:to>
-                                        <p:strVal val="visible"/>
-                                      </p:to>
-                                    </p:set>
-                                    <p:animEffect transition="in" filter="wipe(up)">
-                                      <p:cBhvr>
-                                        <p:cTn id="33" dur="500"/>
-                                        <p:tgtEl>
-                                          <p:spTgt spid="29"/>
-                                        </p:tgtEl>
-                                      </p:cBhvr>
-                                    </p:animEffect>
-                                  </p:childTnLst>
-                                </p:cTn>
-                              </p:par>
-                            </p:childTnLst>
-                          </p:cTn>
-                        </p:par>
-                      </p:childTnLst>
-                    </p:cTn>
-                  </p:par>
-                  <p:par>
-                    <p:cTn id="34" fill="hold">
-                      <p:stCondLst>
-                        <p:cond delay="indefinite"/>
-                      </p:stCondLst>
-                      <p:childTnLst>
-                        <p:par>
-                          <p:cTn id="35" fill="hold">
-                            <p:stCondLst>
-                              <p:cond delay="0"/>
-                            </p:stCondLst>
-                            <p:childTnLst>
-                              <p:par>
-                                <p:cTn id="36" presetID="10" presetClass="entr" presetSubtype="0" fill="hold" grpId="0" nodeType="clickEffect">
-                                  <p:stCondLst>
-                                    <p:cond delay="0"/>
-                                  </p:stCondLst>
-                                  <p:childTnLst>
-                                    <p:set>
-                                      <p:cBhvr>
-                                        <p:cTn id="37" dur="1" fill="hold">
-                                          <p:stCondLst>
-                                            <p:cond delay="0"/>
-                                          </p:stCondLst>
-                                        </p:cTn>
-                                        <p:tgtEl>
-                                          <p:spTgt spid="40"/>
-                                        </p:tgtEl>
-                                        <p:attrNameLst>
-                                          <p:attrName>style.visibility</p:attrName>
-                                        </p:attrNameLst>
-                                      </p:cBhvr>
-                                      <p:to>
-                                        <p:strVal val="visible"/>
-                                      </p:to>
-                                    </p:set>
-                                    <p:animEffect transition="in" filter="fade">
-                                      <p:cBhvr>
-                                        <p:cTn id="38" dur="500"/>
-                                        <p:tgtEl>
-                                          <p:spTgt spid="40"/>
-                                        </p:tgtEl>
-                                      </p:cBhvr>
-                                    </p:animEffect>
-                                  </p:childTnLst>
-                                </p:cTn>
-                              </p:par>
-                            </p:childTnLst>
-                          </p:cTn>
-                        </p:par>
-                      </p:childTnLst>
-                    </p:cTn>
-                  </p:par>
-                  <p:par>
-                    <p:cTn id="39" fill="hold">
-                      <p:stCondLst>
-                        <p:cond delay="indefinite"/>
-                      </p:stCondLst>
-                      <p:childTnLst>
-                        <p:par>
-                          <p:cTn id="40" fill="hold">
-                            <p:stCondLst>
-                              <p:cond delay="0"/>
-                            </p:stCondLst>
-                            <p:childTnLst>
-                              <p:par>
-                                <p:cTn id="41" presetID="1" presetClass="entr" presetSubtype="0" fill="hold" grpId="0" nodeType="clickEffect">
-                                  <p:stCondLst>
-                                    <p:cond delay="0"/>
-                                  </p:stCondLst>
-                                  <p:childTnLst>
-                                    <p:set>
-                                      <p:cBhvr>
-                                        <p:cTn id="42" dur="1" fill="hold">
-                                          <p:stCondLst>
-                                            <p:cond delay="0"/>
-                                          </p:stCondLst>
-                                        </p:cTn>
-                                        <p:tgtEl>
-                                          <p:spTgt spid="42"/>
-                                        </p:tgtEl>
-                                        <p:attrNameLst>
-                                          <p:attrName>style.visibility</p:attrName>
-                                        </p:attrNameLst>
-                                      </p:cBhvr>
-                                      <p:to>
-                                        <p:strVal val="visible"/>
-                                      </p:to>
-                                    </p:set>
-                                  </p:childTnLst>
-                                </p:cTn>
-                              </p:par>
-                            </p:childTnLst>
-                          </p:cTn>
-                        </p:par>
-                      </p:childTnLst>
-                    </p:cTn>
-                  </p:par>
-                  <p:par>
-                    <p:cTn id="43" fill="hold">
-                      <p:stCondLst>
-                        <p:cond delay="indefinite"/>
-                      </p:stCondLst>
-                      <p:childTnLst>
-                        <p:par>
-                          <p:cTn id="44" fill="hold">
-                            <p:stCondLst>
-                              <p:cond delay="0"/>
-                            </p:stCondLst>
-                            <p:childTnLst>
-                              <p:par>
-                                <p:cTn id="45" presetID="22" presetClass="entr" presetSubtype="1" fill="hold" nodeType="clickEffect">
-                                  <p:stCondLst>
-                                    <p:cond delay="0"/>
-                                  </p:stCondLst>
-                                  <p:childTnLst>
-                                    <p:set>
-                                      <p:cBhvr>
-                                        <p:cTn id="46" dur="1" fill="hold">
-                                          <p:stCondLst>
-                                            <p:cond delay="0"/>
-                                          </p:stCondLst>
-                                        </p:cTn>
-                                        <p:tgtEl>
-                                          <p:spTgt spid="41"/>
-                                        </p:tgtEl>
-                                        <p:attrNameLst>
-                                          <p:attrName>style.visibility</p:attrName>
-                                        </p:attrNameLst>
-                                      </p:cBhvr>
-                                      <p:to>
-                                        <p:strVal val="visible"/>
-                                      </p:to>
-                                    </p:set>
-                                    <p:animEffect transition="in" filter="wipe(up)">
-                                      <p:cBhvr>
-                                        <p:cTn id="47" dur="500"/>
-                                        <p:tgtEl>
-                                          <p:spTgt spid="41"/>
-                                        </p:tgtEl>
-                                      </p:cBhvr>
-                                    </p:animEffect>
-                                  </p:childTnLst>
-                                </p:cTn>
-                              </p:par>
-                            </p:childTnLst>
-                          </p:cTn>
-                        </p:par>
-                        <p:par>
-                          <p:cTn id="48" fill="hold">
-                            <p:stCondLst>
-                              <p:cond delay="500"/>
-                            </p:stCondLst>
-                            <p:childTnLst>
-                              <p:par>
-                                <p:cTn id="49" presetID="1" presetClass="entr" presetSubtype="0" fill="hold" nodeType="afterEffect">
-                                  <p:stCondLst>
-                                    <p:cond delay="0"/>
-                                  </p:stCondLst>
-                                  <p:childTnLst>
-                                    <p:set>
-                                      <p:cBhvr>
-                                        <p:cTn id="50" dur="1" fill="hold">
-                                          <p:stCondLst>
-                                            <p:cond delay="0"/>
-                                          </p:stCondLst>
-                                        </p:cTn>
-                                        <p:tgtEl>
-                                          <p:spTgt spid="25"/>
-                                        </p:tgtEl>
-                                        <p:attrNameLst>
-                                          <p:attrName>style.visibility</p:attrName>
-                                        </p:attrNameLst>
-                                      </p:cBhvr>
-                                      <p:to>
-                                        <p:strVal val="visible"/>
-                                      </p:to>
-                                    </p:set>
-                                  </p:childTnLst>
-                                </p:cTn>
-                              </p:par>
-                              <p:par>
-                                <p:cTn id="51" presetID="22" presetClass="entr" presetSubtype="1" fill="hold" nodeType="withEffect">
-                                  <p:stCondLst>
-                                    <p:cond delay="0"/>
-                                  </p:stCondLst>
-                                  <p:childTnLst>
-                                    <p:set>
-                                      <p:cBhvr>
-                                        <p:cTn id="52" dur="1" fill="hold">
-                                          <p:stCondLst>
-                                            <p:cond delay="0"/>
-                                          </p:stCondLst>
-                                        </p:cTn>
-                                        <p:tgtEl>
-                                          <p:spTgt spid="43"/>
-                                        </p:tgtEl>
-                                        <p:attrNameLst>
-                                          <p:attrName>style.visibility</p:attrName>
-                                        </p:attrNameLst>
-                                      </p:cBhvr>
-                                      <p:to>
-                                        <p:strVal val="visible"/>
-                                      </p:to>
-                                    </p:set>
-                                    <p:animEffect transition="in" filter="wipe(up)">
-                                      <p:cBhvr>
-                                        <p:cTn id="53" dur="500"/>
-                                        <p:tgtEl>
-                                          <p:spTgt spid="43"/>
-                                        </p:tgtEl>
-                                      </p:cBhvr>
-                                    </p:animEffect>
-                                  </p:childTnLst>
-                                </p:cTn>
-                              </p:par>
-                              <p:par>
-                                <p:cTn id="54" presetID="22" presetClass="entr" presetSubtype="1" fill="hold" nodeType="withEffect">
-                                  <p:stCondLst>
-                                    <p:cond delay="0"/>
-                                  </p:stCondLst>
-                                  <p:childTnLst>
-                                    <p:set>
-                                      <p:cBhvr>
-                                        <p:cTn id="55" dur="1" fill="hold">
-                                          <p:stCondLst>
-                                            <p:cond delay="0"/>
-                                          </p:stCondLst>
-                                        </p:cTn>
-                                        <p:tgtEl>
-                                          <p:spTgt spid="44"/>
-                                        </p:tgtEl>
-                                        <p:attrNameLst>
-                                          <p:attrName>style.visibility</p:attrName>
-                                        </p:attrNameLst>
-                                      </p:cBhvr>
-                                      <p:to>
-                                        <p:strVal val="visible"/>
-                                      </p:to>
-                                    </p:set>
-                                    <p:animEffect transition="in" filter="wipe(up)">
-                                      <p:cBhvr>
-                                        <p:cTn id="56" dur="500"/>
-                                        <p:tgtEl>
-                                          <p:spTgt spid="44"/>
-                                        </p:tgtEl>
-                                      </p:cBhvr>
-                                    </p:animEffect>
-                                  </p:childTnLst>
-                                </p:cTn>
-                              </p:par>
-                            </p:childTnLst>
-                          </p:cTn>
-                        </p:par>
-                      </p:childTnLst>
-                    </p:cTn>
-                  </p:par>
-                  <p:par>
-                    <p:cTn id="57" fill="hold">
-                      <p:stCondLst>
-                        <p:cond delay="indefinite"/>
-                      </p:stCondLst>
-                      <p:childTnLst>
-                        <p:par>
-                          <p:cTn id="58" fill="hold">
-                            <p:stCondLst>
-                              <p:cond delay="0"/>
-                            </p:stCondLst>
-                            <p:childTnLst>
-                              <p:par>
-                                <p:cTn id="59" presetID="1" presetClass="entr" presetSubtype="0" fill="hold" grpId="0" nodeType="clickEffect">
-                                  <p:stCondLst>
-                                    <p:cond delay="0"/>
-                                  </p:stCondLst>
-                                  <p:childTnLst>
-                                    <p:set>
-                                      <p:cBhvr>
-                                        <p:cTn id="60" dur="1" fill="hold">
-                                          <p:stCondLst>
-                                            <p:cond delay="0"/>
-                                          </p:stCondLst>
-                                        </p:cTn>
-                                        <p:tgtEl>
-                                          <p:spTgt spid="48">
-                                            <p:txEl>
-                                              <p:pRg st="0" end="0"/>
-                                            </p:txEl>
-                                          </p:spTgt>
-                                        </p:tgtEl>
-                                        <p:attrNameLst>
-                                          <p:attrName>style.visibility</p:attrName>
-                                        </p:attrNameLst>
-                                      </p:cBhvr>
-                                      <p:to>
-                                        <p:strVal val="visible"/>
-                                      </p:to>
-                                    </p:set>
-                                  </p:childTnLst>
-                                </p:cTn>
-                              </p:par>
-                            </p:childTnLst>
-                          </p:cTn>
-                        </p:par>
-                      </p:childTnLst>
-                    </p:cTn>
-                  </p:par>
-                  <p:par>
-                    <p:cTn id="61" fill="hold">
-                      <p:stCondLst>
-                        <p:cond delay="indefinite"/>
-                      </p:stCondLst>
-                      <p:childTnLst>
-                        <p:par>
-                          <p:cTn id="62" fill="hold">
-                            <p:stCondLst>
-                              <p:cond delay="0"/>
-                            </p:stCondLst>
-                            <p:childTnLst>
-                              <p:par>
-                                <p:cTn id="63" presetID="1" presetClass="entr" presetSubtype="0" fill="hold" grpId="0" nodeType="clickEffect">
-                                  <p:stCondLst>
-                                    <p:cond delay="0"/>
-                                  </p:stCondLst>
-                                  <p:childTnLst>
-                                    <p:set>
-                                      <p:cBhvr>
-                                        <p:cTn id="64" dur="1" fill="hold">
-                                          <p:stCondLst>
-                                            <p:cond delay="0"/>
-                                          </p:stCondLst>
-                                        </p:cTn>
-                                        <p:tgtEl>
-                                          <p:spTgt spid="48">
-                                            <p:txEl>
-                                              <p:pRg st="1" end="1"/>
-                                            </p:txEl>
-                                          </p:spTgt>
-                                        </p:tgtEl>
-                                        <p:attrNameLst>
-                                          <p:attrName>style.visibility</p:attrName>
-                                        </p:attrNameLst>
-                                      </p:cBhvr>
-                                      <p:to>
-                                        <p:strVal val="visible"/>
-                                      </p:to>
-                                    </p:set>
-                                  </p:childTnLst>
-                                </p:cTn>
-                              </p:par>
-                            </p:childTnLst>
-                          </p:cTn>
-                        </p:par>
-                      </p:childTnLst>
-                    </p:cTn>
-                  </p:par>
-                </p:childTnLst>
-              </p:cTn>
-              <p:prevCondLst>
-                <p:cond evt="onPrev" delay="0">
-                  <p:tgtEl>
-                    <p:sldTgt/>
-                  </p:tgtEl>
-                </p:cond>
-              </p:prevCondLst>
-              <p:nextCondLst>
-                <p:cond evt="onNext" delay="0">
-                  <p:tgtEl>
-                    <p:sldTgt/>
-                  </p:tgtEl>
-                </p:cond>
-              </p:nextCondLst>
-            </p:seq>
-          </p:childTnLst>
-        </p:cTn>
-      </p:par>
-    </p:tnLst>
-    <p:bldLst>
-      <p:bldP spid="6" grpId="0" animBg="1"/>
-      <p:bldP spid="9" grpId="0"/>
-      <p:bldP spid="40" grpId="0" animBg="1"/>
-      <p:bldP spid="42" grpId="0"/>
-      <p:bldP spid="48" grpId="0" uiExpand="1" build="p"/>
-    </p:bldLst>
-  </p:timing>
-</p:sld>
-</file>
-
 <file path=ppt/theme/theme1.xml><?xml version="1.0" encoding="utf-8"?>
 <a:theme xmlns:a="http://schemas.openxmlformats.org/drawingml/2006/main" name="Damask">
   <a:themeElements>

</xml_diff>

<commit_message>
feat(reduce ppt): added comment on preferred alternative
</commit_message>
<xml_diff>
--- a/supports/source/03-Reduce.pptx
+++ b/supports/source/03-Reduce.pptx
@@ -705,7 +705,7 @@
           <a:p>
             <a:fld id="{5AEE9901-D54F-483E-910A-A3C293F4A3A0}" type="datetimeFigureOut">
               <a:rPr lang="fr-CH" smtClean="0"/>
-              <a:t>16.09.2025</a:t>
+              <a:t>17.09.2025</a:t>
             </a:fld>
             <a:endParaRPr lang="fr-CH"/>
           </a:p>
@@ -992,7 +992,7 @@
           <a:p>
             <a:fld id="{5AEE9901-D54F-483E-910A-A3C293F4A3A0}" type="datetimeFigureOut">
               <a:rPr lang="fr-CH" smtClean="0"/>
-              <a:t>16.09.2025</a:t>
+              <a:t>17.09.2025</a:t>
             </a:fld>
             <a:endParaRPr lang="fr-CH"/>
           </a:p>
@@ -1184,7 +1184,7 @@
           <a:p>
             <a:fld id="{5AEE9901-D54F-483E-910A-A3C293F4A3A0}" type="datetimeFigureOut">
               <a:rPr lang="fr-CH" smtClean="0"/>
-              <a:t>16.09.2025</a:t>
+              <a:t>17.09.2025</a:t>
             </a:fld>
             <a:endParaRPr lang="fr-CH"/>
           </a:p>
@@ -1445,7 +1445,7 @@
           <a:p>
             <a:fld id="{5AEE9901-D54F-483E-910A-A3C293F4A3A0}" type="datetimeFigureOut">
               <a:rPr lang="fr-CH" smtClean="0"/>
-              <a:t>16.09.2025</a:t>
+              <a:t>17.09.2025</a:t>
             </a:fld>
             <a:endParaRPr lang="fr-CH"/>
           </a:p>
@@ -1869,7 +1869,7 @@
           <a:p>
             <a:fld id="{5AEE9901-D54F-483E-910A-A3C293F4A3A0}" type="datetimeFigureOut">
               <a:rPr lang="fr-CH" smtClean="0"/>
-              <a:t>16.09.2025</a:t>
+              <a:t>17.09.2025</a:t>
             </a:fld>
             <a:endParaRPr lang="fr-CH"/>
           </a:p>
@@ -2415,7 +2415,7 @@
           <a:p>
             <a:fld id="{5AEE9901-D54F-483E-910A-A3C293F4A3A0}" type="datetimeFigureOut">
               <a:rPr lang="fr-CH" smtClean="0"/>
-              <a:t>16.09.2025</a:t>
+              <a:t>17.09.2025</a:t>
             </a:fld>
             <a:endParaRPr lang="fr-CH"/>
           </a:p>
@@ -3255,7 +3255,7 @@
           <a:p>
             <a:fld id="{5AEE9901-D54F-483E-910A-A3C293F4A3A0}" type="datetimeFigureOut">
               <a:rPr lang="fr-CH" smtClean="0"/>
-              <a:t>16.09.2025</a:t>
+              <a:t>17.09.2025</a:t>
             </a:fld>
             <a:endParaRPr lang="fr-CH"/>
           </a:p>
@@ -3425,7 +3425,7 @@
           <a:p>
             <a:fld id="{5AEE9901-D54F-483E-910A-A3C293F4A3A0}" type="datetimeFigureOut">
               <a:rPr lang="fr-CH" smtClean="0"/>
-              <a:t>16.09.2025</a:t>
+              <a:t>17.09.2025</a:t>
             </a:fld>
             <a:endParaRPr lang="fr-CH"/>
           </a:p>
@@ -3609,7 +3609,7 @@
           <a:p>
             <a:fld id="{5AEE9901-D54F-483E-910A-A3C293F4A3A0}" type="datetimeFigureOut">
               <a:rPr lang="fr-CH" smtClean="0"/>
-              <a:t>16.09.2025</a:t>
+              <a:t>17.09.2025</a:t>
             </a:fld>
             <a:endParaRPr lang="fr-CH"/>
           </a:p>
@@ -3779,7 +3779,7 @@
           <a:p>
             <a:fld id="{5AEE9901-D54F-483E-910A-A3C293F4A3A0}" type="datetimeFigureOut">
               <a:rPr lang="fr-CH" smtClean="0"/>
-              <a:t>16.09.2025</a:t>
+              <a:t>17.09.2025</a:t>
             </a:fld>
             <a:endParaRPr lang="fr-CH"/>
           </a:p>
@@ -4027,7 +4027,7 @@
           <a:p>
             <a:fld id="{5AEE9901-D54F-483E-910A-A3C293F4A3A0}" type="datetimeFigureOut">
               <a:rPr lang="fr-CH" smtClean="0"/>
-              <a:t>16.09.2025</a:t>
+              <a:t>17.09.2025</a:t>
             </a:fld>
             <a:endParaRPr lang="fr-CH"/>
           </a:p>
@@ -4264,7 +4264,7 @@
           <a:p>
             <a:fld id="{5AEE9901-D54F-483E-910A-A3C293F4A3A0}" type="datetimeFigureOut">
               <a:rPr lang="fr-CH" smtClean="0"/>
-              <a:t>16.09.2025</a:t>
+              <a:t>17.09.2025</a:t>
             </a:fld>
             <a:endParaRPr lang="fr-CH"/>
           </a:p>
@@ -4637,7 +4637,7 @@
           <a:p>
             <a:fld id="{5AEE9901-D54F-483E-910A-A3C293F4A3A0}" type="datetimeFigureOut">
               <a:rPr lang="fr-CH" smtClean="0"/>
-              <a:t>16.09.2025</a:t>
+              <a:t>17.09.2025</a:t>
             </a:fld>
             <a:endParaRPr lang="fr-CH"/>
           </a:p>
@@ -4755,7 +4755,7 @@
           <a:p>
             <a:fld id="{5AEE9901-D54F-483E-910A-A3C293F4A3A0}" type="datetimeFigureOut">
               <a:rPr lang="fr-CH" smtClean="0"/>
-              <a:t>16.09.2025</a:t>
+              <a:t>17.09.2025</a:t>
             </a:fld>
             <a:endParaRPr lang="fr-CH"/>
           </a:p>
@@ -4850,7 +4850,7 @@
           <a:p>
             <a:fld id="{5AEE9901-D54F-483E-910A-A3C293F4A3A0}" type="datetimeFigureOut">
               <a:rPr lang="fr-CH" smtClean="0"/>
-              <a:t>16.09.2025</a:t>
+              <a:t>17.09.2025</a:t>
             </a:fld>
             <a:endParaRPr lang="fr-CH"/>
           </a:p>
@@ -5101,7 +5101,7 @@
           <a:p>
             <a:fld id="{5AEE9901-D54F-483E-910A-A3C293F4A3A0}" type="datetimeFigureOut">
               <a:rPr lang="fr-CH" smtClean="0"/>
-              <a:t>16.09.2025</a:t>
+              <a:t>17.09.2025</a:t>
             </a:fld>
             <a:endParaRPr lang="fr-CH"/>
           </a:p>
@@ -5388,7 +5388,7 @@
           <a:p>
             <a:fld id="{5AEE9901-D54F-483E-910A-A3C293F4A3A0}" type="datetimeFigureOut">
               <a:rPr lang="fr-CH" smtClean="0"/>
-              <a:t>16.09.2025</a:t>
+              <a:t>17.09.2025</a:t>
             </a:fld>
             <a:endParaRPr lang="fr-CH"/>
           </a:p>
@@ -5601,7 +5601,7 @@
           <a:p>
             <a:fld id="{5AEE9901-D54F-483E-910A-A3C293F4A3A0}" type="datetimeFigureOut">
               <a:rPr lang="fr-CH" smtClean="0"/>
-              <a:t>16.09.2025</a:t>
+              <a:t>17.09.2025</a:t>
             </a:fld>
             <a:endParaRPr lang="fr-CH"/>
           </a:p>
@@ -14223,7 +14223,12 @@
             <p:ph type="title"/>
           </p:nvPr>
         </p:nvSpPr>
-        <p:spPr/>
+        <p:spPr>
+          <a:xfrm>
+            <a:off x="913795" y="46266"/>
+            <a:ext cx="10353761" cy="1326321"/>
+          </a:xfrm>
+        </p:spPr>
         <p:txBody>
           <a:bodyPr/>
           <a:lstStyle/>
@@ -14265,7 +14270,7 @@
         </p:nvSpPr>
         <p:spPr>
           <a:xfrm>
-            <a:off x="913795" y="1935921"/>
+            <a:off x="913795" y="1372587"/>
             <a:ext cx="9584617" cy="750264"/>
           </a:xfrm>
         </p:spPr>
@@ -14304,7 +14309,7 @@
         </p:nvSpPr>
         <p:spPr>
           <a:xfrm>
-            <a:off x="1216577" y="2756130"/>
+            <a:off x="1216577" y="2192796"/>
             <a:ext cx="7302956" cy="1538883"/>
           </a:xfrm>
           <a:prstGeom prst="rect">
@@ -14491,8 +14496,8 @@
         </p:nvSpPr>
         <p:spPr>
           <a:xfrm>
-            <a:off x="913794" y="4336585"/>
-            <a:ext cx="9584617" cy="2255601"/>
+            <a:off x="913794" y="3773250"/>
+            <a:ext cx="9584617" cy="3038483"/>
           </a:xfrm>
           <a:prstGeom prst="rect">
             <a:avLst/>
@@ -14500,7 +14505,7 @@
         </p:spPr>
         <p:txBody>
           <a:bodyPr vert="horz" lIns="91440" tIns="45720" rIns="91440" bIns="45720" rtlCol="0">
-            <a:normAutofit fontScale="92500" lnSpcReduction="20000"/>
+            <a:normAutofit lnSpcReduction="10000"/>
           </a:bodyPr>
           <a:lstStyle>
             <a:lvl1pPr marL="228600" indent="-228600" algn="l" defTabSz="914400" rtl="0" eaLnBrk="1" latinLnBrk="0" hangingPunct="1">
@@ -14774,6 +14779,24 @@
             <a:r>
               <a:rPr lang="fr-CH" dirty="0"/>
               <a:t>…</a:t>
+            </a:r>
+          </a:p>
+          <a:p>
+            <a:r>
+              <a:rPr lang="fr-CH" dirty="0"/>
+              <a:t>Suggestion: Utiliser un </a:t>
+            </a:r>
+            <a:r>
+              <a:rPr lang="fr-CH" b="1" i="1" dirty="0">
+                <a:latin typeface="Hack" panose="020B0609030202020204" pitchFamily="49" charset="0"/>
+                <a:ea typeface="Hack" panose="020B0609030202020204" pitchFamily="49" charset="0"/>
+                <a:cs typeface="Hack" panose="020B0609030202020204" pitchFamily="49" charset="0"/>
+              </a:rPr>
+              <a:t>.Select() </a:t>
+            </a:r>
+            <a:r>
+              <a:rPr lang="fr-CH" dirty="0"/>
+              <a:t>après l'agrégation dans ce cas</a:t>
             </a:r>
           </a:p>
         </p:txBody>
@@ -15187,6 +15210,55 @@
                       </p:childTnLst>
                     </p:cTn>
                   </p:par>
+                  <p:par>
+                    <p:cTn id="35" fill="hold">
+                      <p:stCondLst>
+                        <p:cond delay="indefinite"/>
+                      </p:stCondLst>
+                      <p:childTnLst>
+                        <p:par>
+                          <p:cTn id="36" fill="hold">
+                            <p:stCondLst>
+                              <p:cond delay="0"/>
+                            </p:stCondLst>
+                            <p:childTnLst>
+                              <p:par>
+                                <p:cTn id="37" presetID="1" presetClass="entr" presetSubtype="0" fill="hold" nodeType="clickEffect">
+                                  <p:stCondLst>
+                                    <p:cond delay="0"/>
+                                  </p:stCondLst>
+                                  <p:childTnLst>
+                                    <p:set>
+                                      <p:cBhvr>
+                                        <p:cTn id="38" dur="1" fill="hold">
+                                          <p:stCondLst>
+                                            <p:cond delay="0"/>
+                                          </p:stCondLst>
+                                        </p:cTn>
+                                        <p:tgtEl>
+                                          <p:spTgt spid="7">
+                                            <p:txEl>
+                                              <p:pRg st="6" end="6"/>
+                                            </p:txEl>
+                                          </p:spTgt>
+                                        </p:tgtEl>
+                                        <p:attrNameLst>
+                                          <p:attrName>style.visibility</p:attrName>
+                                        </p:attrNameLst>
+                                      </p:cBhvr>
+                                      <p:to>
+                                        <p:strVal val="visible"/>
+                                      </p:to>
+                                    </p:set>
+                                  </p:childTnLst>
+                                </p:cTn>
+                              </p:par>
+                            </p:childTnLst>
+                          </p:cTn>
+                        </p:par>
+                      </p:childTnLst>
+                    </p:cTn>
+                  </p:par>
                 </p:childTnLst>
               </p:cTn>
               <p:prevCondLst>
@@ -15210,7 +15282,7 @@
     </p:tnLst>
     <p:bldLst>
       <p:bldP spid="3" grpId="0" build="p"/>
-      <p:bldP spid="4" grpId="0"/>
+      <p:bldP spid="4" grpId="0" animBg="1"/>
     </p:bldLst>
   </p:timing>
 </p:sld>

</xml_diff>